<commit_message>
update files from feedback
</commit_message>
<xml_diff>
--- a/docs/diagrams/CdSequenceDiagram.pptx
+++ b/docs/diagrams/CdSequenceDiagram.pptx
@@ -208,7 +208,7 @@
           <a:p>
             <a:fld id="{F5CC4B3F-88C1-4FFA-B1B6-F41C21DC6924}" type="datetimeFigureOut">
               <a:rPr lang="en-US" smtClean="0"/>
-              <a:t>10/17/2018</a:t>
+              <a:t>10/23/2018</a:t>
             </a:fld>
             <a:endParaRPr lang="en-US"/>
           </a:p>
@@ -654,7 +654,7 @@
           <a:p>
             <a:fld id="{78C97017-6FC3-485B-9764-EAC9E56C1D49}" type="datetimeFigureOut">
               <a:rPr lang="en-US" smtClean="0"/>
-              <a:t>10/17/2018</a:t>
+              <a:t>10/23/2018</a:t>
             </a:fld>
             <a:endParaRPr lang="en-US"/>
           </a:p>
@@ -822,7 +822,7 @@
           <a:p>
             <a:fld id="{78C97017-6FC3-485B-9764-EAC9E56C1D49}" type="datetimeFigureOut">
               <a:rPr lang="en-US" smtClean="0"/>
-              <a:t>10/17/2018</a:t>
+              <a:t>10/23/2018</a:t>
             </a:fld>
             <a:endParaRPr lang="en-US"/>
           </a:p>
@@ -1000,7 +1000,7 @@
           <a:p>
             <a:fld id="{78C97017-6FC3-485B-9764-EAC9E56C1D49}" type="datetimeFigureOut">
               <a:rPr lang="en-US" smtClean="0"/>
-              <a:t>10/17/2018</a:t>
+              <a:t>10/23/2018</a:t>
             </a:fld>
             <a:endParaRPr lang="en-US"/>
           </a:p>
@@ -1168,7 +1168,7 @@
           <a:p>
             <a:fld id="{78C97017-6FC3-485B-9764-EAC9E56C1D49}" type="datetimeFigureOut">
               <a:rPr lang="en-US" smtClean="0"/>
-              <a:t>10/17/2018</a:t>
+              <a:t>10/23/2018</a:t>
             </a:fld>
             <a:endParaRPr lang="en-US"/>
           </a:p>
@@ -1413,7 +1413,7 @@
           <a:p>
             <a:fld id="{78C97017-6FC3-485B-9764-EAC9E56C1D49}" type="datetimeFigureOut">
               <a:rPr lang="en-US" smtClean="0"/>
-              <a:t>10/17/2018</a:t>
+              <a:t>10/23/2018</a:t>
             </a:fld>
             <a:endParaRPr lang="en-US"/>
           </a:p>
@@ -1698,7 +1698,7 @@
           <a:p>
             <a:fld id="{78C97017-6FC3-485B-9764-EAC9E56C1D49}" type="datetimeFigureOut">
               <a:rPr lang="en-US" smtClean="0"/>
-              <a:t>10/17/2018</a:t>
+              <a:t>10/23/2018</a:t>
             </a:fld>
             <a:endParaRPr lang="en-US"/>
           </a:p>
@@ -2117,7 +2117,7 @@
           <a:p>
             <a:fld id="{78C97017-6FC3-485B-9764-EAC9E56C1D49}" type="datetimeFigureOut">
               <a:rPr lang="en-US" smtClean="0"/>
-              <a:t>10/17/2018</a:t>
+              <a:t>10/23/2018</a:t>
             </a:fld>
             <a:endParaRPr lang="en-US"/>
           </a:p>
@@ -2234,7 +2234,7 @@
           <a:p>
             <a:fld id="{78C97017-6FC3-485B-9764-EAC9E56C1D49}" type="datetimeFigureOut">
               <a:rPr lang="en-US" smtClean="0"/>
-              <a:t>10/17/2018</a:t>
+              <a:t>10/23/2018</a:t>
             </a:fld>
             <a:endParaRPr lang="en-US"/>
           </a:p>
@@ -2329,7 +2329,7 @@
           <a:p>
             <a:fld id="{78C97017-6FC3-485B-9764-EAC9E56C1D49}" type="datetimeFigureOut">
               <a:rPr lang="en-US" smtClean="0"/>
-              <a:t>10/17/2018</a:t>
+              <a:t>10/23/2018</a:t>
             </a:fld>
             <a:endParaRPr lang="en-US"/>
           </a:p>
@@ -2604,7 +2604,7 @@
           <a:p>
             <a:fld id="{78C97017-6FC3-485B-9764-EAC9E56C1D49}" type="datetimeFigureOut">
               <a:rPr lang="en-US" smtClean="0"/>
-              <a:t>10/17/2018</a:t>
+              <a:t>10/23/2018</a:t>
             </a:fld>
             <a:endParaRPr lang="en-US"/>
           </a:p>
@@ -2856,7 +2856,7 @@
           <a:p>
             <a:fld id="{78C97017-6FC3-485B-9764-EAC9E56C1D49}" type="datetimeFigureOut">
               <a:rPr lang="en-US" smtClean="0"/>
-              <a:t>10/17/2018</a:t>
+              <a:t>10/23/2018</a:t>
             </a:fld>
             <a:endParaRPr lang="en-US"/>
           </a:p>
@@ -3067,7 +3067,7 @@
           <a:p>
             <a:fld id="{78C97017-6FC3-485B-9764-EAC9E56C1D49}" type="datetimeFigureOut">
               <a:rPr lang="en-US" smtClean="0"/>
-              <a:t>10/17/2018</a:t>
+              <a:t>10/23/2018</a:t>
             </a:fld>
             <a:endParaRPr lang="en-US"/>
           </a:p>
@@ -3450,8 +3450,8 @@
         </p:nvSpPr>
         <p:spPr>
           <a:xfrm>
-            <a:off x="6459374" y="118894"/>
-            <a:ext cx="3903825" cy="5247181"/>
+            <a:off x="6485114" y="163019"/>
+            <a:ext cx="3227206" cy="5247181"/>
           </a:xfrm>
           <a:prstGeom prst="roundRect">
             <a:avLst>
@@ -4472,7 +4472,7 @@
         </p:nvSpPr>
         <p:spPr>
           <a:xfrm>
-            <a:off x="7924800" y="2438400"/>
+            <a:off x="8080635" y="2438400"/>
             <a:ext cx="1294659" cy="244173"/>
           </a:xfrm>
           <a:prstGeom prst="rect">
@@ -4539,7 +4539,7 @@
         </p:nvSpPr>
         <p:spPr>
           <a:xfrm>
-            <a:off x="8499869" y="3010906"/>
+            <a:off x="8655704" y="3010906"/>
             <a:ext cx="141935" cy="195819"/>
           </a:xfrm>
           <a:prstGeom prst="rect">
@@ -4626,7 +4626,7 @@
         </p:nvSpPr>
         <p:spPr>
           <a:xfrm>
-            <a:off x="6549765" y="2362200"/>
+            <a:off x="6705600" y="2362200"/>
             <a:ext cx="841636" cy="300180"/>
           </a:xfrm>
           <a:prstGeom prst="rect">
@@ -4687,7 +4687,7 @@
         </p:nvCxnSpPr>
         <p:spPr>
           <a:xfrm>
-            <a:off x="6990451" y="2653306"/>
+            <a:off x="7146286" y="2653306"/>
             <a:ext cx="2486" cy="2417965"/>
           </a:xfrm>
           <a:prstGeom prst="line">
@@ -4724,7 +4724,7 @@
         </p:nvSpPr>
         <p:spPr>
           <a:xfrm>
-            <a:off x="6887527" y="2958107"/>
+            <a:off x="7043362" y="2958107"/>
             <a:ext cx="152505" cy="375718"/>
           </a:xfrm>
           <a:prstGeom prst="rect">
@@ -4774,7 +4774,7 @@
         <p:spPr>
           <a:xfrm>
             <a:off x="5685755" y="2975344"/>
-            <a:ext cx="1210345" cy="0"/>
+            <a:ext cx="1357607" cy="0"/>
           </a:xfrm>
           <a:prstGeom prst="straightConnector1">
             <a:avLst/>
@@ -5058,7 +5058,7 @@
         </p:nvCxnSpPr>
         <p:spPr>
           <a:xfrm>
-            <a:off x="8576448" y="2642997"/>
+            <a:off x="8732283" y="2642997"/>
             <a:ext cx="9138" cy="2428274"/>
           </a:xfrm>
           <a:prstGeom prst="line">
@@ -5095,7 +5095,7 @@
         </p:nvSpPr>
         <p:spPr>
           <a:xfrm>
-            <a:off x="7239000" y="2819400"/>
+            <a:off x="7394835" y="2819400"/>
             <a:ext cx="1175072" cy="184666"/>
           </a:xfrm>
           <a:prstGeom prst="rect">
@@ -5154,7 +5154,7 @@
         </p:nvCxnSpPr>
         <p:spPr>
           <a:xfrm>
-            <a:off x="7043991" y="3026895"/>
+            <a:off x="7199826" y="3026895"/>
             <a:ext cx="1470216" cy="0"/>
           </a:xfrm>
           <a:prstGeom prst="straightConnector1">
@@ -5198,7 +5198,7 @@
         </p:nvCxnSpPr>
         <p:spPr>
           <a:xfrm flipV="1">
-            <a:off x="7043991" y="3200400"/>
+            <a:off x="7199826" y="3200400"/>
             <a:ext cx="1470216" cy="6325"/>
           </a:xfrm>
           <a:prstGeom prst="straightConnector1">
@@ -5245,8 +5245,8 @@
         </p:nvCxnSpPr>
         <p:spPr>
           <a:xfrm>
-            <a:off x="5701047" y="3333825"/>
-            <a:ext cx="1262733" cy="0"/>
+            <a:off x="5685755" y="3333825"/>
+            <a:ext cx="1433860" cy="0"/>
           </a:xfrm>
           <a:prstGeom prst="straightConnector1">
             <a:avLst/>
@@ -5277,10 +5277,107 @@
       </p:cxnSp>
       <p:sp>
         <p:nvSpPr>
-          <p:cNvPr id="53" name="TextBox 52">
+          <p:cNvPr id="54" name="Rectangle 53">
             <a:extLst>
               <a:ext uri="{FF2B5EF4-FFF2-40B4-BE49-F238E27FC236}">
-                <a16:creationId xmlns:a16="http://schemas.microsoft.com/office/drawing/2014/main" id="{C6B2C6FC-3AA3-4C14-A620-574F20B8A794}"/>
+                <a16:creationId xmlns:a16="http://schemas.microsoft.com/office/drawing/2014/main" id="{89CA0E73-D056-42E5-88A3-4CD2AA6A492D}"/>
+              </a:ext>
+            </a:extLst>
+          </p:cNvPr>
+          <p:cNvSpPr/>
+          <p:nvPr/>
+        </p:nvSpPr>
+        <p:spPr>
+          <a:xfrm>
+            <a:off x="7046040" y="4143873"/>
+            <a:ext cx="152505" cy="375718"/>
+          </a:xfrm>
+          <a:prstGeom prst="rect">
+            <a:avLst/>
+          </a:prstGeom>
+          <a:solidFill>
+            <a:srgbClr val="7030A0"/>
+          </a:solidFill>
+          <a:ln>
+            <a:solidFill>
+              <a:srgbClr val="7030A0"/>
+            </a:solidFill>
+          </a:ln>
+          <a:effectLst/>
+        </p:spPr>
+        <p:style>
+          <a:lnRef idx="1">
+            <a:schemeClr val="accent3"/>
+          </a:lnRef>
+          <a:fillRef idx="2">
+            <a:schemeClr val="accent3"/>
+          </a:fillRef>
+          <a:effectRef idx="1">
+            <a:schemeClr val="accent3"/>
+          </a:effectRef>
+          <a:fontRef idx="minor">
+            <a:schemeClr val="dk1"/>
+          </a:fontRef>
+        </p:style>
+        <p:txBody>
+          <a:bodyPr rtlCol="0" anchor="ctr"/>
+          <a:lstStyle/>
+          <a:p>
+            <a:pPr algn="ctr"/>
+            <a:endParaRPr lang="en-SG" sz="1400"/>
+          </a:p>
+        </p:txBody>
+      </p:sp>
+      <p:cxnSp>
+        <p:nvCxnSpPr>
+          <p:cNvPr id="55" name="Straight Arrow Connector 54">
+            <a:extLst>
+              <a:ext uri="{FF2B5EF4-FFF2-40B4-BE49-F238E27FC236}">
+                <a16:creationId xmlns:a16="http://schemas.microsoft.com/office/drawing/2014/main" id="{FF72696D-5412-4E4B-9C96-7F57AE42A008}"/>
+              </a:ext>
+            </a:extLst>
+          </p:cNvPr>
+          <p:cNvCxnSpPr>
+            <a:cxnSpLocks/>
+          </p:cNvCxnSpPr>
+          <p:nvPr/>
+        </p:nvCxnSpPr>
+        <p:spPr>
+          <a:xfrm>
+            <a:off x="5685755" y="4167051"/>
+            <a:ext cx="1357607" cy="0"/>
+          </a:xfrm>
+          <a:prstGeom prst="straightConnector1">
+            <a:avLst/>
+          </a:prstGeom>
+          <a:ln w="19050">
+            <a:solidFill>
+              <a:srgbClr val="0070C0"/>
+            </a:solidFill>
+            <a:tailEnd type="arrow"/>
+          </a:ln>
+        </p:spPr>
+        <p:style>
+          <a:lnRef idx="1">
+            <a:schemeClr val="accent1"/>
+          </a:lnRef>
+          <a:fillRef idx="0">
+            <a:schemeClr val="accent1"/>
+          </a:fillRef>
+          <a:effectRef idx="0">
+            <a:schemeClr val="accent1"/>
+          </a:effectRef>
+          <a:fontRef idx="minor">
+            <a:schemeClr val="tx1"/>
+          </a:fontRef>
+        </p:style>
+      </p:cxnSp>
+      <p:sp>
+        <p:nvSpPr>
+          <p:cNvPr id="57" name="TextBox 56">
+            <a:extLst>
+              <a:ext uri="{FF2B5EF4-FFF2-40B4-BE49-F238E27FC236}">
+                <a16:creationId xmlns:a16="http://schemas.microsoft.com/office/drawing/2014/main" id="{96963441-FA23-489A-AC06-849CB59F8636}"/>
               </a:ext>
             </a:extLst>
           </p:cNvPr>
@@ -5289,13 +5386,16 @@
         </p:nvSpPr>
         <p:spPr>
           <a:xfrm>
-            <a:off x="5763405" y="3930134"/>
-            <a:ext cx="1155406" cy="184666"/>
+            <a:off x="5716820" y="3762952"/>
+            <a:ext cx="1368152" cy="369332"/>
           </a:xfrm>
           <a:prstGeom prst="rect">
             <a:avLst/>
           </a:prstGeom>
           <a:noFill/>
+          <a:ln>
+            <a:noFill/>
+          </a:ln>
         </p:spPr>
         <p:txBody>
           <a:bodyPr wrap="square" lIns="0" tIns="0" rIns="0" bIns="0" rtlCol="0">
@@ -5317,172 +5417,19 @@
             <a:r>
               <a:rPr lang="en-US" sz="1200" dirty="0" err="1">
                 <a:solidFill>
-                  <a:schemeClr val="accent4">
-                    <a:lumMod val="75000"/>
-                  </a:schemeClr>
-                </a:solidFill>
-              </a:rPr>
-              <a:t>updateUserPrefs</a:t>
-            </a:r>
-            <a:r>
-              <a:rPr lang="en-US" sz="1200" dirty="0">
-                <a:solidFill>
-                  <a:srgbClr val="7030A0"/>
-                </a:solidFill>
-              </a:rPr>
-              <a:t>()</a:t>
-            </a:r>
-            <a:endParaRPr lang="en-US" sz="1200" dirty="0"/>
-          </a:p>
-        </p:txBody>
-      </p:sp>
-      <p:sp>
-        <p:nvSpPr>
-          <p:cNvPr id="54" name="Rectangle 53">
-            <a:extLst>
-              <a:ext uri="{FF2B5EF4-FFF2-40B4-BE49-F238E27FC236}">
-                <a16:creationId xmlns:a16="http://schemas.microsoft.com/office/drawing/2014/main" id="{89CA0E73-D056-42E5-88A3-4CD2AA6A492D}"/>
-              </a:ext>
-            </a:extLst>
-          </p:cNvPr>
-          <p:cNvSpPr/>
-          <p:nvPr/>
-        </p:nvSpPr>
-        <p:spPr>
-          <a:xfrm>
-            <a:off x="6890205" y="4143873"/>
-            <a:ext cx="152505" cy="375718"/>
-          </a:xfrm>
-          <a:prstGeom prst="rect">
-            <a:avLst/>
-          </a:prstGeom>
-          <a:solidFill>
-            <a:srgbClr val="7030A0"/>
-          </a:solidFill>
-          <a:ln>
-            <a:solidFill>
-              <a:srgbClr val="7030A0"/>
-            </a:solidFill>
-          </a:ln>
-          <a:effectLst/>
-        </p:spPr>
-        <p:style>
-          <a:lnRef idx="1">
-            <a:schemeClr val="accent3"/>
-          </a:lnRef>
-          <a:fillRef idx="2">
-            <a:schemeClr val="accent3"/>
-          </a:fillRef>
-          <a:effectRef idx="1">
-            <a:schemeClr val="accent3"/>
-          </a:effectRef>
-          <a:fontRef idx="minor">
-            <a:schemeClr val="dk1"/>
-          </a:fontRef>
-        </p:style>
-        <p:txBody>
-          <a:bodyPr rtlCol="0" anchor="ctr"/>
-          <a:lstStyle/>
-          <a:p>
-            <a:pPr algn="ctr"/>
-            <a:endParaRPr lang="en-SG" sz="1400"/>
-          </a:p>
-        </p:txBody>
-      </p:sp>
-      <p:cxnSp>
-        <p:nvCxnSpPr>
-          <p:cNvPr id="55" name="Straight Arrow Connector 54">
-            <a:extLst>
-              <a:ext uri="{FF2B5EF4-FFF2-40B4-BE49-F238E27FC236}">
-                <a16:creationId xmlns:a16="http://schemas.microsoft.com/office/drawing/2014/main" id="{FF72696D-5412-4E4B-9C96-7F57AE42A008}"/>
-              </a:ext>
-            </a:extLst>
-          </p:cNvPr>
-          <p:cNvCxnSpPr>
-            <a:cxnSpLocks/>
-          </p:cNvCxnSpPr>
-          <p:nvPr/>
-        </p:nvCxnSpPr>
-        <p:spPr>
-          <a:xfrm>
-            <a:off x="5685755" y="4167051"/>
-            <a:ext cx="1210345" cy="0"/>
-          </a:xfrm>
-          <a:prstGeom prst="straightConnector1">
-            <a:avLst/>
-          </a:prstGeom>
-          <a:ln w="19050">
-            <a:solidFill>
-              <a:srgbClr val="0070C0"/>
-            </a:solidFill>
-            <a:tailEnd type="arrow"/>
-          </a:ln>
-        </p:spPr>
-        <p:style>
-          <a:lnRef idx="1">
-            <a:schemeClr val="accent1"/>
-          </a:lnRef>
-          <a:fillRef idx="0">
-            <a:schemeClr val="accent1"/>
-          </a:fillRef>
-          <a:effectRef idx="0">
-            <a:schemeClr val="accent1"/>
-          </a:effectRef>
-          <a:fontRef idx="minor">
-            <a:schemeClr val="tx1"/>
-          </a:fontRef>
-        </p:style>
-      </p:cxnSp>
-      <p:sp>
-        <p:nvSpPr>
-          <p:cNvPr id="57" name="TextBox 56">
-            <a:extLst>
-              <a:ext uri="{FF2B5EF4-FFF2-40B4-BE49-F238E27FC236}">
-                <a16:creationId xmlns:a16="http://schemas.microsoft.com/office/drawing/2014/main" id="{96963441-FA23-489A-AC06-849CB59F8636}"/>
-              </a:ext>
-            </a:extLst>
-          </p:cNvPr>
-          <p:cNvSpPr txBox="1"/>
-          <p:nvPr/>
-        </p:nvSpPr>
-        <p:spPr>
-          <a:xfrm>
-            <a:off x="7095001" y="4005166"/>
-            <a:ext cx="1368152" cy="184666"/>
-          </a:xfrm>
-          <a:prstGeom prst="rect">
-            <a:avLst/>
-          </a:prstGeom>
-          <a:noFill/>
-          <a:ln>
-            <a:noFill/>
-          </a:ln>
-        </p:spPr>
-        <p:txBody>
-          <a:bodyPr wrap="square" lIns="0" tIns="0" rIns="0" bIns="0" rtlCol="0">
-            <a:spAutoFit/>
-          </a:bodyPr>
-          <a:lstStyle>
-            <a:defPPr>
-              <a:defRPr lang="en-US"/>
-            </a:defPPr>
-            <a:lvl1pPr algn="r">
-              <a:defRPr sz="1400">
-                <a:solidFill>
-                  <a:srgbClr val="0070C0"/>
-                </a:solidFill>
-              </a:defRPr>
-            </a:lvl1pPr>
-          </a:lstStyle>
-          <a:p>
-            <a:r>
-              <a:rPr lang="en-US" sz="1200" dirty="0" err="1">
-                <a:solidFill>
                   <a:srgbClr val="7030A0"/>
                 </a:solidFill>
               </a:rPr>
               <a:t>updateCurrDirectory</a:t>
             </a:r>
+            <a:endParaRPr lang="en-US" sz="1200" dirty="0">
+              <a:solidFill>
+                <a:srgbClr val="7030A0"/>
+              </a:solidFill>
+            </a:endParaRPr>
+          </a:p>
+          <a:p>
+            <a:pPr algn="ctr"/>
             <a:r>
               <a:rPr lang="en-US" sz="1200" dirty="0">
                 <a:solidFill>
@@ -5491,7 +5438,7 @@
                   </a:schemeClr>
                 </a:solidFill>
               </a:rPr>
-              <a:t>()</a:t>
+              <a:t>(Path)</a:t>
             </a:r>
           </a:p>
         </p:txBody>
@@ -5512,7 +5459,7 @@
         </p:nvCxnSpPr>
         <p:spPr>
           <a:xfrm>
-            <a:off x="7046669" y="4212661"/>
+            <a:off x="7202504" y="4212661"/>
             <a:ext cx="1470216" cy="0"/>
           </a:xfrm>
           <a:prstGeom prst="straightConnector1">
@@ -5556,7 +5503,7 @@
         </p:nvCxnSpPr>
         <p:spPr>
           <a:xfrm flipV="1">
-            <a:off x="7046669" y="4386166"/>
+            <a:off x="7202504" y="4386166"/>
             <a:ext cx="1470216" cy="6325"/>
           </a:xfrm>
           <a:prstGeom prst="straightConnector1">
@@ -5603,8 +5550,8 @@
         </p:nvCxnSpPr>
         <p:spPr>
           <a:xfrm>
-            <a:off x="5703725" y="4519591"/>
-            <a:ext cx="1262733" cy="0"/>
+            <a:off x="5685755" y="4519591"/>
+            <a:ext cx="1436538" cy="0"/>
           </a:xfrm>
           <a:prstGeom prst="straightConnector1">
             <a:avLst/>
@@ -5647,7 +5594,7 @@
         </p:nvSpPr>
         <p:spPr>
           <a:xfrm>
-            <a:off x="8499868" y="4219083"/>
+            <a:off x="8655703" y="4219083"/>
             <a:ext cx="141935" cy="195819"/>
           </a:xfrm>
           <a:prstGeom prst="rect">
@@ -5813,6 +5760,67 @@
               <a:rPr lang="en-SG" sz="1100" dirty="0"/>
               <a:t>()]</a:t>
             </a:r>
+          </a:p>
+        </p:txBody>
+      </p:sp>
+      <p:sp>
+        <p:nvSpPr>
+          <p:cNvPr id="64" name="TextBox 63">
+            <a:extLst>
+              <a:ext uri="{FF2B5EF4-FFF2-40B4-BE49-F238E27FC236}">
+                <a16:creationId xmlns:a16="http://schemas.microsoft.com/office/drawing/2014/main" id="{350341EB-5947-4D0D-8346-066C7BE3C600}"/>
+              </a:ext>
+            </a:extLst>
+          </p:cNvPr>
+          <p:cNvSpPr txBox="1"/>
+          <p:nvPr/>
+        </p:nvSpPr>
+        <p:spPr>
+          <a:xfrm>
+            <a:off x="7264293" y="3962400"/>
+            <a:ext cx="1422507" cy="184666"/>
+          </a:xfrm>
+          <a:prstGeom prst="rect">
+            <a:avLst/>
+          </a:prstGeom>
+          <a:noFill/>
+        </p:spPr>
+        <p:txBody>
+          <a:bodyPr wrap="square" lIns="0" tIns="0" rIns="0" bIns="0" rtlCol="0">
+            <a:spAutoFit/>
+          </a:bodyPr>
+          <a:lstStyle>
+            <a:defPPr>
+              <a:defRPr lang="en-US"/>
+            </a:defPPr>
+            <a:lvl1pPr algn="r">
+              <a:defRPr sz="1400">
+                <a:solidFill>
+                  <a:srgbClr val="0070C0"/>
+                </a:solidFill>
+              </a:defRPr>
+            </a:lvl1pPr>
+          </a:lstStyle>
+          <a:p>
+            <a:r>
+              <a:rPr lang="en-US" sz="1200" dirty="0" err="1">
+                <a:solidFill>
+                  <a:schemeClr val="accent4">
+                    <a:lumMod val="75000"/>
+                  </a:schemeClr>
+                </a:solidFill>
+              </a:rPr>
+              <a:t>updateUserPrefs</a:t>
+            </a:r>
+            <a:r>
+              <a:rPr lang="en-US" sz="1200" dirty="0">
+                <a:solidFill>
+                  <a:srgbClr val="7030A0"/>
+                </a:solidFill>
+              </a:rPr>
+              <a:t>(Path)</a:t>
+            </a:r>
+            <a:endParaRPr lang="en-US" sz="1200" dirty="0"/>
           </a:p>
         </p:txBody>
       </p:sp>

</xml_diff>

<commit_message>
modify UG and DG
</commit_message>
<xml_diff>
--- a/docs/diagrams/CdSequenceDiagram.pptx
+++ b/docs/diagrams/CdSequenceDiagram.pptx
@@ -5,10 +5,11 @@
     <p:sldMasterId id="2147483648" r:id="rId1"/>
   </p:sldMasterIdLst>
   <p:notesMasterIdLst>
-    <p:notesMasterId r:id="rId3"/>
+    <p:notesMasterId r:id="rId4"/>
   </p:notesMasterIdLst>
   <p:sldIdLst>
     <p:sldId id="267" r:id="rId2"/>
+    <p:sldId id="268" r:id="rId3"/>
   </p:sldIdLst>
   <p:sldSz cx="9144000" cy="6858000" type="screen4x3"/>
   <p:notesSz cx="6858000" cy="9144000"/>
@@ -208,7 +209,7 @@
           <a:p>
             <a:fld id="{F5CC4B3F-88C1-4FFA-B1B6-F41C21DC6924}" type="datetimeFigureOut">
               <a:rPr lang="en-US" smtClean="0"/>
-              <a:t>10/23/2018</a:t>
+              <a:t>10/24/18</a:t>
             </a:fld>
             <a:endParaRPr lang="en-US"/>
           </a:p>
@@ -654,7 +655,7 @@
           <a:p>
             <a:fld id="{78C97017-6FC3-485B-9764-EAC9E56C1D49}" type="datetimeFigureOut">
               <a:rPr lang="en-US" smtClean="0"/>
-              <a:t>10/23/2018</a:t>
+              <a:t>10/24/18</a:t>
             </a:fld>
             <a:endParaRPr lang="en-US"/>
           </a:p>
@@ -822,7 +823,7 @@
           <a:p>
             <a:fld id="{78C97017-6FC3-485B-9764-EAC9E56C1D49}" type="datetimeFigureOut">
               <a:rPr lang="en-US" smtClean="0"/>
-              <a:t>10/23/2018</a:t>
+              <a:t>10/24/18</a:t>
             </a:fld>
             <a:endParaRPr lang="en-US"/>
           </a:p>
@@ -1000,7 +1001,7 @@
           <a:p>
             <a:fld id="{78C97017-6FC3-485B-9764-EAC9E56C1D49}" type="datetimeFigureOut">
               <a:rPr lang="en-US" smtClean="0"/>
-              <a:t>10/23/2018</a:t>
+              <a:t>10/24/18</a:t>
             </a:fld>
             <a:endParaRPr lang="en-US"/>
           </a:p>
@@ -1168,7 +1169,7 @@
           <a:p>
             <a:fld id="{78C97017-6FC3-485B-9764-EAC9E56C1D49}" type="datetimeFigureOut">
               <a:rPr lang="en-US" smtClean="0"/>
-              <a:t>10/23/2018</a:t>
+              <a:t>10/24/18</a:t>
             </a:fld>
             <a:endParaRPr lang="en-US"/>
           </a:p>
@@ -1413,7 +1414,7 @@
           <a:p>
             <a:fld id="{78C97017-6FC3-485B-9764-EAC9E56C1D49}" type="datetimeFigureOut">
               <a:rPr lang="en-US" smtClean="0"/>
-              <a:t>10/23/2018</a:t>
+              <a:t>10/24/18</a:t>
             </a:fld>
             <a:endParaRPr lang="en-US"/>
           </a:p>
@@ -1698,7 +1699,7 @@
           <a:p>
             <a:fld id="{78C97017-6FC3-485B-9764-EAC9E56C1D49}" type="datetimeFigureOut">
               <a:rPr lang="en-US" smtClean="0"/>
-              <a:t>10/23/2018</a:t>
+              <a:t>10/24/18</a:t>
             </a:fld>
             <a:endParaRPr lang="en-US"/>
           </a:p>
@@ -2117,7 +2118,7 @@
           <a:p>
             <a:fld id="{78C97017-6FC3-485B-9764-EAC9E56C1D49}" type="datetimeFigureOut">
               <a:rPr lang="en-US" smtClean="0"/>
-              <a:t>10/23/2018</a:t>
+              <a:t>10/24/18</a:t>
             </a:fld>
             <a:endParaRPr lang="en-US"/>
           </a:p>
@@ -2234,7 +2235,7 @@
           <a:p>
             <a:fld id="{78C97017-6FC3-485B-9764-EAC9E56C1D49}" type="datetimeFigureOut">
               <a:rPr lang="en-US" smtClean="0"/>
-              <a:t>10/23/2018</a:t>
+              <a:t>10/24/18</a:t>
             </a:fld>
             <a:endParaRPr lang="en-US"/>
           </a:p>
@@ -2329,7 +2330,7 @@
           <a:p>
             <a:fld id="{78C97017-6FC3-485B-9764-EAC9E56C1D49}" type="datetimeFigureOut">
               <a:rPr lang="en-US" smtClean="0"/>
-              <a:t>10/23/2018</a:t>
+              <a:t>10/24/18</a:t>
             </a:fld>
             <a:endParaRPr lang="en-US"/>
           </a:p>
@@ -2604,7 +2605,7 @@
           <a:p>
             <a:fld id="{78C97017-6FC3-485B-9764-EAC9E56C1D49}" type="datetimeFigureOut">
               <a:rPr lang="en-US" smtClean="0"/>
-              <a:t>10/23/2018</a:t>
+              <a:t>10/24/18</a:t>
             </a:fld>
             <a:endParaRPr lang="en-US"/>
           </a:p>
@@ -2856,7 +2857,7 @@
           <a:p>
             <a:fld id="{78C97017-6FC3-485B-9764-EAC9E56C1D49}" type="datetimeFigureOut">
               <a:rPr lang="en-US" smtClean="0"/>
-              <a:t>10/23/2018</a:t>
+              <a:t>10/24/18</a:t>
             </a:fld>
             <a:endParaRPr lang="en-US"/>
           </a:p>
@@ -3067,7 +3068,7 @@
           <a:p>
             <a:fld id="{78C97017-6FC3-485B-9764-EAC9E56C1D49}" type="datetimeFigureOut">
               <a:rPr lang="en-US" smtClean="0"/>
-              <a:t>10/23/2018</a:t>
+              <a:t>10/24/18</a:t>
             </a:fld>
             <a:endParaRPr lang="en-US"/>
           </a:p>
@@ -5828,6 +5829,2316 @@
     <p:extLst>
       <p:ext uri="{BB962C8B-B14F-4D97-AF65-F5344CB8AC3E}">
         <p14:creationId xmlns:p14="http://schemas.microsoft.com/office/powerpoint/2010/main" val="3945898909"/>
+      </p:ext>
+    </p:extLst>
+  </p:cSld>
+  <p:clrMapOvr>
+    <a:masterClrMapping/>
+  </p:clrMapOvr>
+</p:sld>
+</file>
+
+<file path=ppt/slides/slide2.xml><?xml version="1.0" encoding="utf-8"?>
+<p:sld xmlns:a="http://schemas.openxmlformats.org/drawingml/2006/main" xmlns:r="http://schemas.openxmlformats.org/officeDocument/2006/relationships" xmlns:p="http://schemas.openxmlformats.org/presentationml/2006/main">
+  <p:cSld>
+    <p:spTree>
+      <p:nvGrpSpPr>
+        <p:cNvPr id="1" name=""/>
+        <p:cNvGrpSpPr/>
+        <p:nvPr/>
+      </p:nvGrpSpPr>
+      <p:grpSpPr>
+        <a:xfrm>
+          <a:off x="0" y="0"/>
+          <a:ext cx="0" cy="0"/>
+          <a:chOff x="0" y="0"/>
+          <a:chExt cx="0" cy="0"/>
+        </a:xfrm>
+      </p:grpSpPr>
+      <p:sp>
+        <p:nvSpPr>
+          <p:cNvPr id="56" name="Rectangle 65"/>
+          <p:cNvSpPr/>
+          <p:nvPr/>
+        </p:nvSpPr>
+        <p:spPr>
+          <a:xfrm>
+            <a:off x="6325545" y="351753"/>
+            <a:ext cx="4323549" cy="5247181"/>
+          </a:xfrm>
+          <a:prstGeom prst="roundRect">
+            <a:avLst>
+              <a:gd name="adj" fmla="val 3484"/>
+            </a:avLst>
+          </a:prstGeom>
+          <a:solidFill>
+            <a:schemeClr val="accent4">
+              <a:lumMod val="20000"/>
+              <a:lumOff val="80000"/>
+            </a:schemeClr>
+          </a:solidFill>
+          <a:ln w="19050">
+            <a:noFill/>
+          </a:ln>
+          <a:effectLst/>
+        </p:spPr>
+        <p:style>
+          <a:lnRef idx="1">
+            <a:schemeClr val="accent2"/>
+          </a:lnRef>
+          <a:fillRef idx="2">
+            <a:schemeClr val="accent2"/>
+          </a:fillRef>
+          <a:effectRef idx="1">
+            <a:schemeClr val="accent2"/>
+          </a:effectRef>
+          <a:fontRef idx="minor">
+            <a:schemeClr val="dk1"/>
+          </a:fontRef>
+        </p:style>
+        <p:txBody>
+          <a:bodyPr rtlCol="0" anchor="t"/>
+          <a:lstStyle/>
+          <a:p>
+            <a:r>
+              <a:rPr lang="en-US" sz="1200" b="1" dirty="0">
+                <a:solidFill>
+                  <a:srgbClr val="7030A0"/>
+                </a:solidFill>
+              </a:rPr>
+              <a:t>Model</a:t>
+            </a:r>
+            <a:endParaRPr lang="en-SG" sz="1200" b="1" dirty="0">
+              <a:solidFill>
+                <a:srgbClr val="7030A0"/>
+              </a:solidFill>
+            </a:endParaRPr>
+          </a:p>
+        </p:txBody>
+      </p:sp>
+      <p:sp>
+        <p:nvSpPr>
+          <p:cNvPr id="81" name="Rectangle 65"/>
+          <p:cNvSpPr/>
+          <p:nvPr/>
+        </p:nvSpPr>
+        <p:spPr>
+          <a:xfrm>
+            <a:off x="471280" y="423022"/>
+            <a:ext cx="5863964" cy="5247182"/>
+          </a:xfrm>
+          <a:prstGeom prst="roundRect">
+            <a:avLst>
+              <a:gd name="adj" fmla="val 3484"/>
+            </a:avLst>
+          </a:prstGeom>
+          <a:solidFill>
+            <a:schemeClr val="accent1">
+              <a:lumMod val="20000"/>
+              <a:lumOff val="80000"/>
+            </a:schemeClr>
+          </a:solidFill>
+          <a:ln w="19050">
+            <a:noFill/>
+          </a:ln>
+          <a:effectLst/>
+        </p:spPr>
+        <p:style>
+          <a:lnRef idx="1">
+            <a:schemeClr val="accent2"/>
+          </a:lnRef>
+          <a:fillRef idx="2">
+            <a:schemeClr val="accent2"/>
+          </a:fillRef>
+          <a:effectRef idx="1">
+            <a:schemeClr val="accent2"/>
+          </a:effectRef>
+          <a:fontRef idx="minor">
+            <a:schemeClr val="dk1"/>
+          </a:fontRef>
+        </p:style>
+        <p:txBody>
+          <a:bodyPr rtlCol="0" anchor="t"/>
+          <a:lstStyle/>
+          <a:p>
+            <a:r>
+              <a:rPr lang="en-US" sz="1200" b="1" dirty="0">
+                <a:solidFill>
+                  <a:srgbClr val="0070C0"/>
+                </a:solidFill>
+              </a:rPr>
+              <a:t>Logic</a:t>
+            </a:r>
+            <a:endParaRPr lang="en-SG" sz="1200" b="1" dirty="0">
+              <a:solidFill>
+                <a:srgbClr val="0070C0"/>
+              </a:solidFill>
+            </a:endParaRPr>
+          </a:p>
+        </p:txBody>
+      </p:sp>
+      <p:sp>
+        <p:nvSpPr>
+          <p:cNvPr id="2" name="Rectangle 62"/>
+          <p:cNvSpPr/>
+          <p:nvPr/>
+        </p:nvSpPr>
+        <p:spPr>
+          <a:xfrm>
+            <a:off x="883145" y="543946"/>
+            <a:ext cx="1455629" cy="346760"/>
+          </a:xfrm>
+          <a:prstGeom prst="rect">
+            <a:avLst/>
+          </a:prstGeom>
+          <a:solidFill>
+            <a:srgbClr val="0070C0"/>
+          </a:solidFill>
+          <a:ln w="19050">
+            <a:solidFill>
+              <a:srgbClr val="0070C0"/>
+            </a:solidFill>
+          </a:ln>
+          <a:effectLst/>
+        </p:spPr>
+        <p:style>
+          <a:lnRef idx="1">
+            <a:schemeClr val="accent2"/>
+          </a:lnRef>
+          <a:fillRef idx="2">
+            <a:schemeClr val="accent2"/>
+          </a:fillRef>
+          <a:effectRef idx="1">
+            <a:schemeClr val="accent2"/>
+          </a:effectRef>
+          <a:fontRef idx="minor">
+            <a:schemeClr val="dk1"/>
+          </a:fontRef>
+        </p:style>
+        <p:txBody>
+          <a:bodyPr rtlCol="0" anchor="ctr"/>
+          <a:lstStyle/>
+          <a:p>
+            <a:pPr algn="ctr"/>
+            <a:r>
+              <a:rPr lang="en-US" sz="1600" dirty="0">
+                <a:solidFill>
+                  <a:schemeClr val="bg1"/>
+                </a:solidFill>
+              </a:rPr>
+              <a:t>:</a:t>
+            </a:r>
+            <a:r>
+              <a:rPr lang="en-US" sz="1600" dirty="0" err="1">
+                <a:solidFill>
+                  <a:schemeClr val="bg1"/>
+                </a:solidFill>
+              </a:rPr>
+              <a:t>LogicManager</a:t>
+            </a:r>
+            <a:endParaRPr lang="en-SG" sz="1600" dirty="0">
+              <a:solidFill>
+                <a:schemeClr val="bg1"/>
+              </a:solidFill>
+            </a:endParaRPr>
+          </a:p>
+        </p:txBody>
+      </p:sp>
+      <p:cxnSp>
+        <p:nvCxnSpPr>
+          <p:cNvPr id="5" name="Straight Connector 4"/>
+          <p:cNvCxnSpPr>
+            <a:cxnSpLocks/>
+          </p:cNvCxnSpPr>
+          <p:nvPr/>
+        </p:nvCxnSpPr>
+        <p:spPr>
+          <a:xfrm>
+            <a:off x="1610959" y="907617"/>
+            <a:ext cx="0" cy="4350183"/>
+          </a:xfrm>
+          <a:prstGeom prst="line">
+            <a:avLst/>
+          </a:prstGeom>
+          <a:ln w="19050">
+            <a:solidFill>
+              <a:srgbClr val="0070C0"/>
+            </a:solidFill>
+            <a:prstDash val="sysDash"/>
+          </a:ln>
+          <a:effectLst/>
+        </p:spPr>
+        <p:style>
+          <a:lnRef idx="1">
+            <a:schemeClr val="accent1"/>
+          </a:lnRef>
+          <a:fillRef idx="2">
+            <a:schemeClr val="accent1"/>
+          </a:fillRef>
+          <a:effectRef idx="1">
+            <a:schemeClr val="accent1"/>
+          </a:effectRef>
+          <a:fontRef idx="minor">
+            <a:schemeClr val="dk1"/>
+          </a:fontRef>
+        </p:style>
+      </p:cxnSp>
+      <p:sp>
+        <p:nvSpPr>
+          <p:cNvPr id="6" name="Rectangle 5"/>
+          <p:cNvSpPr/>
+          <p:nvPr/>
+        </p:nvSpPr>
+        <p:spPr>
+          <a:xfrm>
+            <a:off x="1530029" y="1258311"/>
+            <a:ext cx="161322" cy="3847087"/>
+          </a:xfrm>
+          <a:prstGeom prst="rect">
+            <a:avLst/>
+          </a:prstGeom>
+          <a:solidFill>
+            <a:srgbClr val="0070C0"/>
+          </a:solidFill>
+          <a:ln>
+            <a:solidFill>
+              <a:srgbClr val="0070C0"/>
+            </a:solidFill>
+          </a:ln>
+          <a:effectLst/>
+        </p:spPr>
+        <p:style>
+          <a:lnRef idx="1">
+            <a:schemeClr val="accent3"/>
+          </a:lnRef>
+          <a:fillRef idx="2">
+            <a:schemeClr val="accent3"/>
+          </a:fillRef>
+          <a:effectRef idx="1">
+            <a:schemeClr val="accent3"/>
+          </a:effectRef>
+          <a:fontRef idx="minor">
+            <a:schemeClr val="dk1"/>
+          </a:fontRef>
+        </p:style>
+        <p:txBody>
+          <a:bodyPr rtlCol="0" anchor="ctr"/>
+          <a:lstStyle/>
+          <a:p>
+            <a:pPr algn="ctr"/>
+            <a:endParaRPr lang="en-SG" sz="1400"/>
+          </a:p>
+        </p:txBody>
+      </p:sp>
+      <p:sp>
+        <p:nvSpPr>
+          <p:cNvPr id="16" name="Rectangle 62"/>
+          <p:cNvSpPr/>
+          <p:nvPr/>
+        </p:nvSpPr>
+        <p:spPr>
+          <a:xfrm>
+            <a:off x="3437188" y="423022"/>
+            <a:ext cx="1219200" cy="467684"/>
+          </a:xfrm>
+          <a:prstGeom prst="rect">
+            <a:avLst/>
+          </a:prstGeom>
+          <a:solidFill>
+            <a:srgbClr val="0070C0"/>
+          </a:solidFill>
+          <a:ln w="19050">
+            <a:solidFill>
+              <a:srgbClr val="0070C0"/>
+            </a:solidFill>
+          </a:ln>
+          <a:effectLst/>
+        </p:spPr>
+        <p:style>
+          <a:lnRef idx="1">
+            <a:schemeClr val="accent2"/>
+          </a:lnRef>
+          <a:fillRef idx="2">
+            <a:schemeClr val="accent2"/>
+          </a:fillRef>
+          <a:effectRef idx="1">
+            <a:schemeClr val="accent2"/>
+          </a:effectRef>
+          <a:fontRef idx="minor">
+            <a:schemeClr val="dk1"/>
+          </a:fontRef>
+        </p:style>
+        <p:txBody>
+          <a:bodyPr rtlCol="0" anchor="ctr"/>
+          <a:lstStyle/>
+          <a:p>
+            <a:pPr algn="ctr"/>
+            <a:r>
+              <a:rPr lang="en-US" sz="1600" dirty="0">
+                <a:solidFill>
+                  <a:schemeClr val="bg1"/>
+                </a:solidFill>
+              </a:rPr>
+              <a:t>:Address</a:t>
+            </a:r>
+          </a:p>
+          <a:p>
+            <a:pPr algn="ctr"/>
+            <a:r>
+              <a:rPr lang="en-US" sz="1600" dirty="0" err="1">
+                <a:solidFill>
+                  <a:schemeClr val="bg1"/>
+                </a:solidFill>
+              </a:rPr>
+              <a:t>BookParser</a:t>
+            </a:r>
+            <a:endParaRPr lang="en-SG" sz="1600" dirty="0">
+              <a:solidFill>
+                <a:schemeClr val="bg1"/>
+              </a:solidFill>
+            </a:endParaRPr>
+          </a:p>
+        </p:txBody>
+      </p:sp>
+      <p:cxnSp>
+        <p:nvCxnSpPr>
+          <p:cNvPr id="17" name="Straight Connector 16"/>
+          <p:cNvCxnSpPr>
+            <a:cxnSpLocks/>
+          </p:cNvCxnSpPr>
+          <p:nvPr/>
+        </p:nvCxnSpPr>
+        <p:spPr>
+          <a:xfrm>
+            <a:off x="4050587" y="907617"/>
+            <a:ext cx="0" cy="1482984"/>
+          </a:xfrm>
+          <a:prstGeom prst="line">
+            <a:avLst/>
+          </a:prstGeom>
+          <a:ln w="19050">
+            <a:solidFill>
+              <a:srgbClr val="0070C0"/>
+            </a:solidFill>
+            <a:prstDash val="sysDash"/>
+          </a:ln>
+          <a:effectLst/>
+        </p:spPr>
+        <p:style>
+          <a:lnRef idx="1">
+            <a:schemeClr val="accent1"/>
+          </a:lnRef>
+          <a:fillRef idx="2">
+            <a:schemeClr val="accent1"/>
+          </a:fillRef>
+          <a:effectRef idx="1">
+            <a:schemeClr val="accent1"/>
+          </a:effectRef>
+          <a:fontRef idx="minor">
+            <a:schemeClr val="dk1"/>
+          </a:fontRef>
+        </p:style>
+      </p:cxnSp>
+      <p:sp>
+        <p:nvSpPr>
+          <p:cNvPr id="18" name="Rectangle 17"/>
+          <p:cNvSpPr/>
+          <p:nvPr/>
+        </p:nvSpPr>
+        <p:spPr>
+          <a:xfrm>
+            <a:off x="3978580" y="1365810"/>
+            <a:ext cx="154408" cy="767790"/>
+          </a:xfrm>
+          <a:prstGeom prst="rect">
+            <a:avLst/>
+          </a:prstGeom>
+          <a:solidFill>
+            <a:srgbClr val="0070C0"/>
+          </a:solidFill>
+          <a:ln>
+            <a:solidFill>
+              <a:srgbClr val="0070C0"/>
+            </a:solidFill>
+          </a:ln>
+          <a:effectLst/>
+        </p:spPr>
+        <p:style>
+          <a:lnRef idx="1">
+            <a:schemeClr val="accent3"/>
+          </a:lnRef>
+          <a:fillRef idx="2">
+            <a:schemeClr val="accent3"/>
+          </a:fillRef>
+          <a:effectRef idx="1">
+            <a:schemeClr val="accent3"/>
+          </a:effectRef>
+          <a:fontRef idx="minor">
+            <a:schemeClr val="dk1"/>
+          </a:fontRef>
+        </p:style>
+        <p:txBody>
+          <a:bodyPr rtlCol="0" anchor="ctr"/>
+          <a:lstStyle/>
+          <a:p>
+            <a:pPr algn="ctr"/>
+            <a:endParaRPr lang="en-SG" sz="1400">
+              <a:solidFill>
+                <a:schemeClr val="dk1"/>
+              </a:solidFill>
+            </a:endParaRPr>
+          </a:p>
+        </p:txBody>
+      </p:sp>
+      <p:cxnSp>
+        <p:nvCxnSpPr>
+          <p:cNvPr id="20" name="Straight Connector 19"/>
+          <p:cNvCxnSpPr>
+            <a:cxnSpLocks/>
+            <a:stCxn id="21" idx="0"/>
+            <a:endCxn id="4" idx="0"/>
+          </p:cNvCxnSpPr>
+          <p:nvPr/>
+        </p:nvCxnSpPr>
+        <p:spPr>
+          <a:xfrm>
+            <a:off x="5602082" y="1613633"/>
+            <a:ext cx="0" cy="3415567"/>
+          </a:xfrm>
+          <a:prstGeom prst="line">
+            <a:avLst/>
+          </a:prstGeom>
+          <a:ln w="19050">
+            <a:solidFill>
+              <a:srgbClr val="0070C0"/>
+            </a:solidFill>
+            <a:prstDash val="sysDash"/>
+          </a:ln>
+          <a:effectLst/>
+        </p:spPr>
+        <p:style>
+          <a:lnRef idx="1">
+            <a:schemeClr val="accent1"/>
+          </a:lnRef>
+          <a:fillRef idx="2">
+            <a:schemeClr val="accent1"/>
+          </a:fillRef>
+          <a:effectRef idx="1">
+            <a:schemeClr val="accent1"/>
+          </a:effectRef>
+          <a:fontRef idx="minor">
+            <a:schemeClr val="dk1"/>
+          </a:fontRef>
+        </p:style>
+      </p:cxnSp>
+      <p:sp>
+        <p:nvSpPr>
+          <p:cNvPr id="21" name="Rectangle 20"/>
+          <p:cNvSpPr/>
+          <p:nvPr/>
+        </p:nvSpPr>
+        <p:spPr>
+          <a:xfrm>
+            <a:off x="5525882" y="1613633"/>
+            <a:ext cx="152400" cy="276003"/>
+          </a:xfrm>
+          <a:prstGeom prst="rect">
+            <a:avLst/>
+          </a:prstGeom>
+          <a:solidFill>
+            <a:srgbClr val="0070C0"/>
+          </a:solidFill>
+          <a:ln>
+            <a:solidFill>
+              <a:srgbClr val="0070C0"/>
+            </a:solidFill>
+          </a:ln>
+          <a:effectLst/>
+        </p:spPr>
+        <p:style>
+          <a:lnRef idx="1">
+            <a:schemeClr val="accent3"/>
+          </a:lnRef>
+          <a:fillRef idx="2">
+            <a:schemeClr val="accent3"/>
+          </a:fillRef>
+          <a:effectRef idx="1">
+            <a:schemeClr val="accent3"/>
+          </a:effectRef>
+          <a:fontRef idx="minor">
+            <a:schemeClr val="dk1"/>
+          </a:fontRef>
+        </p:style>
+        <p:txBody>
+          <a:bodyPr rtlCol="0" anchor="ctr"/>
+          <a:lstStyle/>
+          <a:p>
+            <a:pPr algn="ctr"/>
+            <a:endParaRPr lang="en-SG" sz="1400"/>
+          </a:p>
+        </p:txBody>
+      </p:sp>
+      <p:cxnSp>
+        <p:nvCxnSpPr>
+          <p:cNvPr id="23" name="Straight Arrow Connector 22"/>
+          <p:cNvCxnSpPr/>
+          <p:nvPr/>
+        </p:nvCxnSpPr>
+        <p:spPr>
+          <a:xfrm>
+            <a:off x="419100" y="1261999"/>
+            <a:ext cx="1119851" cy="0"/>
+          </a:xfrm>
+          <a:prstGeom prst="straightConnector1">
+            <a:avLst/>
+          </a:prstGeom>
+          <a:ln w="19050">
+            <a:solidFill>
+              <a:srgbClr val="00B050"/>
+            </a:solidFill>
+            <a:tailEnd type="arrow"/>
+          </a:ln>
+        </p:spPr>
+        <p:style>
+          <a:lnRef idx="1">
+            <a:schemeClr val="accent1"/>
+          </a:lnRef>
+          <a:fillRef idx="0">
+            <a:schemeClr val="accent1"/>
+          </a:fillRef>
+          <a:effectRef idx="0">
+            <a:schemeClr val="accent1"/>
+          </a:effectRef>
+          <a:fontRef idx="minor">
+            <a:schemeClr val="tx1"/>
+          </a:fontRef>
+        </p:style>
+      </p:cxnSp>
+      <p:sp>
+        <p:nvSpPr>
+          <p:cNvPr id="26" name="TextBox 25"/>
+          <p:cNvSpPr txBox="1"/>
+          <p:nvPr/>
+        </p:nvSpPr>
+        <p:spPr>
+          <a:xfrm>
+            <a:off x="292382" y="1258309"/>
+            <a:ext cx="1179128" cy="646331"/>
+          </a:xfrm>
+          <a:prstGeom prst="rect">
+            <a:avLst/>
+          </a:prstGeom>
+          <a:noFill/>
+        </p:spPr>
+        <p:txBody>
+          <a:bodyPr wrap="square" lIns="0" tIns="0" rIns="0" bIns="0" rtlCol="0">
+            <a:spAutoFit/>
+          </a:bodyPr>
+          <a:lstStyle/>
+          <a:p>
+            <a:pPr algn="ctr"/>
+            <a:r>
+              <a:rPr lang="en-US" sz="1400" dirty="0">
+                <a:solidFill>
+                  <a:srgbClr val="0070C0"/>
+                </a:solidFill>
+              </a:rPr>
+              <a:t>Execute</a:t>
+            </a:r>
+          </a:p>
+          <a:p>
+            <a:pPr algn="ctr"/>
+            <a:r>
+              <a:rPr lang="en-US" sz="1400" dirty="0">
+                <a:solidFill>
+                  <a:srgbClr val="0070C0"/>
+                </a:solidFill>
+              </a:rPr>
+              <a:t>(“convert &lt;</a:t>
+            </a:r>
+            <a:r>
+              <a:rPr lang="en-US" sz="1400" dirty="0" err="1">
+                <a:solidFill>
+                  <a:srgbClr val="0070C0"/>
+                </a:solidFill>
+              </a:rPr>
+              <a:t>args</a:t>
+            </a:r>
+            <a:r>
+              <a:rPr lang="en-US" sz="1400" dirty="0">
+                <a:solidFill>
+                  <a:srgbClr val="0070C0"/>
+                </a:solidFill>
+              </a:rPr>
+              <a:t>&gt;”)</a:t>
+            </a:r>
+          </a:p>
+        </p:txBody>
+      </p:sp>
+      <p:cxnSp>
+        <p:nvCxnSpPr>
+          <p:cNvPr id="28" name="Straight Arrow Connector 27"/>
+          <p:cNvCxnSpPr/>
+          <p:nvPr/>
+        </p:nvCxnSpPr>
+        <p:spPr>
+          <a:xfrm flipV="1">
+            <a:off x="4135972" y="1512340"/>
+            <a:ext cx="922392" cy="1"/>
+          </a:xfrm>
+          <a:prstGeom prst="straightConnector1">
+            <a:avLst/>
+          </a:prstGeom>
+          <a:ln w="19050">
+            <a:solidFill>
+              <a:srgbClr val="0070C0"/>
+            </a:solidFill>
+            <a:tailEnd type="arrow"/>
+          </a:ln>
+        </p:spPr>
+        <p:style>
+          <a:lnRef idx="1">
+            <a:schemeClr val="accent1"/>
+          </a:lnRef>
+          <a:fillRef idx="0">
+            <a:schemeClr val="accent1"/>
+          </a:fillRef>
+          <a:effectRef idx="0">
+            <a:schemeClr val="accent1"/>
+          </a:effectRef>
+          <a:fontRef idx="minor">
+            <a:schemeClr val="tx1"/>
+          </a:fontRef>
+        </p:style>
+      </p:cxnSp>
+      <p:sp>
+        <p:nvSpPr>
+          <p:cNvPr id="29" name="TextBox 28"/>
+          <p:cNvSpPr txBox="1"/>
+          <p:nvPr/>
+        </p:nvSpPr>
+        <p:spPr>
+          <a:xfrm>
+            <a:off x="3243421" y="2484071"/>
+            <a:ext cx="855809" cy="215444"/>
+          </a:xfrm>
+          <a:prstGeom prst="rect">
+            <a:avLst/>
+          </a:prstGeom>
+          <a:noFill/>
+        </p:spPr>
+        <p:txBody>
+          <a:bodyPr wrap="square" lIns="0" tIns="0" rIns="0" bIns="0" rtlCol="0">
+            <a:spAutoFit/>
+          </a:bodyPr>
+          <a:lstStyle>
+            <a:defPPr>
+              <a:defRPr lang="en-US"/>
+            </a:defPPr>
+            <a:lvl1pPr algn="r">
+              <a:defRPr sz="1400">
+                <a:solidFill>
+                  <a:srgbClr val="0070C0"/>
+                </a:solidFill>
+              </a:defRPr>
+            </a:lvl1pPr>
+          </a:lstStyle>
+          <a:p>
+            <a:r>
+              <a:rPr lang="en-US" dirty="0"/>
+              <a:t>execute()</a:t>
+            </a:r>
+          </a:p>
+        </p:txBody>
+      </p:sp>
+      <p:cxnSp>
+        <p:nvCxnSpPr>
+          <p:cNvPr id="34" name="Straight Arrow Connector 33"/>
+          <p:cNvCxnSpPr/>
+          <p:nvPr/>
+        </p:nvCxnSpPr>
+        <p:spPr>
+          <a:xfrm>
+            <a:off x="4109108" y="1878232"/>
+            <a:ext cx="1492974" cy="0"/>
+          </a:xfrm>
+          <a:prstGeom prst="straightConnector1">
+            <a:avLst/>
+          </a:prstGeom>
+          <a:ln w="19050">
+            <a:solidFill>
+              <a:srgbClr val="0070C0"/>
+            </a:solidFill>
+            <a:prstDash val="sysDash"/>
+            <a:headEnd type="arrow" w="med" len="med"/>
+            <a:tailEnd type="none" w="med" len="med"/>
+          </a:ln>
+        </p:spPr>
+        <p:style>
+          <a:lnRef idx="1">
+            <a:schemeClr val="accent1"/>
+          </a:lnRef>
+          <a:fillRef idx="0">
+            <a:schemeClr val="accent1"/>
+          </a:fillRef>
+          <a:effectRef idx="0">
+            <a:schemeClr val="accent1"/>
+          </a:effectRef>
+          <a:fontRef idx="minor">
+            <a:schemeClr val="tx1"/>
+          </a:fontRef>
+        </p:style>
+      </p:cxnSp>
+      <p:cxnSp>
+        <p:nvCxnSpPr>
+          <p:cNvPr id="35" name="Straight Arrow Connector 34"/>
+          <p:cNvCxnSpPr>
+            <a:cxnSpLocks/>
+          </p:cNvCxnSpPr>
+          <p:nvPr/>
+        </p:nvCxnSpPr>
+        <p:spPr>
+          <a:xfrm>
+            <a:off x="1691351" y="2133600"/>
+            <a:ext cx="2348067" cy="0"/>
+          </a:xfrm>
+          <a:prstGeom prst="straightConnector1">
+            <a:avLst/>
+          </a:prstGeom>
+          <a:ln w="19050">
+            <a:solidFill>
+              <a:srgbClr val="0070C0"/>
+            </a:solidFill>
+            <a:prstDash val="sysDash"/>
+            <a:headEnd type="arrow" w="med" len="med"/>
+            <a:tailEnd type="none" w="med" len="med"/>
+          </a:ln>
+        </p:spPr>
+        <p:style>
+          <a:lnRef idx="1">
+            <a:schemeClr val="accent1"/>
+          </a:lnRef>
+          <a:fillRef idx="0">
+            <a:schemeClr val="accent1"/>
+          </a:fillRef>
+          <a:effectRef idx="0">
+            <a:schemeClr val="accent1"/>
+          </a:effectRef>
+          <a:fontRef idx="minor">
+            <a:schemeClr val="tx1"/>
+          </a:fontRef>
+        </p:style>
+      </p:cxnSp>
+      <p:cxnSp>
+        <p:nvCxnSpPr>
+          <p:cNvPr id="37" name="Straight Arrow Connector 36"/>
+          <p:cNvCxnSpPr/>
+          <p:nvPr/>
+        </p:nvCxnSpPr>
+        <p:spPr>
+          <a:xfrm>
+            <a:off x="380999" y="5105400"/>
+            <a:ext cx="1196051" cy="0"/>
+          </a:xfrm>
+          <a:prstGeom prst="straightConnector1">
+            <a:avLst/>
+          </a:prstGeom>
+          <a:ln w="19050">
+            <a:solidFill>
+              <a:schemeClr val="accent1"/>
+            </a:solidFill>
+            <a:prstDash val="sysDash"/>
+            <a:headEnd type="arrow" w="med" len="med"/>
+            <a:tailEnd type="none" w="med" len="med"/>
+          </a:ln>
+        </p:spPr>
+        <p:style>
+          <a:lnRef idx="1">
+            <a:schemeClr val="accent1"/>
+          </a:lnRef>
+          <a:fillRef idx="0">
+            <a:schemeClr val="accent1"/>
+          </a:fillRef>
+          <a:effectRef idx="0">
+            <a:schemeClr val="accent1"/>
+          </a:effectRef>
+          <a:fontRef idx="minor">
+            <a:schemeClr val="tx1"/>
+          </a:fontRef>
+        </p:style>
+      </p:cxnSp>
+      <p:sp>
+        <p:nvSpPr>
+          <p:cNvPr id="65" name="Rectangle 64"/>
+          <p:cNvSpPr/>
+          <p:nvPr/>
+        </p:nvSpPr>
+        <p:spPr>
+          <a:xfrm>
+            <a:off x="5526488" y="2731313"/>
+            <a:ext cx="151794" cy="2178489"/>
+          </a:xfrm>
+          <a:prstGeom prst="rect">
+            <a:avLst/>
+          </a:prstGeom>
+          <a:solidFill>
+            <a:srgbClr val="0070C0"/>
+          </a:solidFill>
+          <a:ln>
+            <a:solidFill>
+              <a:srgbClr val="0070C0"/>
+            </a:solidFill>
+          </a:ln>
+          <a:effectLst/>
+        </p:spPr>
+        <p:style>
+          <a:lnRef idx="1">
+            <a:schemeClr val="accent3"/>
+          </a:lnRef>
+          <a:fillRef idx="2">
+            <a:schemeClr val="accent3"/>
+          </a:fillRef>
+          <a:effectRef idx="1">
+            <a:schemeClr val="accent3"/>
+          </a:effectRef>
+          <a:fontRef idx="minor">
+            <a:schemeClr val="dk1"/>
+          </a:fontRef>
+        </p:style>
+        <p:txBody>
+          <a:bodyPr rtlCol="0" anchor="ctr"/>
+          <a:lstStyle/>
+          <a:p>
+            <a:pPr algn="ctr"/>
+            <a:endParaRPr lang="en-SG" sz="1400"/>
+          </a:p>
+        </p:txBody>
+      </p:sp>
+      <p:sp>
+        <p:nvSpPr>
+          <p:cNvPr id="79" name="TextBox 78"/>
+          <p:cNvSpPr txBox="1"/>
+          <p:nvPr/>
+        </p:nvSpPr>
+        <p:spPr>
+          <a:xfrm>
+            <a:off x="5744799" y="2755856"/>
+            <a:ext cx="1298078" cy="184666"/>
+          </a:xfrm>
+          <a:prstGeom prst="rect">
+            <a:avLst/>
+          </a:prstGeom>
+          <a:noFill/>
+        </p:spPr>
+        <p:txBody>
+          <a:bodyPr wrap="square" lIns="0" tIns="0" rIns="0" bIns="0" rtlCol="0">
+            <a:spAutoFit/>
+          </a:bodyPr>
+          <a:lstStyle>
+            <a:defPPr>
+              <a:defRPr lang="en-US"/>
+            </a:defPPr>
+            <a:lvl1pPr algn="r">
+              <a:defRPr sz="1400">
+                <a:solidFill>
+                  <a:srgbClr val="0070C0"/>
+                </a:solidFill>
+              </a:defRPr>
+            </a:lvl1pPr>
+          </a:lstStyle>
+          <a:p>
+            <a:r>
+              <a:rPr lang="en-US" sz="1200" dirty="0" err="1">
+                <a:solidFill>
+                  <a:schemeClr val="accent4">
+                    <a:lumMod val="75000"/>
+                  </a:schemeClr>
+                </a:solidFill>
+              </a:rPr>
+              <a:t>addTransformation</a:t>
+            </a:r>
+            <a:r>
+              <a:rPr lang="en-US" sz="1200" dirty="0">
+                <a:solidFill>
+                  <a:srgbClr val="7030A0"/>
+                </a:solidFill>
+              </a:rPr>
+              <a:t>()</a:t>
+            </a:r>
+            <a:endParaRPr lang="en-US" sz="1200" dirty="0"/>
+          </a:p>
+        </p:txBody>
+      </p:sp>
+      <p:sp>
+        <p:nvSpPr>
+          <p:cNvPr id="80" name="TextBox 79"/>
+          <p:cNvSpPr txBox="1"/>
+          <p:nvPr/>
+        </p:nvSpPr>
+        <p:spPr>
+          <a:xfrm>
+            <a:off x="1750985" y="1040752"/>
+            <a:ext cx="2079761" cy="215444"/>
+          </a:xfrm>
+          <a:prstGeom prst="rect">
+            <a:avLst/>
+          </a:prstGeom>
+          <a:noFill/>
+        </p:spPr>
+        <p:txBody>
+          <a:bodyPr wrap="square" lIns="0" tIns="0" rIns="0" bIns="0" rtlCol="0">
+            <a:spAutoFit/>
+          </a:bodyPr>
+          <a:lstStyle>
+            <a:defPPr>
+              <a:defRPr lang="en-US"/>
+            </a:defPPr>
+            <a:lvl1pPr algn="r">
+              <a:defRPr sz="1400">
+                <a:solidFill>
+                  <a:srgbClr val="0070C0"/>
+                </a:solidFill>
+              </a:defRPr>
+            </a:lvl1pPr>
+          </a:lstStyle>
+          <a:p>
+            <a:r>
+              <a:rPr lang="en-US" dirty="0" err="1"/>
+              <a:t>parseCommand</a:t>
+            </a:r>
+            <a:r>
+              <a:rPr lang="en-US" dirty="0"/>
+              <a:t>(“convert”)</a:t>
+            </a:r>
+          </a:p>
+        </p:txBody>
+      </p:sp>
+      <p:sp>
+        <p:nvSpPr>
+          <p:cNvPr id="82" name="TextBox 81"/>
+          <p:cNvSpPr txBox="1"/>
+          <p:nvPr/>
+        </p:nvSpPr>
+        <p:spPr>
+          <a:xfrm>
+            <a:off x="3272755" y="4661356"/>
+            <a:ext cx="621216" cy="215444"/>
+          </a:xfrm>
+          <a:prstGeom prst="rect">
+            <a:avLst/>
+          </a:prstGeom>
+          <a:noFill/>
+        </p:spPr>
+        <p:txBody>
+          <a:bodyPr wrap="square" lIns="0" tIns="0" rIns="0" bIns="0" rtlCol="0">
+            <a:spAutoFit/>
+          </a:bodyPr>
+          <a:lstStyle>
+            <a:defPPr>
+              <a:defRPr lang="en-US"/>
+            </a:defPPr>
+            <a:lvl1pPr algn="r">
+              <a:defRPr sz="1400">
+                <a:solidFill>
+                  <a:srgbClr val="0070C0"/>
+                </a:solidFill>
+              </a:defRPr>
+            </a:lvl1pPr>
+          </a:lstStyle>
+          <a:p>
+            <a:r>
+              <a:rPr lang="en-US" dirty="0"/>
+              <a:t>result</a:t>
+            </a:r>
+          </a:p>
+        </p:txBody>
+      </p:sp>
+      <p:sp>
+        <p:nvSpPr>
+          <p:cNvPr id="83" name="TextBox 82"/>
+          <p:cNvSpPr txBox="1"/>
+          <p:nvPr/>
+        </p:nvSpPr>
+        <p:spPr>
+          <a:xfrm>
+            <a:off x="645270" y="4860301"/>
+            <a:ext cx="762000" cy="215444"/>
+          </a:xfrm>
+          <a:prstGeom prst="rect">
+            <a:avLst/>
+          </a:prstGeom>
+          <a:noFill/>
+        </p:spPr>
+        <p:txBody>
+          <a:bodyPr wrap="square" lIns="0" tIns="0" rIns="0" bIns="0" rtlCol="0">
+            <a:spAutoFit/>
+          </a:bodyPr>
+          <a:lstStyle>
+            <a:defPPr>
+              <a:defRPr lang="en-US"/>
+            </a:defPPr>
+            <a:lvl1pPr algn="r">
+              <a:defRPr sz="1400">
+                <a:solidFill>
+                  <a:srgbClr val="0070C0"/>
+                </a:solidFill>
+              </a:defRPr>
+            </a:lvl1pPr>
+          </a:lstStyle>
+          <a:p>
+            <a:r>
+              <a:rPr lang="en-US" dirty="0"/>
+              <a:t>result</a:t>
+            </a:r>
+          </a:p>
+        </p:txBody>
+      </p:sp>
+      <p:sp>
+        <p:nvSpPr>
+          <p:cNvPr id="84" name="Rectangle 62"/>
+          <p:cNvSpPr/>
+          <p:nvPr/>
+        </p:nvSpPr>
+        <p:spPr>
+          <a:xfrm>
+            <a:off x="8080635" y="2438400"/>
+            <a:ext cx="1294659" cy="244173"/>
+          </a:xfrm>
+          <a:prstGeom prst="rect">
+            <a:avLst/>
+          </a:prstGeom>
+          <a:solidFill>
+            <a:srgbClr val="7030A0"/>
+          </a:solidFill>
+          <a:ln w="19050">
+            <a:solidFill>
+              <a:srgbClr val="7030A0"/>
+            </a:solidFill>
+          </a:ln>
+          <a:effectLst/>
+        </p:spPr>
+        <p:style>
+          <a:lnRef idx="1">
+            <a:schemeClr val="accent2"/>
+          </a:lnRef>
+          <a:fillRef idx="2">
+            <a:schemeClr val="accent2"/>
+          </a:fillRef>
+          <a:effectRef idx="1">
+            <a:schemeClr val="accent2"/>
+          </a:effectRef>
+          <a:fontRef idx="minor">
+            <a:schemeClr val="dk1"/>
+          </a:fontRef>
+        </p:style>
+        <p:txBody>
+          <a:bodyPr rtlCol="0" anchor="ctr"/>
+          <a:lstStyle/>
+          <a:p>
+            <a:pPr algn="ctr"/>
+            <a:r>
+              <a:rPr lang="en-US" sz="1600" dirty="0">
+                <a:solidFill>
+                  <a:schemeClr val="bg1"/>
+                </a:solidFill>
+              </a:rPr>
+              <a:t>: Canvas</a:t>
+            </a:r>
+            <a:endParaRPr lang="en-SG" sz="1600" dirty="0">
+              <a:solidFill>
+                <a:schemeClr val="bg1"/>
+              </a:solidFill>
+            </a:endParaRPr>
+          </a:p>
+        </p:txBody>
+      </p:sp>
+      <p:sp>
+        <p:nvSpPr>
+          <p:cNvPr id="86" name="Rectangle 85"/>
+          <p:cNvSpPr/>
+          <p:nvPr/>
+        </p:nvSpPr>
+        <p:spPr>
+          <a:xfrm>
+            <a:off x="8655704" y="3010906"/>
+            <a:ext cx="141935" cy="195819"/>
+          </a:xfrm>
+          <a:prstGeom prst="rect">
+            <a:avLst/>
+          </a:prstGeom>
+          <a:solidFill>
+            <a:srgbClr val="7030A0"/>
+          </a:solidFill>
+          <a:ln>
+            <a:solidFill>
+              <a:srgbClr val="7030A0"/>
+            </a:solidFill>
+          </a:ln>
+          <a:effectLst/>
+        </p:spPr>
+        <p:style>
+          <a:lnRef idx="1">
+            <a:schemeClr val="accent3"/>
+          </a:lnRef>
+          <a:fillRef idx="2">
+            <a:schemeClr val="accent3"/>
+          </a:fillRef>
+          <a:effectRef idx="1">
+            <a:schemeClr val="accent3"/>
+          </a:effectRef>
+          <a:fontRef idx="minor">
+            <a:schemeClr val="dk1"/>
+          </a:fontRef>
+        </p:style>
+        <p:txBody>
+          <a:bodyPr rtlCol="0" anchor="ctr"/>
+          <a:lstStyle/>
+          <a:p>
+            <a:pPr algn="ctr"/>
+            <a:endParaRPr lang="en-SG" sz="1400" dirty="0"/>
+          </a:p>
+        </p:txBody>
+      </p:sp>
+      <p:sp>
+        <p:nvSpPr>
+          <p:cNvPr id="93" name="TextBox 92"/>
+          <p:cNvSpPr txBox="1"/>
+          <p:nvPr/>
+        </p:nvSpPr>
+        <p:spPr>
+          <a:xfrm>
+            <a:off x="2091691" y="1865909"/>
+            <a:ext cx="1365403" cy="215444"/>
+          </a:xfrm>
+          <a:prstGeom prst="rect">
+            <a:avLst/>
+          </a:prstGeom>
+          <a:noFill/>
+        </p:spPr>
+        <p:txBody>
+          <a:bodyPr wrap="square" lIns="0" tIns="0" rIns="0" bIns="0" rtlCol="0">
+            <a:spAutoFit/>
+          </a:bodyPr>
+          <a:lstStyle>
+            <a:defPPr>
+              <a:defRPr lang="en-US"/>
+            </a:defPPr>
+            <a:lvl1pPr algn="r">
+              <a:defRPr sz="1400">
+                <a:solidFill>
+                  <a:srgbClr val="0070C0"/>
+                </a:solidFill>
+              </a:defRPr>
+            </a:lvl1pPr>
+          </a:lstStyle>
+          <a:p>
+            <a:pPr algn="ctr"/>
+            <a:r>
+              <a:rPr lang="en-US" dirty="0" err="1"/>
+              <a:t>ConvertCommand</a:t>
+            </a:r>
+            <a:endParaRPr lang="en-US" dirty="0"/>
+          </a:p>
+        </p:txBody>
+      </p:sp>
+      <p:sp>
+        <p:nvSpPr>
+          <p:cNvPr id="40" name="Rectangle 62"/>
+          <p:cNvSpPr/>
+          <p:nvPr/>
+        </p:nvSpPr>
+        <p:spPr>
+          <a:xfrm>
+            <a:off x="6705600" y="2362200"/>
+            <a:ext cx="841636" cy="300180"/>
+          </a:xfrm>
+          <a:prstGeom prst="rect">
+            <a:avLst/>
+          </a:prstGeom>
+          <a:solidFill>
+            <a:srgbClr val="7030A0"/>
+          </a:solidFill>
+          <a:ln w="19050">
+            <a:solidFill>
+              <a:srgbClr val="7030A0"/>
+            </a:solidFill>
+          </a:ln>
+          <a:effectLst/>
+        </p:spPr>
+        <p:style>
+          <a:lnRef idx="1">
+            <a:schemeClr val="accent2"/>
+          </a:lnRef>
+          <a:fillRef idx="2">
+            <a:schemeClr val="accent2"/>
+          </a:fillRef>
+          <a:effectRef idx="1">
+            <a:schemeClr val="accent2"/>
+          </a:effectRef>
+          <a:fontRef idx="minor">
+            <a:schemeClr val="dk1"/>
+          </a:fontRef>
+        </p:style>
+        <p:txBody>
+          <a:bodyPr rtlCol="0" anchor="ctr"/>
+          <a:lstStyle/>
+          <a:p>
+            <a:pPr algn="ctr"/>
+            <a:r>
+              <a:rPr lang="en-US" sz="1600" dirty="0">
+                <a:solidFill>
+                  <a:schemeClr val="bg1"/>
+                </a:solidFill>
+              </a:rPr>
+              <a:t>: Model</a:t>
+            </a:r>
+            <a:endParaRPr lang="en-SG" sz="1600" dirty="0">
+              <a:solidFill>
+                <a:schemeClr val="bg1"/>
+              </a:solidFill>
+            </a:endParaRPr>
+          </a:p>
+        </p:txBody>
+      </p:sp>
+      <p:cxnSp>
+        <p:nvCxnSpPr>
+          <p:cNvPr id="46" name="Straight Connector 45"/>
+          <p:cNvCxnSpPr>
+            <a:cxnSpLocks/>
+          </p:cNvCxnSpPr>
+          <p:nvPr/>
+        </p:nvCxnSpPr>
+        <p:spPr>
+          <a:xfrm flipH="1">
+            <a:off x="7126893" y="2653306"/>
+            <a:ext cx="19393" cy="2375894"/>
+          </a:xfrm>
+          <a:prstGeom prst="line">
+            <a:avLst/>
+          </a:prstGeom>
+          <a:ln w="19050">
+            <a:solidFill>
+              <a:srgbClr val="7030A0"/>
+            </a:solidFill>
+            <a:prstDash val="sysDash"/>
+          </a:ln>
+          <a:effectLst/>
+        </p:spPr>
+        <p:style>
+          <a:lnRef idx="1">
+            <a:schemeClr val="accent1"/>
+          </a:lnRef>
+          <a:fillRef idx="2">
+            <a:schemeClr val="accent1"/>
+          </a:fillRef>
+          <a:effectRef idx="1">
+            <a:schemeClr val="accent1"/>
+          </a:effectRef>
+          <a:fontRef idx="minor">
+            <a:schemeClr val="dk1"/>
+          </a:fontRef>
+        </p:style>
+      </p:cxnSp>
+      <p:sp>
+        <p:nvSpPr>
+          <p:cNvPr id="49" name="Rectangle 48"/>
+          <p:cNvSpPr/>
+          <p:nvPr/>
+        </p:nvSpPr>
+        <p:spPr>
+          <a:xfrm>
+            <a:off x="7043362" y="2958107"/>
+            <a:ext cx="152505" cy="375718"/>
+          </a:xfrm>
+          <a:prstGeom prst="rect">
+            <a:avLst/>
+          </a:prstGeom>
+          <a:solidFill>
+            <a:srgbClr val="7030A0"/>
+          </a:solidFill>
+          <a:ln>
+            <a:solidFill>
+              <a:srgbClr val="7030A0"/>
+            </a:solidFill>
+          </a:ln>
+          <a:effectLst/>
+        </p:spPr>
+        <p:style>
+          <a:lnRef idx="1">
+            <a:schemeClr val="accent3"/>
+          </a:lnRef>
+          <a:fillRef idx="2">
+            <a:schemeClr val="accent3"/>
+          </a:fillRef>
+          <a:effectRef idx="1">
+            <a:schemeClr val="accent3"/>
+          </a:effectRef>
+          <a:fontRef idx="minor">
+            <a:schemeClr val="dk1"/>
+          </a:fontRef>
+        </p:style>
+        <p:txBody>
+          <a:bodyPr rtlCol="0" anchor="ctr"/>
+          <a:lstStyle/>
+          <a:p>
+            <a:pPr algn="ctr"/>
+            <a:endParaRPr lang="en-SG" sz="1400"/>
+          </a:p>
+        </p:txBody>
+      </p:sp>
+      <p:cxnSp>
+        <p:nvCxnSpPr>
+          <p:cNvPr id="50" name="Straight Arrow Connector 49"/>
+          <p:cNvCxnSpPr>
+            <a:cxnSpLocks/>
+          </p:cNvCxnSpPr>
+          <p:nvPr/>
+        </p:nvCxnSpPr>
+        <p:spPr>
+          <a:xfrm>
+            <a:off x="5685755" y="2975344"/>
+            <a:ext cx="1357607" cy="0"/>
+          </a:xfrm>
+          <a:prstGeom prst="straightConnector1">
+            <a:avLst/>
+          </a:prstGeom>
+          <a:ln w="19050">
+            <a:solidFill>
+              <a:srgbClr val="0070C0"/>
+            </a:solidFill>
+            <a:tailEnd type="arrow"/>
+          </a:ln>
+        </p:spPr>
+        <p:style>
+          <a:lnRef idx="1">
+            <a:schemeClr val="accent1"/>
+          </a:lnRef>
+          <a:fillRef idx="0">
+            <a:schemeClr val="accent1"/>
+          </a:fillRef>
+          <a:effectRef idx="0">
+            <a:schemeClr val="accent1"/>
+          </a:effectRef>
+          <a:fontRef idx="minor">
+            <a:schemeClr val="tx1"/>
+          </a:fontRef>
+        </p:style>
+      </p:cxnSp>
+      <p:sp>
+        <p:nvSpPr>
+          <p:cNvPr id="4" name="TextBox 3"/>
+          <p:cNvSpPr txBox="1"/>
+          <p:nvPr/>
+        </p:nvSpPr>
+        <p:spPr>
+          <a:xfrm>
+            <a:off x="5472880" y="5029200"/>
+            <a:ext cx="258404" cy="261610"/>
+          </a:xfrm>
+          <a:prstGeom prst="rect">
+            <a:avLst/>
+          </a:prstGeom>
+          <a:noFill/>
+        </p:spPr>
+        <p:txBody>
+          <a:bodyPr wrap="none" rtlCol="0">
+            <a:spAutoFit/>
+          </a:bodyPr>
+          <a:lstStyle/>
+          <a:p>
+            <a:r>
+              <a:rPr lang="en-SG" sz="1100" dirty="0">
+                <a:solidFill>
+                  <a:srgbClr val="002060"/>
+                </a:solidFill>
+              </a:rPr>
+              <a:t>X</a:t>
+            </a:r>
+          </a:p>
+        </p:txBody>
+      </p:sp>
+      <p:sp>
+        <p:nvSpPr>
+          <p:cNvPr id="19" name="Rectangle 62"/>
+          <p:cNvSpPr/>
+          <p:nvPr/>
+        </p:nvSpPr>
+        <p:spPr>
+          <a:xfrm>
+            <a:off x="5035976" y="1260268"/>
+            <a:ext cx="1216202" cy="461538"/>
+          </a:xfrm>
+          <a:prstGeom prst="rect">
+            <a:avLst/>
+          </a:prstGeom>
+          <a:solidFill>
+            <a:srgbClr val="0070C0"/>
+          </a:solidFill>
+          <a:ln w="19050">
+            <a:solidFill>
+              <a:srgbClr val="0070C0"/>
+            </a:solidFill>
+          </a:ln>
+          <a:effectLst/>
+        </p:spPr>
+        <p:style>
+          <a:lnRef idx="1">
+            <a:schemeClr val="accent2"/>
+          </a:lnRef>
+          <a:fillRef idx="2">
+            <a:schemeClr val="accent2"/>
+          </a:fillRef>
+          <a:effectRef idx="1">
+            <a:schemeClr val="accent2"/>
+          </a:effectRef>
+          <a:fontRef idx="minor">
+            <a:schemeClr val="dk1"/>
+          </a:fontRef>
+        </p:style>
+        <p:txBody>
+          <a:bodyPr rtlCol="0" anchor="ctr"/>
+          <a:lstStyle/>
+          <a:p>
+            <a:pPr algn="ctr"/>
+            <a:r>
+              <a:rPr lang="en-US" sz="1200" dirty="0">
+                <a:solidFill>
+                  <a:schemeClr val="bg1"/>
+                </a:solidFill>
+              </a:rPr>
+              <a:t>convert: Convert</a:t>
+            </a:r>
+            <a:br>
+              <a:rPr lang="en-US" sz="1200" dirty="0">
+                <a:solidFill>
+                  <a:schemeClr val="bg1"/>
+                </a:solidFill>
+              </a:rPr>
+            </a:br>
+            <a:r>
+              <a:rPr lang="en-US" sz="1200" dirty="0">
+                <a:solidFill>
+                  <a:schemeClr val="bg1"/>
+                </a:solidFill>
+              </a:rPr>
+              <a:t>Command</a:t>
+            </a:r>
+            <a:endParaRPr lang="en-SG" sz="1200" dirty="0">
+              <a:solidFill>
+                <a:schemeClr val="bg1"/>
+              </a:solidFill>
+            </a:endParaRPr>
+          </a:p>
+        </p:txBody>
+      </p:sp>
+      <p:cxnSp>
+        <p:nvCxnSpPr>
+          <p:cNvPr id="66" name="Straight Arrow Connector 65">
+            <a:extLst>
+              <a:ext uri="{FF2B5EF4-FFF2-40B4-BE49-F238E27FC236}">
+                <a16:creationId xmlns:a16="http://schemas.microsoft.com/office/drawing/2014/main" id="{39916E2E-195A-4DC8-B025-B05FA87E6796}"/>
+              </a:ext>
+            </a:extLst>
+          </p:cNvPr>
+          <p:cNvCxnSpPr>
+            <a:cxnSpLocks/>
+          </p:cNvCxnSpPr>
+          <p:nvPr/>
+        </p:nvCxnSpPr>
+        <p:spPr>
+          <a:xfrm>
+            <a:off x="1691351" y="2731314"/>
+            <a:ext cx="3832164" cy="1"/>
+          </a:xfrm>
+          <a:prstGeom prst="straightConnector1">
+            <a:avLst/>
+          </a:prstGeom>
+          <a:ln w="19050">
+            <a:solidFill>
+              <a:srgbClr val="0070C0"/>
+            </a:solidFill>
+            <a:tailEnd type="arrow"/>
+          </a:ln>
+        </p:spPr>
+        <p:style>
+          <a:lnRef idx="1">
+            <a:schemeClr val="accent1"/>
+          </a:lnRef>
+          <a:fillRef idx="0">
+            <a:schemeClr val="accent1"/>
+          </a:fillRef>
+          <a:effectRef idx="0">
+            <a:schemeClr val="accent1"/>
+          </a:effectRef>
+          <a:fontRef idx="minor">
+            <a:schemeClr val="tx1"/>
+          </a:fontRef>
+        </p:style>
+      </p:cxnSp>
+      <p:cxnSp>
+        <p:nvCxnSpPr>
+          <p:cNvPr id="67" name="Straight Arrow Connector 66">
+            <a:extLst>
+              <a:ext uri="{FF2B5EF4-FFF2-40B4-BE49-F238E27FC236}">
+                <a16:creationId xmlns:a16="http://schemas.microsoft.com/office/drawing/2014/main" id="{D881596E-177C-4FDC-8E60-CAB90B3D5FAB}"/>
+              </a:ext>
+            </a:extLst>
+          </p:cNvPr>
+          <p:cNvCxnSpPr>
+            <a:cxnSpLocks/>
+          </p:cNvCxnSpPr>
+          <p:nvPr/>
+        </p:nvCxnSpPr>
+        <p:spPr>
+          <a:xfrm>
+            <a:off x="1708245" y="1363918"/>
+            <a:ext cx="2256705" cy="1"/>
+          </a:xfrm>
+          <a:prstGeom prst="straightConnector1">
+            <a:avLst/>
+          </a:prstGeom>
+          <a:ln w="19050">
+            <a:solidFill>
+              <a:srgbClr val="0070C0"/>
+            </a:solidFill>
+            <a:tailEnd type="arrow"/>
+          </a:ln>
+        </p:spPr>
+        <p:style>
+          <a:lnRef idx="1">
+            <a:schemeClr val="accent1"/>
+          </a:lnRef>
+          <a:fillRef idx="0">
+            <a:schemeClr val="accent1"/>
+          </a:fillRef>
+          <a:effectRef idx="0">
+            <a:schemeClr val="accent1"/>
+          </a:effectRef>
+          <a:fontRef idx="minor">
+            <a:schemeClr val="tx1"/>
+          </a:fontRef>
+        </p:style>
+      </p:cxnSp>
+      <p:cxnSp>
+        <p:nvCxnSpPr>
+          <p:cNvPr id="69" name="Straight Arrow Connector 68">
+            <a:extLst>
+              <a:ext uri="{FF2B5EF4-FFF2-40B4-BE49-F238E27FC236}">
+                <a16:creationId xmlns:a16="http://schemas.microsoft.com/office/drawing/2014/main" id="{7C9F21BC-13A9-471F-825A-2621FD36355F}"/>
+              </a:ext>
+            </a:extLst>
+          </p:cNvPr>
+          <p:cNvCxnSpPr>
+            <a:cxnSpLocks/>
+          </p:cNvCxnSpPr>
+          <p:nvPr/>
+        </p:nvCxnSpPr>
+        <p:spPr>
+          <a:xfrm>
+            <a:off x="1691351" y="4909802"/>
+            <a:ext cx="3831517" cy="0"/>
+          </a:xfrm>
+          <a:prstGeom prst="straightConnector1">
+            <a:avLst/>
+          </a:prstGeom>
+          <a:ln w="19050">
+            <a:solidFill>
+              <a:srgbClr val="0070C0"/>
+            </a:solidFill>
+            <a:prstDash val="sysDash"/>
+            <a:headEnd type="arrow" w="med" len="med"/>
+            <a:tailEnd type="none" w="med" len="med"/>
+          </a:ln>
+        </p:spPr>
+        <p:style>
+          <a:lnRef idx="1">
+            <a:schemeClr val="accent1"/>
+          </a:lnRef>
+          <a:fillRef idx="0">
+            <a:schemeClr val="accent1"/>
+          </a:fillRef>
+          <a:effectRef idx="0">
+            <a:schemeClr val="accent1"/>
+          </a:effectRef>
+          <a:fontRef idx="minor">
+            <a:schemeClr val="tx1"/>
+          </a:fontRef>
+        </p:style>
+      </p:cxnSp>
+      <p:cxnSp>
+        <p:nvCxnSpPr>
+          <p:cNvPr id="89" name="Straight Connector 88">
+            <a:extLst>
+              <a:ext uri="{FF2B5EF4-FFF2-40B4-BE49-F238E27FC236}">
+                <a16:creationId xmlns:a16="http://schemas.microsoft.com/office/drawing/2014/main" id="{E4E1C8CA-49DF-45D8-80A5-D5C8282EE927}"/>
+              </a:ext>
+            </a:extLst>
+          </p:cNvPr>
+          <p:cNvCxnSpPr>
+            <a:cxnSpLocks/>
+          </p:cNvCxnSpPr>
+          <p:nvPr/>
+        </p:nvCxnSpPr>
+        <p:spPr>
+          <a:xfrm>
+            <a:off x="8732283" y="2642997"/>
+            <a:ext cx="9138" cy="2428274"/>
+          </a:xfrm>
+          <a:prstGeom prst="line">
+            <a:avLst/>
+          </a:prstGeom>
+          <a:ln w="19050">
+            <a:solidFill>
+              <a:srgbClr val="7030A0"/>
+            </a:solidFill>
+            <a:prstDash val="sysDash"/>
+          </a:ln>
+          <a:effectLst/>
+        </p:spPr>
+        <p:style>
+          <a:lnRef idx="1">
+            <a:schemeClr val="accent1"/>
+          </a:lnRef>
+          <a:fillRef idx="2">
+            <a:schemeClr val="accent1"/>
+          </a:fillRef>
+          <a:effectRef idx="1">
+            <a:schemeClr val="accent1"/>
+          </a:effectRef>
+          <a:fontRef idx="minor">
+            <a:schemeClr val="dk1"/>
+          </a:fontRef>
+        </p:style>
+      </p:cxnSp>
+      <p:sp>
+        <p:nvSpPr>
+          <p:cNvPr id="41" name="TextBox 40"/>
+          <p:cNvSpPr txBox="1"/>
+          <p:nvPr/>
+        </p:nvSpPr>
+        <p:spPr>
+          <a:xfrm>
+            <a:off x="7394835" y="2819400"/>
+            <a:ext cx="1175072" cy="184666"/>
+          </a:xfrm>
+          <a:prstGeom prst="rect">
+            <a:avLst/>
+          </a:prstGeom>
+          <a:noFill/>
+          <a:ln>
+            <a:noFill/>
+          </a:ln>
+        </p:spPr>
+        <p:txBody>
+          <a:bodyPr wrap="square" lIns="0" tIns="0" rIns="0" bIns="0" rtlCol="0">
+            <a:spAutoFit/>
+          </a:bodyPr>
+          <a:lstStyle>
+            <a:defPPr>
+              <a:defRPr lang="en-US"/>
+            </a:defPPr>
+            <a:lvl1pPr algn="r">
+              <a:defRPr sz="1400">
+                <a:solidFill>
+                  <a:srgbClr val="0070C0"/>
+                </a:solidFill>
+              </a:defRPr>
+            </a:lvl1pPr>
+          </a:lstStyle>
+          <a:p>
+            <a:r>
+              <a:rPr lang="en-US" sz="1200" dirty="0" err="1">
+                <a:solidFill>
+                  <a:schemeClr val="accent4">
+                    <a:lumMod val="75000"/>
+                  </a:schemeClr>
+                </a:solidFill>
+              </a:rPr>
+              <a:t>getCurrentLayer</a:t>
+            </a:r>
+            <a:r>
+              <a:rPr lang="en-US" sz="1200" dirty="0">
+                <a:solidFill>
+                  <a:schemeClr val="accent4">
+                    <a:lumMod val="75000"/>
+                  </a:schemeClr>
+                </a:solidFill>
+              </a:rPr>
+              <a:t>()</a:t>
+            </a:r>
+          </a:p>
+        </p:txBody>
+      </p:sp>
+      <p:cxnSp>
+        <p:nvCxnSpPr>
+          <p:cNvPr id="52" name="Straight Arrow Connector 51"/>
+          <p:cNvCxnSpPr>
+            <a:cxnSpLocks/>
+          </p:cNvCxnSpPr>
+          <p:nvPr/>
+        </p:nvCxnSpPr>
+        <p:spPr>
+          <a:xfrm>
+            <a:off x="7199826" y="3026895"/>
+            <a:ext cx="1470216" cy="0"/>
+          </a:xfrm>
+          <a:prstGeom prst="straightConnector1">
+            <a:avLst/>
+          </a:prstGeom>
+          <a:ln w="19050">
+            <a:solidFill>
+              <a:srgbClr val="7030A0"/>
+            </a:solidFill>
+            <a:tailEnd type="arrow"/>
+          </a:ln>
+        </p:spPr>
+        <p:style>
+          <a:lnRef idx="1">
+            <a:schemeClr val="accent1"/>
+          </a:lnRef>
+          <a:fillRef idx="0">
+            <a:schemeClr val="accent1"/>
+          </a:fillRef>
+          <a:effectRef idx="0">
+            <a:schemeClr val="accent1"/>
+          </a:effectRef>
+          <a:fontRef idx="minor">
+            <a:schemeClr val="tx1"/>
+          </a:fontRef>
+        </p:style>
+      </p:cxnSp>
+      <p:cxnSp>
+        <p:nvCxnSpPr>
+          <p:cNvPr id="60" name="Straight Arrow Connector 59">
+            <a:extLst>
+              <a:ext uri="{FF2B5EF4-FFF2-40B4-BE49-F238E27FC236}">
+                <a16:creationId xmlns:a16="http://schemas.microsoft.com/office/drawing/2014/main" id="{7C9F21BC-13A9-471F-825A-2621FD36355F}"/>
+              </a:ext>
+            </a:extLst>
+          </p:cNvPr>
+          <p:cNvCxnSpPr>
+            <a:cxnSpLocks/>
+          </p:cNvCxnSpPr>
+          <p:nvPr/>
+        </p:nvCxnSpPr>
+        <p:spPr>
+          <a:xfrm flipV="1">
+            <a:off x="7199826" y="3200400"/>
+            <a:ext cx="1470216" cy="6325"/>
+          </a:xfrm>
+          <a:prstGeom prst="straightConnector1">
+            <a:avLst/>
+          </a:prstGeom>
+          <a:ln w="19050">
+            <a:solidFill>
+              <a:srgbClr val="7030A0"/>
+            </a:solidFill>
+            <a:prstDash val="sysDash"/>
+            <a:headEnd type="arrow" w="med" len="med"/>
+            <a:tailEnd type="none" w="med" len="med"/>
+          </a:ln>
+        </p:spPr>
+        <p:style>
+          <a:lnRef idx="1">
+            <a:schemeClr val="accent1"/>
+          </a:lnRef>
+          <a:fillRef idx="0">
+            <a:schemeClr val="accent1"/>
+          </a:fillRef>
+          <a:effectRef idx="0">
+            <a:schemeClr val="accent1"/>
+          </a:effectRef>
+          <a:fontRef idx="minor">
+            <a:schemeClr val="tx1"/>
+          </a:fontRef>
+        </p:style>
+      </p:cxnSp>
+      <p:cxnSp>
+        <p:nvCxnSpPr>
+          <p:cNvPr id="63" name="Straight Arrow Connector 62">
+            <a:extLst>
+              <a:ext uri="{FF2B5EF4-FFF2-40B4-BE49-F238E27FC236}">
+                <a16:creationId xmlns:a16="http://schemas.microsoft.com/office/drawing/2014/main" id="{7C9F21BC-13A9-471F-825A-2621FD36355F}"/>
+              </a:ext>
+            </a:extLst>
+          </p:cNvPr>
+          <p:cNvCxnSpPr>
+            <a:cxnSpLocks/>
+            <a:endCxn id="49" idx="2"/>
+          </p:cNvCxnSpPr>
+          <p:nvPr/>
+        </p:nvCxnSpPr>
+        <p:spPr>
+          <a:xfrm>
+            <a:off x="5685755" y="3333825"/>
+            <a:ext cx="1433860" cy="0"/>
+          </a:xfrm>
+          <a:prstGeom prst="straightConnector1">
+            <a:avLst/>
+          </a:prstGeom>
+          <a:ln w="19050">
+            <a:solidFill>
+              <a:srgbClr val="7030A0"/>
+            </a:solidFill>
+            <a:prstDash val="sysDash"/>
+            <a:headEnd type="arrow" w="med" len="med"/>
+            <a:tailEnd type="none" w="med" len="med"/>
+          </a:ln>
+        </p:spPr>
+        <p:style>
+          <a:lnRef idx="1">
+            <a:schemeClr val="accent1"/>
+          </a:lnRef>
+          <a:fillRef idx="0">
+            <a:schemeClr val="accent1"/>
+          </a:fillRef>
+          <a:effectRef idx="0">
+            <a:schemeClr val="accent1"/>
+          </a:effectRef>
+          <a:fontRef idx="minor">
+            <a:schemeClr val="tx1"/>
+          </a:fontRef>
+        </p:style>
+      </p:cxnSp>
+      <p:cxnSp>
+        <p:nvCxnSpPr>
+          <p:cNvPr id="53" name="Straight Arrow Connector 52">
+            <a:extLst>
+              <a:ext uri="{FF2B5EF4-FFF2-40B4-BE49-F238E27FC236}">
+                <a16:creationId xmlns:a16="http://schemas.microsoft.com/office/drawing/2014/main" id="{9999E18B-C748-464D-9C7F-6DA4D6B04A30}"/>
+              </a:ext>
+            </a:extLst>
+          </p:cNvPr>
+          <p:cNvCxnSpPr>
+            <a:cxnSpLocks/>
+          </p:cNvCxnSpPr>
+          <p:nvPr/>
+        </p:nvCxnSpPr>
+        <p:spPr>
+          <a:xfrm>
+            <a:off x="8797638" y="3040939"/>
+            <a:ext cx="1470216" cy="0"/>
+          </a:xfrm>
+          <a:prstGeom prst="straightConnector1">
+            <a:avLst/>
+          </a:prstGeom>
+          <a:ln w="19050">
+            <a:solidFill>
+              <a:srgbClr val="7030A0"/>
+            </a:solidFill>
+            <a:tailEnd type="arrow"/>
+          </a:ln>
+        </p:spPr>
+        <p:style>
+          <a:lnRef idx="1">
+            <a:schemeClr val="accent1"/>
+          </a:lnRef>
+          <a:fillRef idx="0">
+            <a:schemeClr val="accent1"/>
+          </a:fillRef>
+          <a:effectRef idx="0">
+            <a:schemeClr val="accent1"/>
+          </a:effectRef>
+          <a:fontRef idx="minor">
+            <a:schemeClr val="tx1"/>
+          </a:fontRef>
+        </p:style>
+      </p:cxnSp>
+      <p:sp>
+        <p:nvSpPr>
+          <p:cNvPr id="68" name="TextBox 67">
+            <a:extLst>
+              <a:ext uri="{FF2B5EF4-FFF2-40B4-BE49-F238E27FC236}">
+                <a16:creationId xmlns:a16="http://schemas.microsoft.com/office/drawing/2014/main" id="{97EAC605-6CD7-964D-B391-19A3747A5F74}"/>
+              </a:ext>
+            </a:extLst>
+          </p:cNvPr>
+          <p:cNvSpPr txBox="1"/>
+          <p:nvPr/>
+        </p:nvSpPr>
+        <p:spPr>
+          <a:xfrm>
+            <a:off x="8852409" y="2835906"/>
+            <a:ext cx="1297860" cy="184666"/>
+          </a:xfrm>
+          <a:prstGeom prst="rect">
+            <a:avLst/>
+          </a:prstGeom>
+          <a:noFill/>
+          <a:ln>
+            <a:noFill/>
+          </a:ln>
+        </p:spPr>
+        <p:txBody>
+          <a:bodyPr wrap="square" lIns="0" tIns="0" rIns="0" bIns="0" rtlCol="0">
+            <a:spAutoFit/>
+          </a:bodyPr>
+          <a:lstStyle>
+            <a:defPPr>
+              <a:defRPr lang="en-US"/>
+            </a:defPPr>
+            <a:lvl1pPr algn="r">
+              <a:defRPr sz="1400">
+                <a:solidFill>
+                  <a:srgbClr val="0070C0"/>
+                </a:solidFill>
+              </a:defRPr>
+            </a:lvl1pPr>
+          </a:lstStyle>
+          <a:p>
+            <a:r>
+              <a:rPr lang="en-US" sz="1200" dirty="0" err="1">
+                <a:solidFill>
+                  <a:schemeClr val="accent4">
+                    <a:lumMod val="75000"/>
+                  </a:schemeClr>
+                </a:solidFill>
+              </a:rPr>
+              <a:t>addTransformation</a:t>
+            </a:r>
+            <a:r>
+              <a:rPr lang="en-US" sz="1200" dirty="0">
+                <a:solidFill>
+                  <a:schemeClr val="accent4">
+                    <a:lumMod val="75000"/>
+                  </a:schemeClr>
+                </a:solidFill>
+              </a:rPr>
+              <a:t>()</a:t>
+            </a:r>
+          </a:p>
+        </p:txBody>
+      </p:sp>
+      <p:cxnSp>
+        <p:nvCxnSpPr>
+          <p:cNvPr id="70" name="Straight Connector 69">
+            <a:extLst>
+              <a:ext uri="{FF2B5EF4-FFF2-40B4-BE49-F238E27FC236}">
+                <a16:creationId xmlns:a16="http://schemas.microsoft.com/office/drawing/2014/main" id="{D5B44BAD-122F-EC44-9E14-F641648C5E69}"/>
+              </a:ext>
+            </a:extLst>
+          </p:cNvPr>
+          <p:cNvCxnSpPr>
+            <a:cxnSpLocks/>
+          </p:cNvCxnSpPr>
+          <p:nvPr/>
+        </p:nvCxnSpPr>
+        <p:spPr>
+          <a:xfrm>
+            <a:off x="10312669" y="2591793"/>
+            <a:ext cx="9138" cy="2428274"/>
+          </a:xfrm>
+          <a:prstGeom prst="line">
+            <a:avLst/>
+          </a:prstGeom>
+          <a:ln w="19050">
+            <a:solidFill>
+              <a:srgbClr val="7030A0"/>
+            </a:solidFill>
+            <a:prstDash val="sysDash"/>
+          </a:ln>
+          <a:effectLst/>
+        </p:spPr>
+        <p:style>
+          <a:lnRef idx="1">
+            <a:schemeClr val="accent1"/>
+          </a:lnRef>
+          <a:fillRef idx="2">
+            <a:schemeClr val="accent1"/>
+          </a:fillRef>
+          <a:effectRef idx="1">
+            <a:schemeClr val="accent1"/>
+          </a:effectRef>
+          <a:fontRef idx="minor">
+            <a:schemeClr val="dk1"/>
+          </a:fontRef>
+        </p:style>
+      </p:cxnSp>
+      <p:sp>
+        <p:nvSpPr>
+          <p:cNvPr id="71" name="Rectangle 70">
+            <a:extLst>
+              <a:ext uri="{FF2B5EF4-FFF2-40B4-BE49-F238E27FC236}">
+                <a16:creationId xmlns:a16="http://schemas.microsoft.com/office/drawing/2014/main" id="{6EF4DA53-E32B-6543-BEA9-163FB9D8318A}"/>
+              </a:ext>
+            </a:extLst>
+          </p:cNvPr>
+          <p:cNvSpPr/>
+          <p:nvPr/>
+        </p:nvSpPr>
+        <p:spPr>
+          <a:xfrm>
+            <a:off x="10249765" y="2999567"/>
+            <a:ext cx="141935" cy="195819"/>
+          </a:xfrm>
+          <a:prstGeom prst="rect">
+            <a:avLst/>
+          </a:prstGeom>
+          <a:solidFill>
+            <a:srgbClr val="7030A0"/>
+          </a:solidFill>
+          <a:ln>
+            <a:solidFill>
+              <a:srgbClr val="7030A0"/>
+            </a:solidFill>
+          </a:ln>
+          <a:effectLst/>
+        </p:spPr>
+        <p:style>
+          <a:lnRef idx="1">
+            <a:schemeClr val="accent3"/>
+          </a:lnRef>
+          <a:fillRef idx="2">
+            <a:schemeClr val="accent3"/>
+          </a:fillRef>
+          <a:effectRef idx="1">
+            <a:schemeClr val="accent3"/>
+          </a:effectRef>
+          <a:fontRef idx="minor">
+            <a:schemeClr val="dk1"/>
+          </a:fontRef>
+        </p:style>
+        <p:txBody>
+          <a:bodyPr rtlCol="0" anchor="ctr"/>
+          <a:lstStyle/>
+          <a:p>
+            <a:pPr algn="ctr"/>
+            <a:endParaRPr lang="en-SG" sz="1400" dirty="0"/>
+          </a:p>
+        </p:txBody>
+      </p:sp>
+      <p:cxnSp>
+        <p:nvCxnSpPr>
+          <p:cNvPr id="73" name="Straight Arrow Connector 72">
+            <a:extLst>
+              <a:ext uri="{FF2B5EF4-FFF2-40B4-BE49-F238E27FC236}">
+                <a16:creationId xmlns:a16="http://schemas.microsoft.com/office/drawing/2014/main" id="{61B91CAA-29D9-204D-867F-0D964C2B1C33}"/>
+              </a:ext>
+            </a:extLst>
+          </p:cNvPr>
+          <p:cNvCxnSpPr>
+            <a:cxnSpLocks/>
+          </p:cNvCxnSpPr>
+          <p:nvPr/>
+        </p:nvCxnSpPr>
+        <p:spPr>
+          <a:xfrm flipV="1">
+            <a:off x="8777706" y="3153094"/>
+            <a:ext cx="1470216" cy="6325"/>
+          </a:xfrm>
+          <a:prstGeom prst="straightConnector1">
+            <a:avLst/>
+          </a:prstGeom>
+          <a:ln w="19050">
+            <a:solidFill>
+              <a:srgbClr val="7030A0"/>
+            </a:solidFill>
+            <a:prstDash val="sysDash"/>
+            <a:headEnd type="arrow" w="med" len="med"/>
+            <a:tailEnd type="none" w="med" len="med"/>
+          </a:ln>
+        </p:spPr>
+        <p:style>
+          <a:lnRef idx="1">
+            <a:schemeClr val="accent1"/>
+          </a:lnRef>
+          <a:fillRef idx="0">
+            <a:schemeClr val="accent1"/>
+          </a:fillRef>
+          <a:effectRef idx="0">
+            <a:schemeClr val="accent1"/>
+          </a:effectRef>
+          <a:fontRef idx="minor">
+            <a:schemeClr val="tx1"/>
+          </a:fontRef>
+        </p:style>
+      </p:cxnSp>
+      <p:sp>
+        <p:nvSpPr>
+          <p:cNvPr id="77" name="Rectangle 62">
+            <a:extLst>
+              <a:ext uri="{FF2B5EF4-FFF2-40B4-BE49-F238E27FC236}">
+                <a16:creationId xmlns:a16="http://schemas.microsoft.com/office/drawing/2014/main" id="{A6DFBFC6-5D15-8848-9907-068558B6E5CD}"/>
+              </a:ext>
+            </a:extLst>
+          </p:cNvPr>
+          <p:cNvSpPr/>
+          <p:nvPr/>
+        </p:nvSpPr>
+        <p:spPr>
+          <a:xfrm>
+            <a:off x="9704813" y="2448844"/>
+            <a:ext cx="908780" cy="250672"/>
+          </a:xfrm>
+          <a:prstGeom prst="rect">
+            <a:avLst/>
+          </a:prstGeom>
+          <a:solidFill>
+            <a:srgbClr val="7030A0"/>
+          </a:solidFill>
+          <a:ln w="19050">
+            <a:solidFill>
+              <a:srgbClr val="7030A0"/>
+            </a:solidFill>
+          </a:ln>
+          <a:effectLst/>
+        </p:spPr>
+        <p:style>
+          <a:lnRef idx="1">
+            <a:schemeClr val="accent2"/>
+          </a:lnRef>
+          <a:fillRef idx="2">
+            <a:schemeClr val="accent2"/>
+          </a:fillRef>
+          <a:effectRef idx="1">
+            <a:schemeClr val="accent2"/>
+          </a:effectRef>
+          <a:fontRef idx="minor">
+            <a:schemeClr val="dk1"/>
+          </a:fontRef>
+        </p:style>
+        <p:txBody>
+          <a:bodyPr rtlCol="0" anchor="ctr"/>
+          <a:lstStyle/>
+          <a:p>
+            <a:pPr algn="ctr"/>
+            <a:r>
+              <a:rPr lang="en-US" sz="1600" dirty="0">
+                <a:solidFill>
+                  <a:schemeClr val="bg1"/>
+                </a:solidFill>
+              </a:rPr>
+              <a:t>: Layer</a:t>
+            </a:r>
+            <a:endParaRPr lang="en-SG" sz="1600" dirty="0">
+              <a:solidFill>
+                <a:schemeClr val="bg1"/>
+              </a:solidFill>
+            </a:endParaRPr>
+          </a:p>
+        </p:txBody>
+      </p:sp>
+      <p:sp>
+        <p:nvSpPr>
+          <p:cNvPr id="78" name="TextBox 77">
+            <a:extLst>
+              <a:ext uri="{FF2B5EF4-FFF2-40B4-BE49-F238E27FC236}">
+                <a16:creationId xmlns:a16="http://schemas.microsoft.com/office/drawing/2014/main" id="{0772AC28-6CCA-D043-ABB2-97A18FBB6317}"/>
+              </a:ext>
+            </a:extLst>
+          </p:cNvPr>
+          <p:cNvSpPr txBox="1"/>
+          <p:nvPr/>
+        </p:nvSpPr>
+        <p:spPr>
+          <a:xfrm>
+            <a:off x="6987213" y="5029200"/>
+            <a:ext cx="258404" cy="261610"/>
+          </a:xfrm>
+          <a:prstGeom prst="rect">
+            <a:avLst/>
+          </a:prstGeom>
+          <a:noFill/>
+        </p:spPr>
+        <p:txBody>
+          <a:bodyPr wrap="none" rtlCol="0">
+            <a:spAutoFit/>
+          </a:bodyPr>
+          <a:lstStyle/>
+          <a:p>
+            <a:r>
+              <a:rPr lang="en-SG" sz="1100" dirty="0">
+                <a:solidFill>
+                  <a:srgbClr val="002060"/>
+                </a:solidFill>
+              </a:rPr>
+              <a:t>X</a:t>
+            </a:r>
+          </a:p>
+        </p:txBody>
+      </p:sp>
+      <p:sp>
+        <p:nvSpPr>
+          <p:cNvPr id="85" name="TextBox 84">
+            <a:extLst>
+              <a:ext uri="{FF2B5EF4-FFF2-40B4-BE49-F238E27FC236}">
+                <a16:creationId xmlns:a16="http://schemas.microsoft.com/office/drawing/2014/main" id="{A2AA5E9C-667D-CD42-8A1D-D3C2929DECFA}"/>
+              </a:ext>
+            </a:extLst>
+          </p:cNvPr>
+          <p:cNvSpPr txBox="1"/>
+          <p:nvPr/>
+        </p:nvSpPr>
+        <p:spPr>
+          <a:xfrm>
+            <a:off x="8588301" y="5052620"/>
+            <a:ext cx="258404" cy="261610"/>
+          </a:xfrm>
+          <a:prstGeom prst="rect">
+            <a:avLst/>
+          </a:prstGeom>
+          <a:noFill/>
+        </p:spPr>
+        <p:txBody>
+          <a:bodyPr wrap="none" rtlCol="0">
+            <a:spAutoFit/>
+          </a:bodyPr>
+          <a:lstStyle/>
+          <a:p>
+            <a:r>
+              <a:rPr lang="en-SG" sz="1100" dirty="0">
+                <a:solidFill>
+                  <a:srgbClr val="002060"/>
+                </a:solidFill>
+              </a:rPr>
+              <a:t>X</a:t>
+            </a:r>
+          </a:p>
+        </p:txBody>
+      </p:sp>
+      <p:sp>
+        <p:nvSpPr>
+          <p:cNvPr id="87" name="TextBox 86">
+            <a:extLst>
+              <a:ext uri="{FF2B5EF4-FFF2-40B4-BE49-F238E27FC236}">
+                <a16:creationId xmlns:a16="http://schemas.microsoft.com/office/drawing/2014/main" id="{7E7616EC-8D41-B24C-8EA4-8F896C53E5F3}"/>
+              </a:ext>
+            </a:extLst>
+          </p:cNvPr>
+          <p:cNvSpPr txBox="1"/>
+          <p:nvPr/>
+        </p:nvSpPr>
+        <p:spPr>
+          <a:xfrm>
+            <a:off x="10197164" y="5040434"/>
+            <a:ext cx="258404" cy="261610"/>
+          </a:xfrm>
+          <a:prstGeom prst="rect">
+            <a:avLst/>
+          </a:prstGeom>
+          <a:noFill/>
+        </p:spPr>
+        <p:txBody>
+          <a:bodyPr wrap="none" rtlCol="0">
+            <a:spAutoFit/>
+          </a:bodyPr>
+          <a:lstStyle/>
+          <a:p>
+            <a:r>
+              <a:rPr lang="en-SG" sz="1100" dirty="0">
+                <a:solidFill>
+                  <a:srgbClr val="002060"/>
+                </a:solidFill>
+              </a:rPr>
+              <a:t>X</a:t>
+            </a:r>
+          </a:p>
+        </p:txBody>
+      </p:sp>
+    </p:spTree>
+    <p:extLst>
+      <p:ext uri="{BB962C8B-B14F-4D97-AF65-F5344CB8AC3E}">
+        <p14:creationId xmlns:p14="http://schemas.microsoft.com/office/powerpoint/2010/main" val="138082856"/>
       </p:ext>
     </p:extLst>
   </p:cSld>

</xml_diff>

<commit_message>
update errors in UGDG for select command
</commit_message>
<xml_diff>
--- a/docs/diagrams/CdSequenceDiagram.pptx
+++ b/docs/diagrams/CdSequenceDiagram.pptx
@@ -209,7 +209,7 @@
           <a:p>
             <a:fld id="{F5CC4B3F-88C1-4FFA-B1B6-F41C21DC6924}" type="datetimeFigureOut">
               <a:rPr lang="en-US" smtClean="0"/>
-              <a:t>10/24/18</a:t>
+              <a:t>11/2/2018</a:t>
             </a:fld>
             <a:endParaRPr lang="en-US"/>
           </a:p>
@@ -655,7 +655,7 @@
           <a:p>
             <a:fld id="{78C97017-6FC3-485B-9764-EAC9E56C1D49}" type="datetimeFigureOut">
               <a:rPr lang="en-US" smtClean="0"/>
-              <a:t>10/24/18</a:t>
+              <a:t>11/2/2018</a:t>
             </a:fld>
             <a:endParaRPr lang="en-US"/>
           </a:p>
@@ -823,7 +823,7 @@
           <a:p>
             <a:fld id="{78C97017-6FC3-485B-9764-EAC9E56C1D49}" type="datetimeFigureOut">
               <a:rPr lang="en-US" smtClean="0"/>
-              <a:t>10/24/18</a:t>
+              <a:t>11/2/2018</a:t>
             </a:fld>
             <a:endParaRPr lang="en-US"/>
           </a:p>
@@ -1001,7 +1001,7 @@
           <a:p>
             <a:fld id="{78C97017-6FC3-485B-9764-EAC9E56C1D49}" type="datetimeFigureOut">
               <a:rPr lang="en-US" smtClean="0"/>
-              <a:t>10/24/18</a:t>
+              <a:t>11/2/2018</a:t>
             </a:fld>
             <a:endParaRPr lang="en-US"/>
           </a:p>
@@ -1169,7 +1169,7 @@
           <a:p>
             <a:fld id="{78C97017-6FC3-485B-9764-EAC9E56C1D49}" type="datetimeFigureOut">
               <a:rPr lang="en-US" smtClean="0"/>
-              <a:t>10/24/18</a:t>
+              <a:t>11/2/2018</a:t>
             </a:fld>
             <a:endParaRPr lang="en-US"/>
           </a:p>
@@ -1414,7 +1414,7 @@
           <a:p>
             <a:fld id="{78C97017-6FC3-485B-9764-EAC9E56C1D49}" type="datetimeFigureOut">
               <a:rPr lang="en-US" smtClean="0"/>
-              <a:t>10/24/18</a:t>
+              <a:t>11/2/2018</a:t>
             </a:fld>
             <a:endParaRPr lang="en-US"/>
           </a:p>
@@ -1699,7 +1699,7 @@
           <a:p>
             <a:fld id="{78C97017-6FC3-485B-9764-EAC9E56C1D49}" type="datetimeFigureOut">
               <a:rPr lang="en-US" smtClean="0"/>
-              <a:t>10/24/18</a:t>
+              <a:t>11/2/2018</a:t>
             </a:fld>
             <a:endParaRPr lang="en-US"/>
           </a:p>
@@ -2118,7 +2118,7 @@
           <a:p>
             <a:fld id="{78C97017-6FC3-485B-9764-EAC9E56C1D49}" type="datetimeFigureOut">
               <a:rPr lang="en-US" smtClean="0"/>
-              <a:t>10/24/18</a:t>
+              <a:t>11/2/2018</a:t>
             </a:fld>
             <a:endParaRPr lang="en-US"/>
           </a:p>
@@ -2235,7 +2235,7 @@
           <a:p>
             <a:fld id="{78C97017-6FC3-485B-9764-EAC9E56C1D49}" type="datetimeFigureOut">
               <a:rPr lang="en-US" smtClean="0"/>
-              <a:t>10/24/18</a:t>
+              <a:t>11/2/2018</a:t>
             </a:fld>
             <a:endParaRPr lang="en-US"/>
           </a:p>
@@ -2330,7 +2330,7 @@
           <a:p>
             <a:fld id="{78C97017-6FC3-485B-9764-EAC9E56C1D49}" type="datetimeFigureOut">
               <a:rPr lang="en-US" smtClean="0"/>
-              <a:t>10/24/18</a:t>
+              <a:t>11/2/2018</a:t>
             </a:fld>
             <a:endParaRPr lang="en-US"/>
           </a:p>
@@ -2605,7 +2605,7 @@
           <a:p>
             <a:fld id="{78C97017-6FC3-485B-9764-EAC9E56C1D49}" type="datetimeFigureOut">
               <a:rPr lang="en-US" smtClean="0"/>
-              <a:t>10/24/18</a:t>
+              <a:t>11/2/2018</a:t>
             </a:fld>
             <a:endParaRPr lang="en-US"/>
           </a:p>
@@ -2857,7 +2857,7 @@
           <a:p>
             <a:fld id="{78C97017-6FC3-485B-9764-EAC9E56C1D49}" type="datetimeFigureOut">
               <a:rPr lang="en-US" smtClean="0"/>
-              <a:t>10/24/18</a:t>
+              <a:t>11/2/2018</a:t>
             </a:fld>
             <a:endParaRPr lang="en-US"/>
           </a:p>
@@ -3068,7 +3068,7 @@
           <a:p>
             <a:fld id="{78C97017-6FC3-485B-9764-EAC9E56C1D49}" type="datetimeFigureOut">
               <a:rPr lang="en-US" smtClean="0"/>
-              <a:t>10/24/18</a:t>
+              <a:t>11/2/2018</a:t>
             </a:fld>
             <a:endParaRPr lang="en-US"/>
           </a:p>
@@ -3452,7 +3452,7 @@
         <p:spPr>
           <a:xfrm>
             <a:off x="6485114" y="163019"/>
-            <a:ext cx="3227206" cy="5247181"/>
+            <a:ext cx="3628192" cy="5247181"/>
           </a:xfrm>
           <a:prstGeom prst="roundRect">
             <a:avLst>
@@ -5290,8 +5290,8 @@
         </p:nvSpPr>
         <p:spPr>
           <a:xfrm>
-            <a:off x="7046040" y="4143873"/>
-            <a:ext cx="152505" cy="375718"/>
+            <a:off x="7046040" y="4143872"/>
+            <a:ext cx="168658" cy="504327"/>
           </a:xfrm>
           <a:prstGeom prst="rect">
             <a:avLst/>
@@ -5504,7 +5504,7 @@
         </p:nvCxnSpPr>
         <p:spPr>
           <a:xfrm flipV="1">
-            <a:off x="7202504" y="4386166"/>
+            <a:off x="7202504" y="4565675"/>
             <a:ext cx="1470216" cy="6325"/>
           </a:xfrm>
           <a:prstGeom prst="straightConnector1">
@@ -5545,13 +5545,12 @@
           </p:cNvPr>
           <p:cNvCxnSpPr>
             <a:cxnSpLocks/>
-            <a:endCxn id="54" idx="2"/>
           </p:cNvCxnSpPr>
           <p:nvPr/>
         </p:nvCxnSpPr>
         <p:spPr>
           <a:xfrm>
-            <a:off x="5685755" y="4519591"/>
+            <a:off x="5685755" y="4648200"/>
             <a:ext cx="1436538" cy="0"/>
           </a:xfrm>
           <a:prstGeom prst="straightConnector1">
@@ -5596,7 +5595,7 @@
         <p:spPr>
           <a:xfrm>
             <a:off x="8655703" y="4219083"/>
-            <a:ext cx="141935" cy="195819"/>
+            <a:ext cx="152505" cy="340267"/>
           </a:xfrm>
           <a:prstGeom prst="rect">
             <a:avLst/>
@@ -5649,7 +5648,7 @@
         <p:spPr>
           <a:xfrm>
             <a:off x="4267200" y="3657600"/>
-            <a:ext cx="5029200" cy="1107108"/>
+            <a:ext cx="5478942" cy="1107108"/>
           </a:xfrm>
           <a:prstGeom prst="rect">
             <a:avLst/>
@@ -5820,6 +5819,163 @@
                 </a:solidFill>
               </a:rPr>
               <a:t>(Path)</a:t>
+            </a:r>
+            <a:endParaRPr lang="en-US" sz="1200" dirty="0"/>
+          </a:p>
+        </p:txBody>
+      </p:sp>
+      <p:sp>
+        <p:nvSpPr>
+          <p:cNvPr id="53" name="Rectangle 52">
+            <a:extLst>
+              <a:ext uri="{FF2B5EF4-FFF2-40B4-BE49-F238E27FC236}">
+                <a16:creationId xmlns:a16="http://schemas.microsoft.com/office/drawing/2014/main" id="{8981ABCC-B479-4A68-B514-D6AF6E86CC49}"/>
+              </a:ext>
+            </a:extLst>
+          </p:cNvPr>
+          <p:cNvSpPr/>
+          <p:nvPr/>
+        </p:nvSpPr>
+        <p:spPr>
+          <a:xfrm>
+            <a:off x="8751113" y="4285074"/>
+            <a:ext cx="152505" cy="210726"/>
+          </a:xfrm>
+          <a:prstGeom prst="rect">
+            <a:avLst/>
+          </a:prstGeom>
+          <a:solidFill>
+            <a:srgbClr val="0070C0"/>
+          </a:solidFill>
+          <a:ln>
+            <a:solidFill>
+              <a:srgbClr val="0070C0"/>
+            </a:solidFill>
+          </a:ln>
+          <a:effectLst/>
+        </p:spPr>
+        <p:style>
+          <a:lnRef idx="1">
+            <a:schemeClr val="accent3"/>
+          </a:lnRef>
+          <a:fillRef idx="2">
+            <a:schemeClr val="accent3"/>
+          </a:fillRef>
+          <a:effectRef idx="1">
+            <a:schemeClr val="accent3"/>
+          </a:effectRef>
+          <a:fontRef idx="minor">
+            <a:schemeClr val="dk1"/>
+          </a:fontRef>
+        </p:style>
+        <p:txBody>
+          <a:bodyPr rtlCol="0" anchor="ctr"/>
+          <a:lstStyle/>
+          <a:p>
+            <a:pPr algn="ctr"/>
+            <a:endParaRPr lang="en-SG" sz="1400"/>
+          </a:p>
+        </p:txBody>
+      </p:sp>
+      <p:cxnSp>
+        <p:nvCxnSpPr>
+          <p:cNvPr id="7" name="Connector: Curved 6">
+            <a:extLst>
+              <a:ext uri="{FF2B5EF4-FFF2-40B4-BE49-F238E27FC236}">
+                <a16:creationId xmlns:a16="http://schemas.microsoft.com/office/drawing/2014/main" id="{C41B3580-4AAE-41A1-9266-3D21017BDE1A}"/>
+              </a:ext>
+            </a:extLst>
+          </p:cNvPr>
+          <p:cNvCxnSpPr>
+            <a:cxnSpLocks/>
+          </p:cNvCxnSpPr>
+          <p:nvPr/>
+        </p:nvCxnSpPr>
+        <p:spPr>
+          <a:xfrm>
+            <a:off x="8817900" y="4219083"/>
+            <a:ext cx="95410" cy="65991"/>
+          </a:xfrm>
+          <a:prstGeom prst="curvedConnector3">
+            <a:avLst>
+              <a:gd name="adj1" fmla="val 297584"/>
+            </a:avLst>
+          </a:prstGeom>
+          <a:ln>
+            <a:tailEnd type="triangle"/>
+          </a:ln>
+        </p:spPr>
+        <p:style>
+          <a:lnRef idx="1">
+            <a:schemeClr val="accent1"/>
+          </a:lnRef>
+          <a:fillRef idx="0">
+            <a:schemeClr val="accent1"/>
+          </a:fillRef>
+          <a:effectRef idx="0">
+            <a:schemeClr val="accent1"/>
+          </a:effectRef>
+          <a:fontRef idx="minor">
+            <a:schemeClr val="tx1"/>
+          </a:fontRef>
+        </p:style>
+      </p:cxnSp>
+      <p:sp>
+        <p:nvSpPr>
+          <p:cNvPr id="70" name="TextBox 69">
+            <a:extLst>
+              <a:ext uri="{FF2B5EF4-FFF2-40B4-BE49-F238E27FC236}">
+                <a16:creationId xmlns:a16="http://schemas.microsoft.com/office/drawing/2014/main" id="{9165B57B-BB9F-4951-A201-A3974E13F00C}"/>
+              </a:ext>
+            </a:extLst>
+          </p:cNvPr>
+          <p:cNvSpPr txBox="1"/>
+          <p:nvPr/>
+        </p:nvSpPr>
+        <p:spPr>
+          <a:xfrm>
+            <a:off x="8247122" y="4013725"/>
+            <a:ext cx="1422507" cy="184666"/>
+          </a:xfrm>
+          <a:prstGeom prst="rect">
+            <a:avLst/>
+          </a:prstGeom>
+          <a:noFill/>
+        </p:spPr>
+        <p:txBody>
+          <a:bodyPr wrap="square" lIns="0" tIns="0" rIns="0" bIns="0" rtlCol="0">
+            <a:spAutoFit/>
+          </a:bodyPr>
+          <a:lstStyle>
+            <a:defPPr>
+              <a:defRPr lang="en-US"/>
+            </a:defPPr>
+            <a:lvl1pPr algn="r">
+              <a:defRPr sz="1400">
+                <a:solidFill>
+                  <a:srgbClr val="0070C0"/>
+                </a:solidFill>
+              </a:defRPr>
+            </a:lvl1pPr>
+          </a:lstStyle>
+          <a:p>
+            <a:r>
+              <a:rPr lang="en-US" sz="1200" dirty="0" err="1">
+                <a:solidFill>
+                  <a:schemeClr val="accent4">
+                    <a:lumMod val="75000"/>
+                  </a:schemeClr>
+                </a:solidFill>
+              </a:rPr>
+              <a:t>initImageList</a:t>
+            </a:r>
+            <a:r>
+              <a:rPr lang="en-US" sz="1200" dirty="0">
+                <a:solidFill>
+                  <a:srgbClr val="7030A0"/>
+                </a:solidFill>
+              </a:rPr>
+              <a:t>()</a:t>
             </a:r>
             <a:endParaRPr lang="en-US" sz="1200" dirty="0"/>
           </a:p>

</xml_diff>

<commit_message>
Update sequence diagrams and ugdg
</commit_message>
<xml_diff>
--- a/docs/diagrams/CdSequenceDiagram.pptx
+++ b/docs/diagrams/CdSequenceDiagram.pptx
@@ -5,10 +5,11 @@
     <p:sldMasterId id="2147483648" r:id="rId1"/>
   </p:sldMasterIdLst>
   <p:notesMasterIdLst>
-    <p:notesMasterId r:id="rId3"/>
+    <p:notesMasterId r:id="rId4"/>
   </p:notesMasterIdLst>
   <p:sldIdLst>
     <p:sldId id="267" r:id="rId2"/>
+    <p:sldId id="268" r:id="rId3"/>
   </p:sldIdLst>
   <p:sldSz cx="9144000" cy="6858000" type="screen4x3"/>
   <p:notesSz cx="6858000" cy="9144000"/>
@@ -208,7 +209,7 @@
           <a:p>
             <a:fld id="{F5CC4B3F-88C1-4FFA-B1B6-F41C21DC6924}" type="datetimeFigureOut">
               <a:rPr lang="en-US" smtClean="0"/>
-              <a:t>11/2/18</a:t>
+              <a:t>11/12/2018</a:t>
             </a:fld>
             <a:endParaRPr lang="en-US"/>
           </a:p>
@@ -654,7 +655,7 @@
           <a:p>
             <a:fld id="{78C97017-6FC3-485B-9764-EAC9E56C1D49}" type="datetimeFigureOut">
               <a:rPr lang="en-US" smtClean="0"/>
-              <a:t>11/2/18</a:t>
+              <a:t>11/12/2018</a:t>
             </a:fld>
             <a:endParaRPr lang="en-US"/>
           </a:p>
@@ -822,7 +823,7 @@
           <a:p>
             <a:fld id="{78C97017-6FC3-485B-9764-EAC9E56C1D49}" type="datetimeFigureOut">
               <a:rPr lang="en-US" smtClean="0"/>
-              <a:t>11/2/18</a:t>
+              <a:t>11/12/2018</a:t>
             </a:fld>
             <a:endParaRPr lang="en-US"/>
           </a:p>
@@ -1000,7 +1001,7 @@
           <a:p>
             <a:fld id="{78C97017-6FC3-485B-9764-EAC9E56C1D49}" type="datetimeFigureOut">
               <a:rPr lang="en-US" smtClean="0"/>
-              <a:t>11/2/18</a:t>
+              <a:t>11/12/2018</a:t>
             </a:fld>
             <a:endParaRPr lang="en-US"/>
           </a:p>
@@ -1168,7 +1169,7 @@
           <a:p>
             <a:fld id="{78C97017-6FC3-485B-9764-EAC9E56C1D49}" type="datetimeFigureOut">
               <a:rPr lang="en-US" smtClean="0"/>
-              <a:t>11/2/18</a:t>
+              <a:t>11/12/2018</a:t>
             </a:fld>
             <a:endParaRPr lang="en-US"/>
           </a:p>
@@ -1413,7 +1414,7 @@
           <a:p>
             <a:fld id="{78C97017-6FC3-485B-9764-EAC9E56C1D49}" type="datetimeFigureOut">
               <a:rPr lang="en-US" smtClean="0"/>
-              <a:t>11/2/18</a:t>
+              <a:t>11/12/2018</a:t>
             </a:fld>
             <a:endParaRPr lang="en-US"/>
           </a:p>
@@ -1698,7 +1699,7 @@
           <a:p>
             <a:fld id="{78C97017-6FC3-485B-9764-EAC9E56C1D49}" type="datetimeFigureOut">
               <a:rPr lang="en-US" smtClean="0"/>
-              <a:t>11/2/18</a:t>
+              <a:t>11/12/2018</a:t>
             </a:fld>
             <a:endParaRPr lang="en-US"/>
           </a:p>
@@ -2117,7 +2118,7 @@
           <a:p>
             <a:fld id="{78C97017-6FC3-485B-9764-EAC9E56C1D49}" type="datetimeFigureOut">
               <a:rPr lang="en-US" smtClean="0"/>
-              <a:t>11/2/18</a:t>
+              <a:t>11/12/2018</a:t>
             </a:fld>
             <a:endParaRPr lang="en-US"/>
           </a:p>
@@ -2234,7 +2235,7 @@
           <a:p>
             <a:fld id="{78C97017-6FC3-485B-9764-EAC9E56C1D49}" type="datetimeFigureOut">
               <a:rPr lang="en-US" smtClean="0"/>
-              <a:t>11/2/18</a:t>
+              <a:t>11/12/2018</a:t>
             </a:fld>
             <a:endParaRPr lang="en-US"/>
           </a:p>
@@ -2329,7 +2330,7 @@
           <a:p>
             <a:fld id="{78C97017-6FC3-485B-9764-EAC9E56C1D49}" type="datetimeFigureOut">
               <a:rPr lang="en-US" smtClean="0"/>
-              <a:t>11/2/18</a:t>
+              <a:t>11/12/2018</a:t>
             </a:fld>
             <a:endParaRPr lang="en-US"/>
           </a:p>
@@ -2604,7 +2605,7 @@
           <a:p>
             <a:fld id="{78C97017-6FC3-485B-9764-EAC9E56C1D49}" type="datetimeFigureOut">
               <a:rPr lang="en-US" smtClean="0"/>
-              <a:t>11/2/18</a:t>
+              <a:t>11/12/2018</a:t>
             </a:fld>
             <a:endParaRPr lang="en-US"/>
           </a:p>
@@ -2856,7 +2857,7 @@
           <a:p>
             <a:fld id="{78C97017-6FC3-485B-9764-EAC9E56C1D49}" type="datetimeFigureOut">
               <a:rPr lang="en-US" smtClean="0"/>
-              <a:t>11/2/18</a:t>
+              <a:t>11/12/2018</a:t>
             </a:fld>
             <a:endParaRPr lang="en-US"/>
           </a:p>
@@ -3067,7 +3068,7 @@
           <a:p>
             <a:fld id="{78C97017-6FC3-485B-9764-EAC9E56C1D49}" type="datetimeFigureOut">
               <a:rPr lang="en-US" smtClean="0"/>
-              <a:t>11/2/18</a:t>
+              <a:t>11/12/2018</a:t>
             </a:fld>
             <a:endParaRPr lang="en-US"/>
           </a:p>
@@ -3451,7 +3452,7 @@
         <p:spPr>
           <a:xfrm>
             <a:off x="6485114" y="163019"/>
-            <a:ext cx="3227206" cy="5247181"/>
+            <a:ext cx="3878086" cy="6083849"/>
           </a:xfrm>
           <a:prstGeom prst="roundRect">
             <a:avLst>
@@ -3512,7 +3513,7 @@
         <p:spPr>
           <a:xfrm>
             <a:off x="467813" y="163018"/>
-            <a:ext cx="5863964" cy="5247182"/>
+            <a:ext cx="5863964" cy="6083850"/>
           </a:xfrm>
           <a:prstGeom prst="roundRect">
             <a:avLst>
@@ -3640,9 +3641,9 @@
           <p:nvPr/>
         </p:nvCxnSpPr>
         <p:spPr>
-          <a:xfrm>
-            <a:off x="1610959" y="907617"/>
-            <a:ext cx="0" cy="4350183"/>
+          <a:xfrm flipH="1">
+            <a:off x="1599768" y="907617"/>
+            <a:ext cx="11191" cy="5188383"/>
           </a:xfrm>
           <a:prstGeom prst="line">
             <a:avLst/>
@@ -3678,8 +3679,8 @@
         </p:nvSpPr>
         <p:spPr>
           <a:xfrm>
-            <a:off x="1530029" y="1258311"/>
-            <a:ext cx="161322" cy="3847087"/>
+            <a:off x="1530029" y="1258312"/>
+            <a:ext cx="148332" cy="4609088"/>
           </a:xfrm>
           <a:prstGeom prst="rect">
             <a:avLst/>
@@ -3725,8 +3726,8 @@
         </p:nvSpPr>
         <p:spPr>
           <a:xfrm>
-            <a:off x="3437188" y="423022"/>
-            <a:ext cx="1219200" cy="467684"/>
+            <a:off x="3437187" y="423022"/>
+            <a:ext cx="1455619" cy="467684"/>
           </a:xfrm>
           <a:prstGeom prst="rect">
             <a:avLst/>
@@ -3766,18 +3767,15 @@
                   <a:schemeClr val="bg1"/>
                 </a:solidFill>
               </a:rPr>
-              <a:t>:Address</a:t>
-            </a:r>
-          </a:p>
-          <a:p>
-            <a:pPr algn="ctr"/>
+              <a:t>:</a:t>
+            </a:r>
             <a:r>
               <a:rPr lang="en-US" sz="1600" dirty="0" err="1">
                 <a:solidFill>
                   <a:schemeClr val="bg1"/>
                 </a:solidFill>
               </a:rPr>
-              <a:t>BookParser</a:t>
+              <a:t>PiconsoParser</a:t>
             </a:r>
             <a:endParaRPr lang="en-SG" sz="1600" dirty="0">
               <a:solidFill>
@@ -3883,14 +3881,13 @@
           <p:cNvCxnSpPr>
             <a:cxnSpLocks/>
             <a:stCxn id="21" idx="0"/>
-            <a:endCxn id="4" idx="0"/>
           </p:cNvCxnSpPr>
           <p:nvPr/>
         </p:nvCxnSpPr>
         <p:spPr>
           <a:xfrm>
             <a:off x="5602082" y="1613633"/>
-            <a:ext cx="0" cy="3415567"/>
+            <a:ext cx="0" cy="4406167"/>
           </a:xfrm>
           <a:prstGeom prst="line">
             <a:avLst/>
@@ -4208,7 +4205,7 @@
         </p:nvCxnSpPr>
         <p:spPr>
           <a:xfrm>
-            <a:off x="380999" y="5105400"/>
+            <a:off x="403717" y="5861770"/>
             <a:ext cx="1196051" cy="0"/>
           </a:xfrm>
           <a:prstGeom prst="straightConnector1">
@@ -4246,8 +4243,8 @@
         </p:nvSpPr>
         <p:spPr>
           <a:xfrm>
-            <a:off x="5526488" y="2731313"/>
-            <a:ext cx="151794" cy="2178489"/>
+            <a:off x="5526489" y="2731314"/>
+            <a:ext cx="139020" cy="2998649"/>
           </a:xfrm>
           <a:prstGeom prst="rect">
             <a:avLst/>
@@ -4293,7 +4290,7 @@
         </p:nvSpPr>
         <p:spPr>
           <a:xfrm>
-            <a:off x="5636122" y="2748246"/>
+            <a:off x="5864722" y="2748246"/>
             <a:ext cx="1298078" cy="184666"/>
           </a:xfrm>
           <a:prstGeom prst="rect">
@@ -4392,7 +4389,7 @@
         </p:nvSpPr>
         <p:spPr>
           <a:xfrm>
-            <a:off x="3272755" y="4661356"/>
+            <a:off x="3273402" y="5486400"/>
             <a:ext cx="621216" cy="215444"/>
           </a:xfrm>
           <a:prstGeom prst="rect">
@@ -4432,7 +4429,7 @@
         </p:nvSpPr>
         <p:spPr>
           <a:xfrm>
-            <a:off x="645270" y="4860301"/>
+            <a:off x="667988" y="5616671"/>
             <a:ext cx="762000" cy="215444"/>
           </a:xfrm>
           <a:prstGeom prst="rect">
@@ -4472,7 +4469,7 @@
         </p:nvSpPr>
         <p:spPr>
           <a:xfrm>
-            <a:off x="8080635" y="2438400"/>
+            <a:off x="8537835" y="2438400"/>
             <a:ext cx="1294659" cy="244173"/>
           </a:xfrm>
           <a:prstGeom prst="rect">
@@ -4539,7 +4536,7 @@
         </p:nvSpPr>
         <p:spPr>
           <a:xfrm>
-            <a:off x="8655704" y="3010906"/>
+            <a:off x="9112904" y="3010906"/>
             <a:ext cx="141935" cy="195819"/>
           </a:xfrm>
           <a:prstGeom prst="rect">
@@ -4626,7 +4623,7 @@
         </p:nvSpPr>
         <p:spPr>
           <a:xfrm>
-            <a:off x="6705600" y="2362200"/>
+            <a:off x="7162800" y="2362200"/>
             <a:ext cx="841636" cy="300180"/>
           </a:xfrm>
           <a:prstGeom prst="rect">
@@ -4686,9 +4683,9 @@
           <p:nvPr/>
         </p:nvCxnSpPr>
         <p:spPr>
-          <a:xfrm>
-            <a:off x="7146286" y="2653306"/>
-            <a:ext cx="2486" cy="2417965"/>
+          <a:xfrm flipH="1">
+            <a:off x="7587326" y="2653306"/>
+            <a:ext cx="16161" cy="3366494"/>
           </a:xfrm>
           <a:prstGeom prst="line">
             <a:avLst/>
@@ -4724,7 +4721,7 @@
         </p:nvSpPr>
         <p:spPr>
           <a:xfrm>
-            <a:off x="7043362" y="2958107"/>
+            <a:off x="7500562" y="2958107"/>
             <a:ext cx="152505" cy="375718"/>
           </a:xfrm>
           <a:prstGeom prst="rect">
@@ -4773,8 +4770,8 @@
         </p:nvCxnSpPr>
         <p:spPr>
           <a:xfrm>
-            <a:off x="5685755" y="2975344"/>
-            <a:ext cx="1357607" cy="0"/>
+            <a:off x="5678282" y="2958107"/>
+            <a:ext cx="1822280" cy="1"/>
           </a:xfrm>
           <a:prstGeom prst="straightConnector1">
             <a:avLst/>
@@ -4809,7 +4806,7 @@
         </p:nvSpPr>
         <p:spPr>
           <a:xfrm>
-            <a:off x="5472880" y="5029200"/>
+            <a:off x="5453591" y="5985258"/>
             <a:ext cx="258404" cy="261610"/>
           </a:xfrm>
           <a:prstGeom prst="rect">
@@ -5012,7 +5009,7 @@
         </p:nvCxnSpPr>
         <p:spPr>
           <a:xfrm>
-            <a:off x="1691351" y="4909802"/>
+            <a:off x="1691998" y="5734846"/>
             <a:ext cx="3831517" cy="0"/>
           </a:xfrm>
           <a:prstGeom prst="straightConnector1">
@@ -5057,9 +5054,9 @@
           <p:nvPr/>
         </p:nvCxnSpPr>
         <p:spPr>
-          <a:xfrm>
-            <a:off x="8732283" y="2642997"/>
-            <a:ext cx="9138" cy="2428274"/>
+          <a:xfrm flipH="1">
+            <a:off x="9183871" y="2642997"/>
+            <a:ext cx="5612" cy="3342261"/>
           </a:xfrm>
           <a:prstGeom prst="line">
             <a:avLst/>
@@ -5095,7 +5092,7 @@
         </p:nvSpPr>
         <p:spPr>
           <a:xfrm>
-            <a:off x="7394835" y="2819400"/>
+            <a:off x="7852035" y="2819400"/>
             <a:ext cx="1175072" cy="184666"/>
           </a:xfrm>
           <a:prstGeom prst="rect">
@@ -5154,7 +5151,7 @@
         </p:nvCxnSpPr>
         <p:spPr>
           <a:xfrm>
-            <a:off x="7199826" y="3026895"/>
+            <a:off x="7657026" y="3026895"/>
             <a:ext cx="1470216" cy="0"/>
           </a:xfrm>
           <a:prstGeom prst="straightConnector1">
@@ -5198,7 +5195,7 @@
         </p:nvCxnSpPr>
         <p:spPr>
           <a:xfrm flipV="1">
-            <a:off x="7199826" y="3200400"/>
+            <a:off x="7657026" y="3200400"/>
             <a:ext cx="1470216" cy="6325"/>
           </a:xfrm>
           <a:prstGeom prst="straightConnector1">
@@ -5245,8 +5242,8 @@
         </p:nvCxnSpPr>
         <p:spPr>
           <a:xfrm>
-            <a:off x="5685755" y="3333825"/>
-            <a:ext cx="1433860" cy="0"/>
+            <a:off x="5665509" y="3333825"/>
+            <a:ext cx="1911306" cy="0"/>
           </a:xfrm>
           <a:prstGeom prst="straightConnector1">
             <a:avLst/>
@@ -5289,8 +5286,8 @@
         </p:nvSpPr>
         <p:spPr>
           <a:xfrm>
-            <a:off x="7046040" y="4143873"/>
-            <a:ext cx="152505" cy="375718"/>
+            <a:off x="7503240" y="3948293"/>
+            <a:ext cx="153786" cy="511193"/>
           </a:xfrm>
           <a:prstGeom prst="rect">
             <a:avLst/>
@@ -5344,8 +5341,8 @@
         </p:nvCxnSpPr>
         <p:spPr>
           <a:xfrm>
-            <a:off x="5685755" y="4167051"/>
-            <a:ext cx="1357607" cy="0"/>
+            <a:off x="5636122" y="3948293"/>
+            <a:ext cx="1864440" cy="0"/>
           </a:xfrm>
           <a:prstGeom prst="straightConnector1">
             <a:avLst/>
@@ -5386,8 +5383,8 @@
         </p:nvSpPr>
         <p:spPr>
           <a:xfrm>
-            <a:off x="5716820" y="3762952"/>
-            <a:ext cx="1368152" cy="369332"/>
+            <a:off x="5750166" y="3720006"/>
+            <a:ext cx="1678512" cy="184666"/>
           </a:xfrm>
           <a:prstGeom prst="rect">
             <a:avLst/>
@@ -5422,14 +5419,6 @@
               </a:rPr>
               <a:t>updateCurrDirectory</a:t>
             </a:r>
-            <a:endParaRPr lang="en-US" sz="1200" dirty="0">
-              <a:solidFill>
-                <a:srgbClr val="7030A0"/>
-              </a:solidFill>
-            </a:endParaRPr>
-          </a:p>
-          <a:p>
-            <a:pPr algn="ctr"/>
             <a:r>
               <a:rPr lang="en-US" sz="1200" dirty="0">
                 <a:solidFill>
@@ -5459,7 +5448,7 @@
         </p:nvCxnSpPr>
         <p:spPr>
           <a:xfrm>
-            <a:off x="7202504" y="4212661"/>
+            <a:off x="7659704" y="4017082"/>
             <a:ext cx="1470216" cy="0"/>
           </a:xfrm>
           <a:prstGeom prst="straightConnector1">
@@ -5503,7 +5492,7 @@
         </p:nvCxnSpPr>
         <p:spPr>
           <a:xfrm flipV="1">
-            <a:off x="7202504" y="4386166"/>
+            <a:off x="7668213" y="4400625"/>
             <a:ext cx="1470216" cy="6325"/>
           </a:xfrm>
           <a:prstGeom prst="straightConnector1">
@@ -5549,9 +5538,9 @@
           <p:nvPr/>
         </p:nvCxnSpPr>
         <p:spPr>
-          <a:xfrm>
-            <a:off x="5685755" y="4519591"/>
-            <a:ext cx="1436538" cy="0"/>
+          <a:xfrm flipV="1">
+            <a:off x="5665509" y="4459486"/>
+            <a:ext cx="1914624" cy="13346"/>
           </a:xfrm>
           <a:prstGeom prst="straightConnector1">
             <a:avLst/>
@@ -5594,8 +5583,8 @@
         </p:nvSpPr>
         <p:spPr>
           <a:xfrm>
-            <a:off x="8655703" y="4219083"/>
-            <a:ext cx="141935" cy="195819"/>
+            <a:off x="9112903" y="4013835"/>
+            <a:ext cx="170354" cy="393115"/>
           </a:xfrm>
           <a:prstGeom prst="rect">
             <a:avLst/>
@@ -5647,8 +5636,8 @@
         </p:nvSpPr>
         <p:spPr>
           <a:xfrm>
-            <a:off x="4267200" y="3657600"/>
-            <a:ext cx="5029200" cy="1107108"/>
+            <a:off x="4267200" y="3462020"/>
+            <a:ext cx="5626948" cy="1183975"/>
           </a:xfrm>
           <a:prstGeom prst="rect">
             <a:avLst/>
@@ -5677,46 +5666,6 @@
           <a:p>
             <a:pPr algn="ctr"/>
             <a:endParaRPr lang="en-SG"/>
-          </a:p>
-        </p:txBody>
-      </p:sp>
-      <p:sp>
-        <p:nvSpPr>
-          <p:cNvPr id="32" name="TextBox 31">
-            <a:extLst>
-              <a:ext uri="{FF2B5EF4-FFF2-40B4-BE49-F238E27FC236}">
-                <a16:creationId xmlns:a16="http://schemas.microsoft.com/office/drawing/2014/main" id="{A50659C5-B41E-47DE-B520-5B9E76BB9592}"/>
-              </a:ext>
-            </a:extLst>
-          </p:cNvPr>
-          <p:cNvSpPr txBox="1"/>
-          <p:nvPr/>
-        </p:nvSpPr>
-        <p:spPr>
-          <a:xfrm>
-            <a:off x="4267200" y="3657600"/>
-            <a:ext cx="414313" cy="276999"/>
-          </a:xfrm>
-          <a:prstGeom prst="rect">
-            <a:avLst/>
-          </a:prstGeom>
-          <a:noFill/>
-          <a:ln w="28575">
-            <a:solidFill>
-              <a:schemeClr val="tx2"/>
-            </a:solidFill>
-          </a:ln>
-        </p:spPr>
-        <p:txBody>
-          <a:bodyPr wrap="square" rtlCol="0">
-            <a:spAutoFit/>
-          </a:bodyPr>
-          <a:lstStyle/>
-          <a:p>
-            <a:r>
-              <a:rPr lang="en-SG" sz="1200" dirty="0"/>
-              <a:t>opt</a:t>
-            </a:r>
           </a:p>
         </p:txBody>
       </p:sp>
@@ -5734,7 +5683,7 @@
         </p:nvSpPr>
         <p:spPr>
           <a:xfrm>
-            <a:off x="4625533" y="3672990"/>
+            <a:off x="4579997" y="3459622"/>
             <a:ext cx="976549" cy="261610"/>
           </a:xfrm>
           <a:prstGeom prst="rect">
@@ -5777,7 +5726,7 @@
         </p:nvSpPr>
         <p:spPr>
           <a:xfrm>
-            <a:off x="7264293" y="3962400"/>
+            <a:off x="7721493" y="3766821"/>
             <a:ext cx="1422507" cy="184666"/>
           </a:xfrm>
           <a:prstGeom prst="rect">
@@ -5824,10 +5773,3486 @@
           </a:p>
         </p:txBody>
       </p:sp>
+      <p:sp>
+        <p:nvSpPr>
+          <p:cNvPr id="8" name="Rectangle: Single Corner Snipped 7">
+            <a:extLst>
+              <a:ext uri="{FF2B5EF4-FFF2-40B4-BE49-F238E27FC236}">
+                <a16:creationId xmlns:a16="http://schemas.microsoft.com/office/drawing/2014/main" id="{0CF7D104-D0FF-44E9-BE41-49046D1F071B}"/>
+              </a:ext>
+            </a:extLst>
+          </p:cNvPr>
+          <p:cNvSpPr/>
+          <p:nvPr/>
+        </p:nvSpPr>
+        <p:spPr>
+          <a:xfrm flipV="1">
+            <a:off x="4272419" y="3462020"/>
+            <a:ext cx="346080" cy="276997"/>
+          </a:xfrm>
+          <a:prstGeom prst="snip1Rect">
+            <a:avLst>
+              <a:gd name="adj" fmla="val 38996"/>
+            </a:avLst>
+          </a:prstGeom>
+          <a:noFill/>
+        </p:spPr>
+        <p:style>
+          <a:lnRef idx="2">
+            <a:schemeClr val="accent1">
+              <a:shade val="50000"/>
+            </a:schemeClr>
+          </a:lnRef>
+          <a:fillRef idx="1">
+            <a:schemeClr val="accent1"/>
+          </a:fillRef>
+          <a:effectRef idx="0">
+            <a:schemeClr val="accent1"/>
+          </a:effectRef>
+          <a:fontRef idx="minor">
+            <a:schemeClr val="lt1"/>
+          </a:fontRef>
+        </p:style>
+        <p:txBody>
+          <a:bodyPr rtlCol="0" anchor="ctr"/>
+          <a:lstStyle/>
+          <a:p>
+            <a:pPr algn="ctr"/>
+            <a:endParaRPr lang="en-SG" dirty="0"/>
+          </a:p>
+        </p:txBody>
+      </p:sp>
+      <p:sp>
+        <p:nvSpPr>
+          <p:cNvPr id="9" name="TextBox 8">
+            <a:extLst>
+              <a:ext uri="{FF2B5EF4-FFF2-40B4-BE49-F238E27FC236}">
+                <a16:creationId xmlns:a16="http://schemas.microsoft.com/office/drawing/2014/main" id="{94EFD02E-9FFF-442A-82F3-C8A93DA0B0A2}"/>
+              </a:ext>
+            </a:extLst>
+          </p:cNvPr>
+          <p:cNvSpPr txBox="1"/>
+          <p:nvPr/>
+        </p:nvSpPr>
+        <p:spPr>
+          <a:xfrm>
+            <a:off x="4244255" y="3429000"/>
+            <a:ext cx="397160" cy="276999"/>
+          </a:xfrm>
+          <a:prstGeom prst="rect">
+            <a:avLst/>
+          </a:prstGeom>
+          <a:noFill/>
+        </p:spPr>
+        <p:txBody>
+          <a:bodyPr wrap="none" rtlCol="0">
+            <a:spAutoFit/>
+          </a:bodyPr>
+          <a:lstStyle/>
+          <a:p>
+            <a:r>
+              <a:rPr lang="en-SG" sz="1200" dirty="0"/>
+              <a:t>opt</a:t>
+            </a:r>
+          </a:p>
+        </p:txBody>
+      </p:sp>
+      <p:sp>
+        <p:nvSpPr>
+          <p:cNvPr id="85" name="Rectangle 84">
+            <a:extLst>
+              <a:ext uri="{FF2B5EF4-FFF2-40B4-BE49-F238E27FC236}">
+                <a16:creationId xmlns:a16="http://schemas.microsoft.com/office/drawing/2014/main" id="{A356377D-328D-4337-A36A-328037B9E60D}"/>
+              </a:ext>
+            </a:extLst>
+          </p:cNvPr>
+          <p:cNvSpPr/>
+          <p:nvPr/>
+        </p:nvSpPr>
+        <p:spPr>
+          <a:xfrm>
+            <a:off x="9214562" y="4081918"/>
+            <a:ext cx="145274" cy="261481"/>
+          </a:xfrm>
+          <a:prstGeom prst="rect">
+            <a:avLst/>
+          </a:prstGeom>
+          <a:solidFill>
+            <a:srgbClr val="0070C0"/>
+          </a:solidFill>
+          <a:ln>
+            <a:solidFill>
+              <a:srgbClr val="0070C0"/>
+            </a:solidFill>
+          </a:ln>
+          <a:effectLst/>
+        </p:spPr>
+        <p:style>
+          <a:lnRef idx="1">
+            <a:schemeClr val="accent3"/>
+          </a:lnRef>
+          <a:fillRef idx="2">
+            <a:schemeClr val="accent3"/>
+          </a:fillRef>
+          <a:effectRef idx="1">
+            <a:schemeClr val="accent3"/>
+          </a:effectRef>
+          <a:fontRef idx="minor">
+            <a:schemeClr val="dk1"/>
+          </a:fontRef>
+        </p:style>
+        <p:txBody>
+          <a:bodyPr rtlCol="0" anchor="ctr"/>
+          <a:lstStyle/>
+          <a:p>
+            <a:pPr algn="ctr"/>
+            <a:endParaRPr lang="en-SG" sz="1400">
+              <a:solidFill>
+                <a:schemeClr val="dk1"/>
+              </a:solidFill>
+            </a:endParaRPr>
+          </a:p>
+        </p:txBody>
+      </p:sp>
+      <p:cxnSp>
+        <p:nvCxnSpPr>
+          <p:cNvPr id="15" name="Connector: Curved 14">
+            <a:extLst>
+              <a:ext uri="{FF2B5EF4-FFF2-40B4-BE49-F238E27FC236}">
+                <a16:creationId xmlns:a16="http://schemas.microsoft.com/office/drawing/2014/main" id="{86FA3D67-530A-4704-B964-F1A65B9FF55A}"/>
+              </a:ext>
+            </a:extLst>
+          </p:cNvPr>
+          <p:cNvCxnSpPr>
+            <a:cxnSpLocks/>
+          </p:cNvCxnSpPr>
+          <p:nvPr/>
+        </p:nvCxnSpPr>
+        <p:spPr>
+          <a:xfrm>
+            <a:off x="9266057" y="4024210"/>
+            <a:ext cx="97718" cy="53409"/>
+          </a:xfrm>
+          <a:prstGeom prst="curvedConnector3">
+            <a:avLst>
+              <a:gd name="adj1" fmla="val 268343"/>
+            </a:avLst>
+          </a:prstGeom>
+          <a:ln>
+            <a:tailEnd type="triangle"/>
+          </a:ln>
+        </p:spPr>
+        <p:style>
+          <a:lnRef idx="1">
+            <a:schemeClr val="accent1"/>
+          </a:lnRef>
+          <a:fillRef idx="0">
+            <a:schemeClr val="accent1"/>
+          </a:fillRef>
+          <a:effectRef idx="0">
+            <a:schemeClr val="accent1"/>
+          </a:effectRef>
+          <a:fontRef idx="minor">
+            <a:schemeClr val="tx1"/>
+          </a:fontRef>
+        </p:style>
+      </p:cxnSp>
+      <p:sp>
+        <p:nvSpPr>
+          <p:cNvPr id="90" name="TextBox 89">
+            <a:extLst>
+              <a:ext uri="{FF2B5EF4-FFF2-40B4-BE49-F238E27FC236}">
+                <a16:creationId xmlns:a16="http://schemas.microsoft.com/office/drawing/2014/main" id="{8122BBE6-B239-49D1-A487-42FDF80C3F07}"/>
+              </a:ext>
+            </a:extLst>
+          </p:cNvPr>
+          <p:cNvSpPr txBox="1"/>
+          <p:nvPr/>
+        </p:nvSpPr>
+        <p:spPr>
+          <a:xfrm>
+            <a:off x="8712093" y="3797050"/>
+            <a:ext cx="1422507" cy="184666"/>
+          </a:xfrm>
+          <a:prstGeom prst="rect">
+            <a:avLst/>
+          </a:prstGeom>
+          <a:noFill/>
+        </p:spPr>
+        <p:txBody>
+          <a:bodyPr wrap="square" lIns="0" tIns="0" rIns="0" bIns="0" rtlCol="0">
+            <a:spAutoFit/>
+          </a:bodyPr>
+          <a:lstStyle>
+            <a:defPPr>
+              <a:defRPr lang="en-US"/>
+            </a:defPPr>
+            <a:lvl1pPr algn="r">
+              <a:defRPr sz="1400">
+                <a:solidFill>
+                  <a:srgbClr val="0070C0"/>
+                </a:solidFill>
+              </a:defRPr>
+            </a:lvl1pPr>
+          </a:lstStyle>
+          <a:p>
+            <a:r>
+              <a:rPr lang="en-US" sz="1200" dirty="0" err="1">
+                <a:solidFill>
+                  <a:schemeClr val="accent4">
+                    <a:lumMod val="75000"/>
+                  </a:schemeClr>
+                </a:solidFill>
+              </a:rPr>
+              <a:t>initImageList</a:t>
+            </a:r>
+            <a:r>
+              <a:rPr lang="en-US" sz="1200" dirty="0">
+                <a:solidFill>
+                  <a:srgbClr val="7030A0"/>
+                </a:solidFill>
+              </a:rPr>
+              <a:t>()</a:t>
+            </a:r>
+            <a:endParaRPr lang="en-US" sz="1200" dirty="0"/>
+          </a:p>
+        </p:txBody>
+      </p:sp>
+      <p:sp>
+        <p:nvSpPr>
+          <p:cNvPr id="91" name="Rectangle 62">
+            <a:extLst>
+              <a:ext uri="{FF2B5EF4-FFF2-40B4-BE49-F238E27FC236}">
+                <a16:creationId xmlns:a16="http://schemas.microsoft.com/office/drawing/2014/main" id="{55953BB3-C92F-4C34-B460-C019F0B978B6}"/>
+              </a:ext>
+            </a:extLst>
+          </p:cNvPr>
+          <p:cNvSpPr/>
+          <p:nvPr/>
+        </p:nvSpPr>
+        <p:spPr>
+          <a:xfrm>
+            <a:off x="5827120" y="4740309"/>
+            <a:ext cx="1579824" cy="580894"/>
+          </a:xfrm>
+          <a:prstGeom prst="rect">
+            <a:avLst/>
+          </a:prstGeom>
+          <a:solidFill>
+            <a:srgbClr val="0070C0"/>
+          </a:solidFill>
+          <a:ln w="19050">
+            <a:solidFill>
+              <a:srgbClr val="0070C0"/>
+            </a:solidFill>
+          </a:ln>
+          <a:effectLst/>
+        </p:spPr>
+        <p:style>
+          <a:lnRef idx="1">
+            <a:schemeClr val="accent2"/>
+          </a:lnRef>
+          <a:fillRef idx="2">
+            <a:schemeClr val="accent2"/>
+          </a:fillRef>
+          <a:effectRef idx="1">
+            <a:schemeClr val="accent2"/>
+          </a:effectRef>
+          <a:fontRef idx="minor">
+            <a:schemeClr val="dk1"/>
+          </a:fontRef>
+        </p:style>
+        <p:txBody>
+          <a:bodyPr rtlCol="0" anchor="ctr"/>
+          <a:lstStyle/>
+          <a:p>
+            <a:pPr algn="ctr"/>
+            <a:r>
+              <a:rPr lang="en-US" sz="1600" dirty="0" err="1">
+                <a:solidFill>
+                  <a:schemeClr val="bg1"/>
+                </a:solidFill>
+              </a:rPr>
+              <a:t>result:CommandResult</a:t>
+            </a:r>
+            <a:endParaRPr lang="en-SG" sz="1600" dirty="0">
+              <a:solidFill>
+                <a:schemeClr val="bg1"/>
+              </a:solidFill>
+            </a:endParaRPr>
+          </a:p>
+        </p:txBody>
+      </p:sp>
+      <p:sp>
+        <p:nvSpPr>
+          <p:cNvPr id="92" name="Rectangle 91">
+            <a:extLst>
+              <a:ext uri="{FF2B5EF4-FFF2-40B4-BE49-F238E27FC236}">
+                <a16:creationId xmlns:a16="http://schemas.microsoft.com/office/drawing/2014/main" id="{627B6B61-442C-45D8-ACF2-9A9F329FA865}"/>
+              </a:ext>
+            </a:extLst>
+          </p:cNvPr>
+          <p:cNvSpPr/>
+          <p:nvPr/>
+        </p:nvSpPr>
+        <p:spPr>
+          <a:xfrm>
+            <a:off x="6532588" y="5294701"/>
+            <a:ext cx="145274" cy="261481"/>
+          </a:xfrm>
+          <a:prstGeom prst="rect">
+            <a:avLst/>
+          </a:prstGeom>
+          <a:solidFill>
+            <a:srgbClr val="0070C0"/>
+          </a:solidFill>
+          <a:ln>
+            <a:solidFill>
+              <a:srgbClr val="0070C0"/>
+            </a:solidFill>
+          </a:ln>
+          <a:effectLst/>
+        </p:spPr>
+        <p:style>
+          <a:lnRef idx="1">
+            <a:schemeClr val="accent3"/>
+          </a:lnRef>
+          <a:fillRef idx="2">
+            <a:schemeClr val="accent3"/>
+          </a:fillRef>
+          <a:effectRef idx="1">
+            <a:schemeClr val="accent3"/>
+          </a:effectRef>
+          <a:fontRef idx="minor">
+            <a:schemeClr val="dk1"/>
+          </a:fontRef>
+        </p:style>
+        <p:txBody>
+          <a:bodyPr rtlCol="0" anchor="ctr"/>
+          <a:lstStyle/>
+          <a:p>
+            <a:pPr algn="ctr"/>
+            <a:endParaRPr lang="en-SG" sz="1400">
+              <a:solidFill>
+                <a:schemeClr val="dk1"/>
+              </a:solidFill>
+            </a:endParaRPr>
+          </a:p>
+        </p:txBody>
+      </p:sp>
+      <p:cxnSp>
+        <p:nvCxnSpPr>
+          <p:cNvPr id="94" name="Straight Arrow Connector 93">
+            <a:extLst>
+              <a:ext uri="{FF2B5EF4-FFF2-40B4-BE49-F238E27FC236}">
+                <a16:creationId xmlns:a16="http://schemas.microsoft.com/office/drawing/2014/main" id="{1B98A87A-F84B-44EC-AE57-58070AC5CC38}"/>
+              </a:ext>
+            </a:extLst>
+          </p:cNvPr>
+          <p:cNvCxnSpPr>
+            <a:cxnSpLocks/>
+            <a:endCxn id="91" idx="1"/>
+          </p:cNvCxnSpPr>
+          <p:nvPr/>
+        </p:nvCxnSpPr>
+        <p:spPr>
+          <a:xfrm>
+            <a:off x="5685617" y="5029186"/>
+            <a:ext cx="141503" cy="1570"/>
+          </a:xfrm>
+          <a:prstGeom prst="straightConnector1">
+            <a:avLst/>
+          </a:prstGeom>
+          <a:ln w="19050">
+            <a:solidFill>
+              <a:srgbClr val="0070C0"/>
+            </a:solidFill>
+            <a:tailEnd type="arrow"/>
+          </a:ln>
+        </p:spPr>
+        <p:style>
+          <a:lnRef idx="1">
+            <a:schemeClr val="accent1"/>
+          </a:lnRef>
+          <a:fillRef idx="0">
+            <a:schemeClr val="accent1"/>
+          </a:fillRef>
+          <a:effectRef idx="0">
+            <a:schemeClr val="accent1"/>
+          </a:effectRef>
+          <a:fontRef idx="minor">
+            <a:schemeClr val="tx1"/>
+          </a:fontRef>
+        </p:style>
+      </p:cxnSp>
+      <p:cxnSp>
+        <p:nvCxnSpPr>
+          <p:cNvPr id="95" name="Straight Arrow Connector 94">
+            <a:extLst>
+              <a:ext uri="{FF2B5EF4-FFF2-40B4-BE49-F238E27FC236}">
+                <a16:creationId xmlns:a16="http://schemas.microsoft.com/office/drawing/2014/main" id="{71043923-E2EF-4783-B7BE-C120C3E158A3}"/>
+              </a:ext>
+            </a:extLst>
+          </p:cNvPr>
+          <p:cNvCxnSpPr>
+            <a:cxnSpLocks/>
+            <a:endCxn id="92" idx="2"/>
+          </p:cNvCxnSpPr>
+          <p:nvPr/>
+        </p:nvCxnSpPr>
+        <p:spPr>
+          <a:xfrm>
+            <a:off x="5678460" y="5556182"/>
+            <a:ext cx="926765" cy="0"/>
+          </a:xfrm>
+          <a:prstGeom prst="straightConnector1">
+            <a:avLst/>
+          </a:prstGeom>
+          <a:ln w="19050">
+            <a:solidFill>
+              <a:srgbClr val="0070C0"/>
+            </a:solidFill>
+            <a:prstDash val="sysDash"/>
+            <a:headEnd type="arrow" w="med" len="med"/>
+            <a:tailEnd type="none" w="med" len="med"/>
+          </a:ln>
+        </p:spPr>
+        <p:style>
+          <a:lnRef idx="1">
+            <a:schemeClr val="accent1"/>
+          </a:lnRef>
+          <a:fillRef idx="0">
+            <a:schemeClr val="accent1"/>
+          </a:fillRef>
+          <a:effectRef idx="0">
+            <a:schemeClr val="accent1"/>
+          </a:effectRef>
+          <a:fontRef idx="minor">
+            <a:schemeClr val="tx1"/>
+          </a:fontRef>
+        </p:style>
+      </p:cxnSp>
     </p:spTree>
     <p:extLst>
       <p:ext uri="{BB962C8B-B14F-4D97-AF65-F5344CB8AC3E}">
         <p14:creationId xmlns:p14="http://schemas.microsoft.com/office/powerpoint/2010/main" val="3945898909"/>
+      </p:ext>
+    </p:extLst>
+  </p:cSld>
+  <p:clrMapOvr>
+    <a:masterClrMapping/>
+  </p:clrMapOvr>
+</p:sld>
+</file>
+
+<file path=ppt/slides/slide2.xml><?xml version="1.0" encoding="utf-8"?>
+<p:sld xmlns:a="http://schemas.openxmlformats.org/drawingml/2006/main" xmlns:r="http://schemas.openxmlformats.org/officeDocument/2006/relationships" xmlns:p="http://schemas.openxmlformats.org/presentationml/2006/main">
+  <p:cSld>
+    <p:spTree>
+      <p:nvGrpSpPr>
+        <p:cNvPr id="1" name=""/>
+        <p:cNvGrpSpPr/>
+        <p:nvPr/>
+      </p:nvGrpSpPr>
+      <p:grpSpPr>
+        <a:xfrm>
+          <a:off x="0" y="0"/>
+          <a:ext cx="0" cy="0"/>
+          <a:chOff x="0" y="0"/>
+          <a:chExt cx="0" cy="0"/>
+        </a:xfrm>
+      </p:grpSpPr>
+      <p:sp>
+        <p:nvSpPr>
+          <p:cNvPr id="2" name="Rectangle 65">
+            <a:extLst>
+              <a:ext uri="{FF2B5EF4-FFF2-40B4-BE49-F238E27FC236}">
+                <a16:creationId xmlns:a16="http://schemas.microsoft.com/office/drawing/2014/main" id="{0DDF5937-41D4-40B3-B18A-D2FC75995558}"/>
+              </a:ext>
+            </a:extLst>
+          </p:cNvPr>
+          <p:cNvSpPr/>
+          <p:nvPr/>
+        </p:nvSpPr>
+        <p:spPr>
+          <a:xfrm>
+            <a:off x="6485114" y="163019"/>
+            <a:ext cx="3878086" cy="6083849"/>
+          </a:xfrm>
+          <a:prstGeom prst="roundRect">
+            <a:avLst>
+              <a:gd name="adj" fmla="val 3484"/>
+            </a:avLst>
+          </a:prstGeom>
+          <a:solidFill>
+            <a:schemeClr val="accent4">
+              <a:lumMod val="20000"/>
+              <a:lumOff val="80000"/>
+            </a:schemeClr>
+          </a:solidFill>
+          <a:ln w="19050">
+            <a:noFill/>
+          </a:ln>
+          <a:effectLst/>
+        </p:spPr>
+        <p:style>
+          <a:lnRef idx="1">
+            <a:schemeClr val="accent2"/>
+          </a:lnRef>
+          <a:fillRef idx="2">
+            <a:schemeClr val="accent2"/>
+          </a:fillRef>
+          <a:effectRef idx="1">
+            <a:schemeClr val="accent2"/>
+          </a:effectRef>
+          <a:fontRef idx="minor">
+            <a:schemeClr val="dk1"/>
+          </a:fontRef>
+        </p:style>
+        <p:txBody>
+          <a:bodyPr rtlCol="0" anchor="t"/>
+          <a:lstStyle/>
+          <a:p>
+            <a:r>
+              <a:rPr lang="en-US" sz="1200" b="1" dirty="0">
+                <a:solidFill>
+                  <a:srgbClr val="7030A0"/>
+                </a:solidFill>
+              </a:rPr>
+              <a:t>Model</a:t>
+            </a:r>
+            <a:endParaRPr lang="en-SG" sz="1200" b="1" dirty="0">
+              <a:solidFill>
+                <a:srgbClr val="7030A0"/>
+              </a:solidFill>
+            </a:endParaRPr>
+          </a:p>
+        </p:txBody>
+      </p:sp>
+      <p:sp>
+        <p:nvSpPr>
+          <p:cNvPr id="3" name="Rectangle 65">
+            <a:extLst>
+              <a:ext uri="{FF2B5EF4-FFF2-40B4-BE49-F238E27FC236}">
+                <a16:creationId xmlns:a16="http://schemas.microsoft.com/office/drawing/2014/main" id="{5A6B4454-C2E8-4F67-BC45-94D2307D5F62}"/>
+              </a:ext>
+            </a:extLst>
+          </p:cNvPr>
+          <p:cNvSpPr/>
+          <p:nvPr/>
+        </p:nvSpPr>
+        <p:spPr>
+          <a:xfrm>
+            <a:off x="467813" y="163018"/>
+            <a:ext cx="5863964" cy="6083850"/>
+          </a:xfrm>
+          <a:prstGeom prst="roundRect">
+            <a:avLst>
+              <a:gd name="adj" fmla="val 3484"/>
+            </a:avLst>
+          </a:prstGeom>
+          <a:solidFill>
+            <a:schemeClr val="accent1">
+              <a:lumMod val="20000"/>
+              <a:lumOff val="80000"/>
+            </a:schemeClr>
+          </a:solidFill>
+          <a:ln w="19050">
+            <a:noFill/>
+          </a:ln>
+          <a:effectLst/>
+        </p:spPr>
+        <p:style>
+          <a:lnRef idx="1">
+            <a:schemeClr val="accent2"/>
+          </a:lnRef>
+          <a:fillRef idx="2">
+            <a:schemeClr val="accent2"/>
+          </a:fillRef>
+          <a:effectRef idx="1">
+            <a:schemeClr val="accent2"/>
+          </a:effectRef>
+          <a:fontRef idx="minor">
+            <a:schemeClr val="dk1"/>
+          </a:fontRef>
+        </p:style>
+        <p:txBody>
+          <a:bodyPr rtlCol="0" anchor="t"/>
+          <a:lstStyle/>
+          <a:p>
+            <a:r>
+              <a:rPr lang="en-US" sz="1200" b="1" dirty="0">
+                <a:solidFill>
+                  <a:srgbClr val="0070C0"/>
+                </a:solidFill>
+              </a:rPr>
+              <a:t>Logic</a:t>
+            </a:r>
+            <a:endParaRPr lang="en-SG" sz="1200" b="1" dirty="0">
+              <a:solidFill>
+                <a:srgbClr val="0070C0"/>
+              </a:solidFill>
+            </a:endParaRPr>
+          </a:p>
+        </p:txBody>
+      </p:sp>
+      <p:sp>
+        <p:nvSpPr>
+          <p:cNvPr id="4" name="Rectangle 62">
+            <a:extLst>
+              <a:ext uri="{FF2B5EF4-FFF2-40B4-BE49-F238E27FC236}">
+                <a16:creationId xmlns:a16="http://schemas.microsoft.com/office/drawing/2014/main" id="{F90B5CEA-ACCE-4661-A96A-88C0E13B1254}"/>
+              </a:ext>
+            </a:extLst>
+          </p:cNvPr>
+          <p:cNvSpPr/>
+          <p:nvPr/>
+        </p:nvSpPr>
+        <p:spPr>
+          <a:xfrm>
+            <a:off x="883145" y="543946"/>
+            <a:ext cx="1455629" cy="346760"/>
+          </a:xfrm>
+          <a:prstGeom prst="rect">
+            <a:avLst/>
+          </a:prstGeom>
+          <a:solidFill>
+            <a:srgbClr val="0070C0"/>
+          </a:solidFill>
+          <a:ln w="19050">
+            <a:solidFill>
+              <a:srgbClr val="0070C0"/>
+            </a:solidFill>
+          </a:ln>
+          <a:effectLst/>
+        </p:spPr>
+        <p:style>
+          <a:lnRef idx="1">
+            <a:schemeClr val="accent2"/>
+          </a:lnRef>
+          <a:fillRef idx="2">
+            <a:schemeClr val="accent2"/>
+          </a:fillRef>
+          <a:effectRef idx="1">
+            <a:schemeClr val="accent2"/>
+          </a:effectRef>
+          <a:fontRef idx="minor">
+            <a:schemeClr val="dk1"/>
+          </a:fontRef>
+        </p:style>
+        <p:txBody>
+          <a:bodyPr rtlCol="0" anchor="ctr"/>
+          <a:lstStyle/>
+          <a:p>
+            <a:pPr algn="ctr"/>
+            <a:r>
+              <a:rPr lang="en-US" sz="1600" dirty="0">
+                <a:solidFill>
+                  <a:schemeClr val="bg1"/>
+                </a:solidFill>
+              </a:rPr>
+              <a:t>:</a:t>
+            </a:r>
+            <a:r>
+              <a:rPr lang="en-US" sz="1600" dirty="0" err="1">
+                <a:solidFill>
+                  <a:schemeClr val="bg1"/>
+                </a:solidFill>
+              </a:rPr>
+              <a:t>LogicManager</a:t>
+            </a:r>
+            <a:endParaRPr lang="en-SG" sz="1600" dirty="0">
+              <a:solidFill>
+                <a:schemeClr val="bg1"/>
+              </a:solidFill>
+            </a:endParaRPr>
+          </a:p>
+        </p:txBody>
+      </p:sp>
+      <p:cxnSp>
+        <p:nvCxnSpPr>
+          <p:cNvPr id="5" name="Straight Connector 4">
+            <a:extLst>
+              <a:ext uri="{FF2B5EF4-FFF2-40B4-BE49-F238E27FC236}">
+                <a16:creationId xmlns:a16="http://schemas.microsoft.com/office/drawing/2014/main" id="{4954AAC7-47A9-42FE-88D1-20BA4ECACD9C}"/>
+              </a:ext>
+            </a:extLst>
+          </p:cNvPr>
+          <p:cNvCxnSpPr>
+            <a:cxnSpLocks/>
+          </p:cNvCxnSpPr>
+          <p:nvPr/>
+        </p:nvCxnSpPr>
+        <p:spPr>
+          <a:xfrm flipH="1">
+            <a:off x="1599768" y="907617"/>
+            <a:ext cx="11191" cy="5188383"/>
+          </a:xfrm>
+          <a:prstGeom prst="line">
+            <a:avLst/>
+          </a:prstGeom>
+          <a:ln w="19050">
+            <a:solidFill>
+              <a:srgbClr val="0070C0"/>
+            </a:solidFill>
+            <a:prstDash val="sysDash"/>
+          </a:ln>
+          <a:effectLst/>
+        </p:spPr>
+        <p:style>
+          <a:lnRef idx="1">
+            <a:schemeClr val="accent1"/>
+          </a:lnRef>
+          <a:fillRef idx="2">
+            <a:schemeClr val="accent1"/>
+          </a:fillRef>
+          <a:effectRef idx="1">
+            <a:schemeClr val="accent1"/>
+          </a:effectRef>
+          <a:fontRef idx="minor">
+            <a:schemeClr val="dk1"/>
+          </a:fontRef>
+        </p:style>
+      </p:cxnSp>
+      <p:sp>
+        <p:nvSpPr>
+          <p:cNvPr id="6" name="Rectangle 5">
+            <a:extLst>
+              <a:ext uri="{FF2B5EF4-FFF2-40B4-BE49-F238E27FC236}">
+                <a16:creationId xmlns:a16="http://schemas.microsoft.com/office/drawing/2014/main" id="{DA58A847-4763-4573-8246-663EB47A3787}"/>
+              </a:ext>
+            </a:extLst>
+          </p:cNvPr>
+          <p:cNvSpPr/>
+          <p:nvPr/>
+        </p:nvSpPr>
+        <p:spPr>
+          <a:xfrm>
+            <a:off x="1530029" y="1258312"/>
+            <a:ext cx="148332" cy="4609088"/>
+          </a:xfrm>
+          <a:prstGeom prst="rect">
+            <a:avLst/>
+          </a:prstGeom>
+          <a:solidFill>
+            <a:srgbClr val="0070C0"/>
+          </a:solidFill>
+          <a:ln>
+            <a:solidFill>
+              <a:srgbClr val="0070C0"/>
+            </a:solidFill>
+          </a:ln>
+          <a:effectLst/>
+        </p:spPr>
+        <p:style>
+          <a:lnRef idx="1">
+            <a:schemeClr val="accent3"/>
+          </a:lnRef>
+          <a:fillRef idx="2">
+            <a:schemeClr val="accent3"/>
+          </a:fillRef>
+          <a:effectRef idx="1">
+            <a:schemeClr val="accent3"/>
+          </a:effectRef>
+          <a:fontRef idx="minor">
+            <a:schemeClr val="dk1"/>
+          </a:fontRef>
+        </p:style>
+        <p:txBody>
+          <a:bodyPr rtlCol="0" anchor="ctr"/>
+          <a:lstStyle/>
+          <a:p>
+            <a:pPr algn="ctr"/>
+            <a:endParaRPr lang="en-SG" sz="1400"/>
+          </a:p>
+        </p:txBody>
+      </p:sp>
+      <p:sp>
+        <p:nvSpPr>
+          <p:cNvPr id="7" name="Rectangle 62">
+            <a:extLst>
+              <a:ext uri="{FF2B5EF4-FFF2-40B4-BE49-F238E27FC236}">
+                <a16:creationId xmlns:a16="http://schemas.microsoft.com/office/drawing/2014/main" id="{22BF4CFA-85ED-46A3-B14A-64D0BD662B2B}"/>
+              </a:ext>
+            </a:extLst>
+          </p:cNvPr>
+          <p:cNvSpPr/>
+          <p:nvPr/>
+        </p:nvSpPr>
+        <p:spPr>
+          <a:xfrm>
+            <a:off x="3437187" y="423022"/>
+            <a:ext cx="1455619" cy="467684"/>
+          </a:xfrm>
+          <a:prstGeom prst="rect">
+            <a:avLst/>
+          </a:prstGeom>
+          <a:solidFill>
+            <a:srgbClr val="0070C0"/>
+          </a:solidFill>
+          <a:ln w="19050">
+            <a:solidFill>
+              <a:srgbClr val="0070C0"/>
+            </a:solidFill>
+          </a:ln>
+          <a:effectLst/>
+        </p:spPr>
+        <p:style>
+          <a:lnRef idx="1">
+            <a:schemeClr val="accent2"/>
+          </a:lnRef>
+          <a:fillRef idx="2">
+            <a:schemeClr val="accent2"/>
+          </a:fillRef>
+          <a:effectRef idx="1">
+            <a:schemeClr val="accent2"/>
+          </a:effectRef>
+          <a:fontRef idx="minor">
+            <a:schemeClr val="dk1"/>
+          </a:fontRef>
+        </p:style>
+        <p:txBody>
+          <a:bodyPr rtlCol="0" anchor="ctr"/>
+          <a:lstStyle/>
+          <a:p>
+            <a:pPr algn="ctr"/>
+            <a:r>
+              <a:rPr lang="en-US" sz="1600" dirty="0">
+                <a:solidFill>
+                  <a:schemeClr val="bg1"/>
+                </a:solidFill>
+              </a:rPr>
+              <a:t>:</a:t>
+            </a:r>
+            <a:r>
+              <a:rPr lang="en-US" sz="1600" dirty="0" err="1">
+                <a:solidFill>
+                  <a:schemeClr val="bg1"/>
+                </a:solidFill>
+              </a:rPr>
+              <a:t>PiconsoParser</a:t>
+            </a:r>
+            <a:endParaRPr lang="en-SG" sz="1600" dirty="0">
+              <a:solidFill>
+                <a:schemeClr val="bg1"/>
+              </a:solidFill>
+            </a:endParaRPr>
+          </a:p>
+        </p:txBody>
+      </p:sp>
+      <p:cxnSp>
+        <p:nvCxnSpPr>
+          <p:cNvPr id="8" name="Straight Connector 7">
+            <a:extLst>
+              <a:ext uri="{FF2B5EF4-FFF2-40B4-BE49-F238E27FC236}">
+                <a16:creationId xmlns:a16="http://schemas.microsoft.com/office/drawing/2014/main" id="{D863318B-BDC4-46C3-ACD9-9CD21EC5C9F7}"/>
+              </a:ext>
+            </a:extLst>
+          </p:cNvPr>
+          <p:cNvCxnSpPr>
+            <a:cxnSpLocks/>
+          </p:cNvCxnSpPr>
+          <p:nvPr/>
+        </p:nvCxnSpPr>
+        <p:spPr>
+          <a:xfrm>
+            <a:off x="4050587" y="907617"/>
+            <a:ext cx="0" cy="1482984"/>
+          </a:xfrm>
+          <a:prstGeom prst="line">
+            <a:avLst/>
+          </a:prstGeom>
+          <a:ln w="19050">
+            <a:solidFill>
+              <a:srgbClr val="0070C0"/>
+            </a:solidFill>
+            <a:prstDash val="sysDash"/>
+          </a:ln>
+          <a:effectLst/>
+        </p:spPr>
+        <p:style>
+          <a:lnRef idx="1">
+            <a:schemeClr val="accent1"/>
+          </a:lnRef>
+          <a:fillRef idx="2">
+            <a:schemeClr val="accent1"/>
+          </a:fillRef>
+          <a:effectRef idx="1">
+            <a:schemeClr val="accent1"/>
+          </a:effectRef>
+          <a:fontRef idx="minor">
+            <a:schemeClr val="dk1"/>
+          </a:fontRef>
+        </p:style>
+      </p:cxnSp>
+      <p:sp>
+        <p:nvSpPr>
+          <p:cNvPr id="9" name="Rectangle 8">
+            <a:extLst>
+              <a:ext uri="{FF2B5EF4-FFF2-40B4-BE49-F238E27FC236}">
+                <a16:creationId xmlns:a16="http://schemas.microsoft.com/office/drawing/2014/main" id="{5B04853A-D284-4CA1-B577-40A768DBD8BD}"/>
+              </a:ext>
+            </a:extLst>
+          </p:cNvPr>
+          <p:cNvSpPr/>
+          <p:nvPr/>
+        </p:nvSpPr>
+        <p:spPr>
+          <a:xfrm>
+            <a:off x="3978580" y="1365810"/>
+            <a:ext cx="154408" cy="767790"/>
+          </a:xfrm>
+          <a:prstGeom prst="rect">
+            <a:avLst/>
+          </a:prstGeom>
+          <a:solidFill>
+            <a:srgbClr val="0070C0"/>
+          </a:solidFill>
+          <a:ln>
+            <a:solidFill>
+              <a:srgbClr val="0070C0"/>
+            </a:solidFill>
+          </a:ln>
+          <a:effectLst/>
+        </p:spPr>
+        <p:style>
+          <a:lnRef idx="1">
+            <a:schemeClr val="accent3"/>
+          </a:lnRef>
+          <a:fillRef idx="2">
+            <a:schemeClr val="accent3"/>
+          </a:fillRef>
+          <a:effectRef idx="1">
+            <a:schemeClr val="accent3"/>
+          </a:effectRef>
+          <a:fontRef idx="minor">
+            <a:schemeClr val="dk1"/>
+          </a:fontRef>
+        </p:style>
+        <p:txBody>
+          <a:bodyPr rtlCol="0" anchor="ctr"/>
+          <a:lstStyle/>
+          <a:p>
+            <a:pPr algn="ctr"/>
+            <a:endParaRPr lang="en-SG" sz="1400">
+              <a:solidFill>
+                <a:schemeClr val="dk1"/>
+              </a:solidFill>
+            </a:endParaRPr>
+          </a:p>
+        </p:txBody>
+      </p:sp>
+      <p:cxnSp>
+        <p:nvCxnSpPr>
+          <p:cNvPr id="10" name="Straight Connector 9">
+            <a:extLst>
+              <a:ext uri="{FF2B5EF4-FFF2-40B4-BE49-F238E27FC236}">
+                <a16:creationId xmlns:a16="http://schemas.microsoft.com/office/drawing/2014/main" id="{64A89439-4524-4094-B3BE-063763AE0594}"/>
+              </a:ext>
+            </a:extLst>
+          </p:cNvPr>
+          <p:cNvCxnSpPr>
+            <a:cxnSpLocks/>
+            <a:stCxn id="11" idx="0"/>
+          </p:cNvCxnSpPr>
+          <p:nvPr/>
+        </p:nvCxnSpPr>
+        <p:spPr>
+          <a:xfrm>
+            <a:off x="5602082" y="1613633"/>
+            <a:ext cx="0" cy="4406167"/>
+          </a:xfrm>
+          <a:prstGeom prst="line">
+            <a:avLst/>
+          </a:prstGeom>
+          <a:ln w="19050">
+            <a:solidFill>
+              <a:srgbClr val="0070C0"/>
+            </a:solidFill>
+            <a:prstDash val="sysDash"/>
+          </a:ln>
+          <a:effectLst/>
+        </p:spPr>
+        <p:style>
+          <a:lnRef idx="1">
+            <a:schemeClr val="accent1"/>
+          </a:lnRef>
+          <a:fillRef idx="2">
+            <a:schemeClr val="accent1"/>
+          </a:fillRef>
+          <a:effectRef idx="1">
+            <a:schemeClr val="accent1"/>
+          </a:effectRef>
+          <a:fontRef idx="minor">
+            <a:schemeClr val="dk1"/>
+          </a:fontRef>
+        </p:style>
+      </p:cxnSp>
+      <p:sp>
+        <p:nvSpPr>
+          <p:cNvPr id="11" name="Rectangle 10">
+            <a:extLst>
+              <a:ext uri="{FF2B5EF4-FFF2-40B4-BE49-F238E27FC236}">
+                <a16:creationId xmlns:a16="http://schemas.microsoft.com/office/drawing/2014/main" id="{B3AE2B35-684B-48CB-B8B4-4F961228991F}"/>
+              </a:ext>
+            </a:extLst>
+          </p:cNvPr>
+          <p:cNvSpPr/>
+          <p:nvPr/>
+        </p:nvSpPr>
+        <p:spPr>
+          <a:xfrm>
+            <a:off x="5525882" y="1613633"/>
+            <a:ext cx="152400" cy="276003"/>
+          </a:xfrm>
+          <a:prstGeom prst="rect">
+            <a:avLst/>
+          </a:prstGeom>
+          <a:solidFill>
+            <a:srgbClr val="0070C0"/>
+          </a:solidFill>
+          <a:ln>
+            <a:solidFill>
+              <a:srgbClr val="0070C0"/>
+            </a:solidFill>
+          </a:ln>
+          <a:effectLst/>
+        </p:spPr>
+        <p:style>
+          <a:lnRef idx="1">
+            <a:schemeClr val="accent3"/>
+          </a:lnRef>
+          <a:fillRef idx="2">
+            <a:schemeClr val="accent3"/>
+          </a:fillRef>
+          <a:effectRef idx="1">
+            <a:schemeClr val="accent3"/>
+          </a:effectRef>
+          <a:fontRef idx="minor">
+            <a:schemeClr val="dk1"/>
+          </a:fontRef>
+        </p:style>
+        <p:txBody>
+          <a:bodyPr rtlCol="0" anchor="ctr"/>
+          <a:lstStyle/>
+          <a:p>
+            <a:pPr algn="ctr"/>
+            <a:endParaRPr lang="en-SG" sz="1400"/>
+          </a:p>
+        </p:txBody>
+      </p:sp>
+      <p:cxnSp>
+        <p:nvCxnSpPr>
+          <p:cNvPr id="12" name="Straight Arrow Connector 11">
+            <a:extLst>
+              <a:ext uri="{FF2B5EF4-FFF2-40B4-BE49-F238E27FC236}">
+                <a16:creationId xmlns:a16="http://schemas.microsoft.com/office/drawing/2014/main" id="{CFA7763C-6017-48C6-B231-D0B7CFCF8DAC}"/>
+              </a:ext>
+            </a:extLst>
+          </p:cNvPr>
+          <p:cNvCxnSpPr/>
+          <p:nvPr/>
+        </p:nvCxnSpPr>
+        <p:spPr>
+          <a:xfrm>
+            <a:off x="419100" y="1261999"/>
+            <a:ext cx="1119851" cy="0"/>
+          </a:xfrm>
+          <a:prstGeom prst="straightConnector1">
+            <a:avLst/>
+          </a:prstGeom>
+          <a:ln w="19050">
+            <a:solidFill>
+              <a:srgbClr val="00B050"/>
+            </a:solidFill>
+            <a:tailEnd type="arrow"/>
+          </a:ln>
+        </p:spPr>
+        <p:style>
+          <a:lnRef idx="1">
+            <a:schemeClr val="accent1"/>
+          </a:lnRef>
+          <a:fillRef idx="0">
+            <a:schemeClr val="accent1"/>
+          </a:fillRef>
+          <a:effectRef idx="0">
+            <a:schemeClr val="accent1"/>
+          </a:effectRef>
+          <a:fontRef idx="minor">
+            <a:schemeClr val="tx1"/>
+          </a:fontRef>
+        </p:style>
+      </p:cxnSp>
+      <p:sp>
+        <p:nvSpPr>
+          <p:cNvPr id="13" name="TextBox 12">
+            <a:extLst>
+              <a:ext uri="{FF2B5EF4-FFF2-40B4-BE49-F238E27FC236}">
+                <a16:creationId xmlns:a16="http://schemas.microsoft.com/office/drawing/2014/main" id="{9CC9004A-2343-40F5-91E0-0DD316C83184}"/>
+              </a:ext>
+            </a:extLst>
+          </p:cNvPr>
+          <p:cNvSpPr txBox="1"/>
+          <p:nvPr/>
+        </p:nvSpPr>
+        <p:spPr>
+          <a:xfrm>
+            <a:off x="457200" y="1245513"/>
+            <a:ext cx="1114338" cy="430887"/>
+          </a:xfrm>
+          <a:prstGeom prst="rect">
+            <a:avLst/>
+          </a:prstGeom>
+          <a:noFill/>
+        </p:spPr>
+        <p:txBody>
+          <a:bodyPr wrap="square" lIns="0" tIns="0" rIns="0" bIns="0" rtlCol="0">
+            <a:spAutoFit/>
+          </a:bodyPr>
+          <a:lstStyle/>
+          <a:p>
+            <a:pPr algn="ctr"/>
+            <a:r>
+              <a:rPr lang="en-US" sz="1400" dirty="0">
+                <a:solidFill>
+                  <a:srgbClr val="0070C0"/>
+                </a:solidFill>
+              </a:rPr>
+              <a:t>Execute</a:t>
+            </a:r>
+          </a:p>
+          <a:p>
+            <a:pPr algn="ctr"/>
+            <a:r>
+              <a:rPr lang="en-US" sz="1400" dirty="0">
+                <a:solidFill>
+                  <a:srgbClr val="0070C0"/>
+                </a:solidFill>
+              </a:rPr>
+              <a:t>(“cd &lt;path&gt;”)</a:t>
+            </a:r>
+          </a:p>
+        </p:txBody>
+      </p:sp>
+      <p:cxnSp>
+        <p:nvCxnSpPr>
+          <p:cNvPr id="14" name="Straight Arrow Connector 13">
+            <a:extLst>
+              <a:ext uri="{FF2B5EF4-FFF2-40B4-BE49-F238E27FC236}">
+                <a16:creationId xmlns:a16="http://schemas.microsoft.com/office/drawing/2014/main" id="{799EB3AD-121A-4CCA-B054-9690E79D05FE}"/>
+              </a:ext>
+            </a:extLst>
+          </p:cNvPr>
+          <p:cNvCxnSpPr/>
+          <p:nvPr/>
+        </p:nvCxnSpPr>
+        <p:spPr>
+          <a:xfrm flipV="1">
+            <a:off x="4135972" y="1512340"/>
+            <a:ext cx="922392" cy="1"/>
+          </a:xfrm>
+          <a:prstGeom prst="straightConnector1">
+            <a:avLst/>
+          </a:prstGeom>
+          <a:ln w="19050">
+            <a:solidFill>
+              <a:srgbClr val="0070C0"/>
+            </a:solidFill>
+            <a:tailEnd type="arrow"/>
+          </a:ln>
+        </p:spPr>
+        <p:style>
+          <a:lnRef idx="1">
+            <a:schemeClr val="accent1"/>
+          </a:lnRef>
+          <a:fillRef idx="0">
+            <a:schemeClr val="accent1"/>
+          </a:fillRef>
+          <a:effectRef idx="0">
+            <a:schemeClr val="accent1"/>
+          </a:effectRef>
+          <a:fontRef idx="minor">
+            <a:schemeClr val="tx1"/>
+          </a:fontRef>
+        </p:style>
+      </p:cxnSp>
+      <p:sp>
+        <p:nvSpPr>
+          <p:cNvPr id="15" name="TextBox 14">
+            <a:extLst>
+              <a:ext uri="{FF2B5EF4-FFF2-40B4-BE49-F238E27FC236}">
+                <a16:creationId xmlns:a16="http://schemas.microsoft.com/office/drawing/2014/main" id="{05F7E58A-91AF-4E14-A5D3-C82539D1270D}"/>
+              </a:ext>
+            </a:extLst>
+          </p:cNvPr>
+          <p:cNvSpPr txBox="1"/>
+          <p:nvPr/>
+        </p:nvSpPr>
+        <p:spPr>
+          <a:xfrm>
+            <a:off x="3243421" y="2484071"/>
+            <a:ext cx="855809" cy="215444"/>
+          </a:xfrm>
+          <a:prstGeom prst="rect">
+            <a:avLst/>
+          </a:prstGeom>
+          <a:noFill/>
+        </p:spPr>
+        <p:txBody>
+          <a:bodyPr wrap="square" lIns="0" tIns="0" rIns="0" bIns="0" rtlCol="0">
+            <a:spAutoFit/>
+          </a:bodyPr>
+          <a:lstStyle>
+            <a:defPPr>
+              <a:defRPr lang="en-US"/>
+            </a:defPPr>
+            <a:lvl1pPr algn="r">
+              <a:defRPr sz="1400">
+                <a:solidFill>
+                  <a:srgbClr val="0070C0"/>
+                </a:solidFill>
+              </a:defRPr>
+            </a:lvl1pPr>
+          </a:lstStyle>
+          <a:p>
+            <a:r>
+              <a:rPr lang="en-US" dirty="0"/>
+              <a:t>execute()</a:t>
+            </a:r>
+          </a:p>
+        </p:txBody>
+      </p:sp>
+      <p:cxnSp>
+        <p:nvCxnSpPr>
+          <p:cNvPr id="16" name="Straight Arrow Connector 15">
+            <a:extLst>
+              <a:ext uri="{FF2B5EF4-FFF2-40B4-BE49-F238E27FC236}">
+                <a16:creationId xmlns:a16="http://schemas.microsoft.com/office/drawing/2014/main" id="{A1BF7FB8-1C84-4441-9D7C-4CE707D51267}"/>
+              </a:ext>
+            </a:extLst>
+          </p:cNvPr>
+          <p:cNvCxnSpPr/>
+          <p:nvPr/>
+        </p:nvCxnSpPr>
+        <p:spPr>
+          <a:xfrm>
+            <a:off x="4109108" y="1878232"/>
+            <a:ext cx="1492974" cy="0"/>
+          </a:xfrm>
+          <a:prstGeom prst="straightConnector1">
+            <a:avLst/>
+          </a:prstGeom>
+          <a:ln w="19050">
+            <a:solidFill>
+              <a:srgbClr val="0070C0"/>
+            </a:solidFill>
+            <a:prstDash val="sysDash"/>
+            <a:headEnd type="arrow" w="med" len="med"/>
+            <a:tailEnd type="none" w="med" len="med"/>
+          </a:ln>
+        </p:spPr>
+        <p:style>
+          <a:lnRef idx="1">
+            <a:schemeClr val="accent1"/>
+          </a:lnRef>
+          <a:fillRef idx="0">
+            <a:schemeClr val="accent1"/>
+          </a:fillRef>
+          <a:effectRef idx="0">
+            <a:schemeClr val="accent1"/>
+          </a:effectRef>
+          <a:fontRef idx="minor">
+            <a:schemeClr val="tx1"/>
+          </a:fontRef>
+        </p:style>
+      </p:cxnSp>
+      <p:cxnSp>
+        <p:nvCxnSpPr>
+          <p:cNvPr id="17" name="Straight Arrow Connector 16">
+            <a:extLst>
+              <a:ext uri="{FF2B5EF4-FFF2-40B4-BE49-F238E27FC236}">
+                <a16:creationId xmlns:a16="http://schemas.microsoft.com/office/drawing/2014/main" id="{55F51607-E7CA-47EC-A218-9478D22E340A}"/>
+              </a:ext>
+            </a:extLst>
+          </p:cNvPr>
+          <p:cNvCxnSpPr>
+            <a:cxnSpLocks/>
+          </p:cNvCxnSpPr>
+          <p:nvPr/>
+        </p:nvCxnSpPr>
+        <p:spPr>
+          <a:xfrm>
+            <a:off x="1691351" y="2133600"/>
+            <a:ext cx="2348067" cy="0"/>
+          </a:xfrm>
+          <a:prstGeom prst="straightConnector1">
+            <a:avLst/>
+          </a:prstGeom>
+          <a:ln w="19050">
+            <a:solidFill>
+              <a:srgbClr val="0070C0"/>
+            </a:solidFill>
+            <a:prstDash val="sysDash"/>
+            <a:headEnd type="arrow" w="med" len="med"/>
+            <a:tailEnd type="none" w="med" len="med"/>
+          </a:ln>
+        </p:spPr>
+        <p:style>
+          <a:lnRef idx="1">
+            <a:schemeClr val="accent1"/>
+          </a:lnRef>
+          <a:fillRef idx="0">
+            <a:schemeClr val="accent1"/>
+          </a:fillRef>
+          <a:effectRef idx="0">
+            <a:schemeClr val="accent1"/>
+          </a:effectRef>
+          <a:fontRef idx="minor">
+            <a:schemeClr val="tx1"/>
+          </a:fontRef>
+        </p:style>
+      </p:cxnSp>
+      <p:cxnSp>
+        <p:nvCxnSpPr>
+          <p:cNvPr id="18" name="Straight Arrow Connector 17">
+            <a:extLst>
+              <a:ext uri="{FF2B5EF4-FFF2-40B4-BE49-F238E27FC236}">
+                <a16:creationId xmlns:a16="http://schemas.microsoft.com/office/drawing/2014/main" id="{78A5AEF6-6562-418B-826A-D89E86A1625F}"/>
+              </a:ext>
+            </a:extLst>
+          </p:cNvPr>
+          <p:cNvCxnSpPr/>
+          <p:nvPr/>
+        </p:nvCxnSpPr>
+        <p:spPr>
+          <a:xfrm>
+            <a:off x="403717" y="5861770"/>
+            <a:ext cx="1196051" cy="0"/>
+          </a:xfrm>
+          <a:prstGeom prst="straightConnector1">
+            <a:avLst/>
+          </a:prstGeom>
+          <a:ln w="19050">
+            <a:solidFill>
+              <a:schemeClr val="accent1"/>
+            </a:solidFill>
+            <a:prstDash val="sysDash"/>
+            <a:headEnd type="arrow" w="med" len="med"/>
+            <a:tailEnd type="none" w="med" len="med"/>
+          </a:ln>
+        </p:spPr>
+        <p:style>
+          <a:lnRef idx="1">
+            <a:schemeClr val="accent1"/>
+          </a:lnRef>
+          <a:fillRef idx="0">
+            <a:schemeClr val="accent1"/>
+          </a:fillRef>
+          <a:effectRef idx="0">
+            <a:schemeClr val="accent1"/>
+          </a:effectRef>
+          <a:fontRef idx="minor">
+            <a:schemeClr val="tx1"/>
+          </a:fontRef>
+        </p:style>
+      </p:cxnSp>
+      <p:sp>
+        <p:nvSpPr>
+          <p:cNvPr id="19" name="Rectangle 18">
+            <a:extLst>
+              <a:ext uri="{FF2B5EF4-FFF2-40B4-BE49-F238E27FC236}">
+                <a16:creationId xmlns:a16="http://schemas.microsoft.com/office/drawing/2014/main" id="{9713D6F3-6670-4C35-8955-3575C0912AD7}"/>
+              </a:ext>
+            </a:extLst>
+          </p:cNvPr>
+          <p:cNvSpPr/>
+          <p:nvPr/>
+        </p:nvSpPr>
+        <p:spPr>
+          <a:xfrm>
+            <a:off x="5526489" y="2731314"/>
+            <a:ext cx="139020" cy="2998649"/>
+          </a:xfrm>
+          <a:prstGeom prst="rect">
+            <a:avLst/>
+          </a:prstGeom>
+          <a:solidFill>
+            <a:srgbClr val="0070C0"/>
+          </a:solidFill>
+          <a:ln>
+            <a:solidFill>
+              <a:srgbClr val="0070C0"/>
+            </a:solidFill>
+          </a:ln>
+          <a:effectLst/>
+        </p:spPr>
+        <p:style>
+          <a:lnRef idx="1">
+            <a:schemeClr val="accent3"/>
+          </a:lnRef>
+          <a:fillRef idx="2">
+            <a:schemeClr val="accent3"/>
+          </a:fillRef>
+          <a:effectRef idx="1">
+            <a:schemeClr val="accent3"/>
+          </a:effectRef>
+          <a:fontRef idx="minor">
+            <a:schemeClr val="dk1"/>
+          </a:fontRef>
+        </p:style>
+        <p:txBody>
+          <a:bodyPr rtlCol="0" anchor="ctr"/>
+          <a:lstStyle/>
+          <a:p>
+            <a:pPr algn="ctr"/>
+            <a:endParaRPr lang="en-SG" sz="1400"/>
+          </a:p>
+        </p:txBody>
+      </p:sp>
+      <p:sp>
+        <p:nvSpPr>
+          <p:cNvPr id="20" name="TextBox 19">
+            <a:extLst>
+              <a:ext uri="{FF2B5EF4-FFF2-40B4-BE49-F238E27FC236}">
+                <a16:creationId xmlns:a16="http://schemas.microsoft.com/office/drawing/2014/main" id="{625258B3-9BB1-4C01-A524-5C0410B7992D}"/>
+              </a:ext>
+            </a:extLst>
+          </p:cNvPr>
+          <p:cNvSpPr txBox="1"/>
+          <p:nvPr/>
+        </p:nvSpPr>
+        <p:spPr>
+          <a:xfrm>
+            <a:off x="5864722" y="2748246"/>
+            <a:ext cx="1298078" cy="184666"/>
+          </a:xfrm>
+          <a:prstGeom prst="rect">
+            <a:avLst/>
+          </a:prstGeom>
+          <a:noFill/>
+        </p:spPr>
+        <p:txBody>
+          <a:bodyPr wrap="square" lIns="0" tIns="0" rIns="0" bIns="0" rtlCol="0">
+            <a:spAutoFit/>
+          </a:bodyPr>
+          <a:lstStyle>
+            <a:defPPr>
+              <a:defRPr lang="en-US"/>
+            </a:defPPr>
+            <a:lvl1pPr algn="r">
+              <a:defRPr sz="1400">
+                <a:solidFill>
+                  <a:srgbClr val="0070C0"/>
+                </a:solidFill>
+              </a:defRPr>
+            </a:lvl1pPr>
+          </a:lstStyle>
+          <a:p>
+            <a:r>
+              <a:rPr lang="en-US" sz="1200" dirty="0" err="1">
+                <a:solidFill>
+                  <a:schemeClr val="accent4">
+                    <a:lumMod val="75000"/>
+                  </a:schemeClr>
+                </a:solidFill>
+              </a:rPr>
+              <a:t>getCurrDirectory</a:t>
+            </a:r>
+            <a:r>
+              <a:rPr lang="en-US" sz="1200" dirty="0">
+                <a:solidFill>
+                  <a:srgbClr val="7030A0"/>
+                </a:solidFill>
+              </a:rPr>
+              <a:t>()</a:t>
+            </a:r>
+            <a:endParaRPr lang="en-US" sz="1200" dirty="0"/>
+          </a:p>
+        </p:txBody>
+      </p:sp>
+      <p:sp>
+        <p:nvSpPr>
+          <p:cNvPr id="21" name="TextBox 20">
+            <a:extLst>
+              <a:ext uri="{FF2B5EF4-FFF2-40B4-BE49-F238E27FC236}">
+                <a16:creationId xmlns:a16="http://schemas.microsoft.com/office/drawing/2014/main" id="{A5AB6FA0-5B8A-4E36-8859-05E2C86BEDDF}"/>
+              </a:ext>
+            </a:extLst>
+          </p:cNvPr>
+          <p:cNvSpPr txBox="1"/>
+          <p:nvPr/>
+        </p:nvSpPr>
+        <p:spPr>
+          <a:xfrm>
+            <a:off x="1885189" y="1106150"/>
+            <a:ext cx="1899551" cy="215444"/>
+          </a:xfrm>
+          <a:prstGeom prst="rect">
+            <a:avLst/>
+          </a:prstGeom>
+          <a:noFill/>
+        </p:spPr>
+        <p:txBody>
+          <a:bodyPr wrap="square" lIns="0" tIns="0" rIns="0" bIns="0" rtlCol="0">
+            <a:spAutoFit/>
+          </a:bodyPr>
+          <a:lstStyle>
+            <a:defPPr>
+              <a:defRPr lang="en-US"/>
+            </a:defPPr>
+            <a:lvl1pPr algn="r">
+              <a:defRPr sz="1400">
+                <a:solidFill>
+                  <a:srgbClr val="0070C0"/>
+                </a:solidFill>
+              </a:defRPr>
+            </a:lvl1pPr>
+          </a:lstStyle>
+          <a:p>
+            <a:r>
+              <a:rPr lang="en-US" dirty="0" err="1"/>
+              <a:t>parseCommand</a:t>
+            </a:r>
+            <a:r>
+              <a:rPr lang="en-US" dirty="0"/>
+              <a:t>(“cd”)</a:t>
+            </a:r>
+          </a:p>
+        </p:txBody>
+      </p:sp>
+      <p:sp>
+        <p:nvSpPr>
+          <p:cNvPr id="22" name="TextBox 21">
+            <a:extLst>
+              <a:ext uri="{FF2B5EF4-FFF2-40B4-BE49-F238E27FC236}">
+                <a16:creationId xmlns:a16="http://schemas.microsoft.com/office/drawing/2014/main" id="{AEDD8D49-C2B5-4A8C-A670-17AFEECF87CE}"/>
+              </a:ext>
+            </a:extLst>
+          </p:cNvPr>
+          <p:cNvSpPr txBox="1"/>
+          <p:nvPr/>
+        </p:nvSpPr>
+        <p:spPr>
+          <a:xfrm>
+            <a:off x="3273402" y="5486400"/>
+            <a:ext cx="621216" cy="215444"/>
+          </a:xfrm>
+          <a:prstGeom prst="rect">
+            <a:avLst/>
+          </a:prstGeom>
+          <a:noFill/>
+        </p:spPr>
+        <p:txBody>
+          <a:bodyPr wrap="square" lIns="0" tIns="0" rIns="0" bIns="0" rtlCol="0">
+            <a:spAutoFit/>
+          </a:bodyPr>
+          <a:lstStyle>
+            <a:defPPr>
+              <a:defRPr lang="en-US"/>
+            </a:defPPr>
+            <a:lvl1pPr algn="r">
+              <a:defRPr sz="1400">
+                <a:solidFill>
+                  <a:srgbClr val="0070C0"/>
+                </a:solidFill>
+              </a:defRPr>
+            </a:lvl1pPr>
+          </a:lstStyle>
+          <a:p>
+            <a:r>
+              <a:rPr lang="en-US" dirty="0"/>
+              <a:t>result</a:t>
+            </a:r>
+          </a:p>
+        </p:txBody>
+      </p:sp>
+      <p:sp>
+        <p:nvSpPr>
+          <p:cNvPr id="23" name="TextBox 22">
+            <a:extLst>
+              <a:ext uri="{FF2B5EF4-FFF2-40B4-BE49-F238E27FC236}">
+                <a16:creationId xmlns:a16="http://schemas.microsoft.com/office/drawing/2014/main" id="{9BD8C104-336C-4407-B275-3D1838874D90}"/>
+              </a:ext>
+            </a:extLst>
+          </p:cNvPr>
+          <p:cNvSpPr txBox="1"/>
+          <p:nvPr/>
+        </p:nvSpPr>
+        <p:spPr>
+          <a:xfrm>
+            <a:off x="667988" y="5616671"/>
+            <a:ext cx="762000" cy="215444"/>
+          </a:xfrm>
+          <a:prstGeom prst="rect">
+            <a:avLst/>
+          </a:prstGeom>
+          <a:noFill/>
+        </p:spPr>
+        <p:txBody>
+          <a:bodyPr wrap="square" lIns="0" tIns="0" rIns="0" bIns="0" rtlCol="0">
+            <a:spAutoFit/>
+          </a:bodyPr>
+          <a:lstStyle>
+            <a:defPPr>
+              <a:defRPr lang="en-US"/>
+            </a:defPPr>
+            <a:lvl1pPr algn="r">
+              <a:defRPr sz="1400">
+                <a:solidFill>
+                  <a:srgbClr val="0070C0"/>
+                </a:solidFill>
+              </a:defRPr>
+            </a:lvl1pPr>
+          </a:lstStyle>
+          <a:p>
+            <a:r>
+              <a:rPr lang="en-US" dirty="0"/>
+              <a:t>result</a:t>
+            </a:r>
+          </a:p>
+        </p:txBody>
+      </p:sp>
+      <p:sp>
+        <p:nvSpPr>
+          <p:cNvPr id="24" name="Rectangle 62">
+            <a:extLst>
+              <a:ext uri="{FF2B5EF4-FFF2-40B4-BE49-F238E27FC236}">
+                <a16:creationId xmlns:a16="http://schemas.microsoft.com/office/drawing/2014/main" id="{C8CA5AE5-FBA7-4B78-B680-59399A5B2559}"/>
+              </a:ext>
+            </a:extLst>
+          </p:cNvPr>
+          <p:cNvSpPr/>
+          <p:nvPr/>
+        </p:nvSpPr>
+        <p:spPr>
+          <a:xfrm>
+            <a:off x="8537835" y="2438400"/>
+            <a:ext cx="1294659" cy="244173"/>
+          </a:xfrm>
+          <a:prstGeom prst="rect">
+            <a:avLst/>
+          </a:prstGeom>
+          <a:solidFill>
+            <a:srgbClr val="7030A0"/>
+          </a:solidFill>
+          <a:ln w="19050">
+            <a:solidFill>
+              <a:srgbClr val="7030A0"/>
+            </a:solidFill>
+          </a:ln>
+          <a:effectLst/>
+        </p:spPr>
+        <p:style>
+          <a:lnRef idx="1">
+            <a:schemeClr val="accent2"/>
+          </a:lnRef>
+          <a:fillRef idx="2">
+            <a:schemeClr val="accent2"/>
+          </a:fillRef>
+          <a:effectRef idx="1">
+            <a:schemeClr val="accent2"/>
+          </a:effectRef>
+          <a:fontRef idx="minor">
+            <a:schemeClr val="dk1"/>
+          </a:fontRef>
+        </p:style>
+        <p:txBody>
+          <a:bodyPr rtlCol="0" anchor="ctr"/>
+          <a:lstStyle/>
+          <a:p>
+            <a:pPr algn="ctr"/>
+            <a:r>
+              <a:rPr lang="en-US" sz="1600" dirty="0">
+                <a:solidFill>
+                  <a:schemeClr val="bg1"/>
+                </a:solidFill>
+              </a:rPr>
+              <a:t>:</a:t>
+            </a:r>
+            <a:r>
+              <a:rPr lang="en-US" sz="1600" dirty="0" err="1">
+                <a:solidFill>
+                  <a:schemeClr val="bg1"/>
+                </a:solidFill>
+              </a:rPr>
+              <a:t>UserPrefs</a:t>
+            </a:r>
+            <a:endParaRPr lang="en-SG" sz="1600" dirty="0">
+              <a:solidFill>
+                <a:schemeClr val="bg1"/>
+              </a:solidFill>
+            </a:endParaRPr>
+          </a:p>
+        </p:txBody>
+      </p:sp>
+      <p:sp>
+        <p:nvSpPr>
+          <p:cNvPr id="25" name="Rectangle 24">
+            <a:extLst>
+              <a:ext uri="{FF2B5EF4-FFF2-40B4-BE49-F238E27FC236}">
+                <a16:creationId xmlns:a16="http://schemas.microsoft.com/office/drawing/2014/main" id="{8E92EE70-A65F-4A6C-B717-9DFDEC869643}"/>
+              </a:ext>
+            </a:extLst>
+          </p:cNvPr>
+          <p:cNvSpPr/>
+          <p:nvPr/>
+        </p:nvSpPr>
+        <p:spPr>
+          <a:xfrm>
+            <a:off x="9112904" y="3010906"/>
+            <a:ext cx="141935" cy="195819"/>
+          </a:xfrm>
+          <a:prstGeom prst="rect">
+            <a:avLst/>
+          </a:prstGeom>
+          <a:solidFill>
+            <a:srgbClr val="7030A0"/>
+          </a:solidFill>
+          <a:ln>
+            <a:solidFill>
+              <a:srgbClr val="7030A0"/>
+            </a:solidFill>
+          </a:ln>
+          <a:effectLst/>
+        </p:spPr>
+        <p:style>
+          <a:lnRef idx="1">
+            <a:schemeClr val="accent3"/>
+          </a:lnRef>
+          <a:fillRef idx="2">
+            <a:schemeClr val="accent3"/>
+          </a:fillRef>
+          <a:effectRef idx="1">
+            <a:schemeClr val="accent3"/>
+          </a:effectRef>
+          <a:fontRef idx="minor">
+            <a:schemeClr val="dk1"/>
+          </a:fontRef>
+        </p:style>
+        <p:txBody>
+          <a:bodyPr rtlCol="0" anchor="ctr"/>
+          <a:lstStyle/>
+          <a:p>
+            <a:pPr algn="ctr"/>
+            <a:endParaRPr lang="en-SG" sz="1400" dirty="0"/>
+          </a:p>
+        </p:txBody>
+      </p:sp>
+      <p:sp>
+        <p:nvSpPr>
+          <p:cNvPr id="26" name="TextBox 25">
+            <a:extLst>
+              <a:ext uri="{FF2B5EF4-FFF2-40B4-BE49-F238E27FC236}">
+                <a16:creationId xmlns:a16="http://schemas.microsoft.com/office/drawing/2014/main" id="{03B24BFC-C996-4FB4-AB94-5E3C965E8D78}"/>
+              </a:ext>
+            </a:extLst>
+          </p:cNvPr>
+          <p:cNvSpPr txBox="1"/>
+          <p:nvPr/>
+        </p:nvSpPr>
+        <p:spPr>
+          <a:xfrm>
+            <a:off x="2724792" y="1905793"/>
+            <a:ext cx="220343" cy="215444"/>
+          </a:xfrm>
+          <a:prstGeom prst="rect">
+            <a:avLst/>
+          </a:prstGeom>
+          <a:noFill/>
+        </p:spPr>
+        <p:txBody>
+          <a:bodyPr wrap="square" lIns="0" tIns="0" rIns="0" bIns="0" rtlCol="0">
+            <a:spAutoFit/>
+          </a:bodyPr>
+          <a:lstStyle>
+            <a:defPPr>
+              <a:defRPr lang="en-US"/>
+            </a:defPPr>
+            <a:lvl1pPr algn="r">
+              <a:defRPr sz="1400">
+                <a:solidFill>
+                  <a:srgbClr val="0070C0"/>
+                </a:solidFill>
+              </a:defRPr>
+            </a:lvl1pPr>
+          </a:lstStyle>
+          <a:p>
+            <a:r>
+              <a:rPr lang="en-US" dirty="0"/>
+              <a:t>cd</a:t>
+            </a:r>
+          </a:p>
+        </p:txBody>
+      </p:sp>
+      <p:sp>
+        <p:nvSpPr>
+          <p:cNvPr id="27" name="Rectangle 62">
+            <a:extLst>
+              <a:ext uri="{FF2B5EF4-FFF2-40B4-BE49-F238E27FC236}">
+                <a16:creationId xmlns:a16="http://schemas.microsoft.com/office/drawing/2014/main" id="{31D1902E-59E0-4941-8687-1EC0B44C10B8}"/>
+              </a:ext>
+            </a:extLst>
+          </p:cNvPr>
+          <p:cNvSpPr/>
+          <p:nvPr/>
+        </p:nvSpPr>
+        <p:spPr>
+          <a:xfrm>
+            <a:off x="7162800" y="2362200"/>
+            <a:ext cx="841636" cy="300180"/>
+          </a:xfrm>
+          <a:prstGeom prst="rect">
+            <a:avLst/>
+          </a:prstGeom>
+          <a:solidFill>
+            <a:srgbClr val="7030A0"/>
+          </a:solidFill>
+          <a:ln w="19050">
+            <a:solidFill>
+              <a:srgbClr val="7030A0"/>
+            </a:solidFill>
+          </a:ln>
+          <a:effectLst/>
+        </p:spPr>
+        <p:style>
+          <a:lnRef idx="1">
+            <a:schemeClr val="accent2"/>
+          </a:lnRef>
+          <a:fillRef idx="2">
+            <a:schemeClr val="accent2"/>
+          </a:fillRef>
+          <a:effectRef idx="1">
+            <a:schemeClr val="accent2"/>
+          </a:effectRef>
+          <a:fontRef idx="minor">
+            <a:schemeClr val="dk1"/>
+          </a:fontRef>
+        </p:style>
+        <p:txBody>
+          <a:bodyPr rtlCol="0" anchor="ctr"/>
+          <a:lstStyle/>
+          <a:p>
+            <a:pPr algn="ctr"/>
+            <a:r>
+              <a:rPr lang="en-US" sz="1600" dirty="0">
+                <a:solidFill>
+                  <a:schemeClr val="bg1"/>
+                </a:solidFill>
+              </a:rPr>
+              <a:t>: Model</a:t>
+            </a:r>
+            <a:endParaRPr lang="en-SG" sz="1600" dirty="0">
+              <a:solidFill>
+                <a:schemeClr val="bg1"/>
+              </a:solidFill>
+            </a:endParaRPr>
+          </a:p>
+        </p:txBody>
+      </p:sp>
+      <p:cxnSp>
+        <p:nvCxnSpPr>
+          <p:cNvPr id="28" name="Straight Connector 27">
+            <a:extLst>
+              <a:ext uri="{FF2B5EF4-FFF2-40B4-BE49-F238E27FC236}">
+                <a16:creationId xmlns:a16="http://schemas.microsoft.com/office/drawing/2014/main" id="{E6F2A42B-809C-4287-9E80-8DF7E1682170}"/>
+              </a:ext>
+            </a:extLst>
+          </p:cNvPr>
+          <p:cNvCxnSpPr>
+            <a:cxnSpLocks/>
+          </p:cNvCxnSpPr>
+          <p:nvPr/>
+        </p:nvCxnSpPr>
+        <p:spPr>
+          <a:xfrm flipH="1">
+            <a:off x="7587326" y="2653306"/>
+            <a:ext cx="16161" cy="3366494"/>
+          </a:xfrm>
+          <a:prstGeom prst="line">
+            <a:avLst/>
+          </a:prstGeom>
+          <a:ln w="19050">
+            <a:solidFill>
+              <a:srgbClr val="7030A0"/>
+            </a:solidFill>
+            <a:prstDash val="sysDash"/>
+          </a:ln>
+          <a:effectLst/>
+        </p:spPr>
+        <p:style>
+          <a:lnRef idx="1">
+            <a:schemeClr val="accent1"/>
+          </a:lnRef>
+          <a:fillRef idx="2">
+            <a:schemeClr val="accent1"/>
+          </a:fillRef>
+          <a:effectRef idx="1">
+            <a:schemeClr val="accent1"/>
+          </a:effectRef>
+          <a:fontRef idx="minor">
+            <a:schemeClr val="dk1"/>
+          </a:fontRef>
+        </p:style>
+      </p:cxnSp>
+      <p:sp>
+        <p:nvSpPr>
+          <p:cNvPr id="29" name="Rectangle 28">
+            <a:extLst>
+              <a:ext uri="{FF2B5EF4-FFF2-40B4-BE49-F238E27FC236}">
+                <a16:creationId xmlns:a16="http://schemas.microsoft.com/office/drawing/2014/main" id="{438FBA51-39ED-482A-9E47-8E6230657A11}"/>
+              </a:ext>
+            </a:extLst>
+          </p:cNvPr>
+          <p:cNvSpPr/>
+          <p:nvPr/>
+        </p:nvSpPr>
+        <p:spPr>
+          <a:xfrm>
+            <a:off x="7500562" y="2958107"/>
+            <a:ext cx="152505" cy="375718"/>
+          </a:xfrm>
+          <a:prstGeom prst="rect">
+            <a:avLst/>
+          </a:prstGeom>
+          <a:solidFill>
+            <a:srgbClr val="7030A0"/>
+          </a:solidFill>
+          <a:ln>
+            <a:solidFill>
+              <a:srgbClr val="7030A0"/>
+            </a:solidFill>
+          </a:ln>
+          <a:effectLst/>
+        </p:spPr>
+        <p:style>
+          <a:lnRef idx="1">
+            <a:schemeClr val="accent3"/>
+          </a:lnRef>
+          <a:fillRef idx="2">
+            <a:schemeClr val="accent3"/>
+          </a:fillRef>
+          <a:effectRef idx="1">
+            <a:schemeClr val="accent3"/>
+          </a:effectRef>
+          <a:fontRef idx="minor">
+            <a:schemeClr val="dk1"/>
+          </a:fontRef>
+        </p:style>
+        <p:txBody>
+          <a:bodyPr rtlCol="0" anchor="ctr"/>
+          <a:lstStyle/>
+          <a:p>
+            <a:pPr algn="ctr"/>
+            <a:endParaRPr lang="en-SG" sz="1400"/>
+          </a:p>
+        </p:txBody>
+      </p:sp>
+      <p:cxnSp>
+        <p:nvCxnSpPr>
+          <p:cNvPr id="30" name="Straight Arrow Connector 29">
+            <a:extLst>
+              <a:ext uri="{FF2B5EF4-FFF2-40B4-BE49-F238E27FC236}">
+                <a16:creationId xmlns:a16="http://schemas.microsoft.com/office/drawing/2014/main" id="{48ADDA32-16D6-400D-9718-2BE688B55F22}"/>
+              </a:ext>
+            </a:extLst>
+          </p:cNvPr>
+          <p:cNvCxnSpPr>
+            <a:cxnSpLocks/>
+          </p:cNvCxnSpPr>
+          <p:nvPr/>
+        </p:nvCxnSpPr>
+        <p:spPr>
+          <a:xfrm>
+            <a:off x="5678282" y="2958107"/>
+            <a:ext cx="1822280" cy="1"/>
+          </a:xfrm>
+          <a:prstGeom prst="straightConnector1">
+            <a:avLst/>
+          </a:prstGeom>
+          <a:ln w="19050">
+            <a:solidFill>
+              <a:srgbClr val="0070C0"/>
+            </a:solidFill>
+            <a:tailEnd type="arrow"/>
+          </a:ln>
+        </p:spPr>
+        <p:style>
+          <a:lnRef idx="1">
+            <a:schemeClr val="accent1"/>
+          </a:lnRef>
+          <a:fillRef idx="0">
+            <a:schemeClr val="accent1"/>
+          </a:fillRef>
+          <a:effectRef idx="0">
+            <a:schemeClr val="accent1"/>
+          </a:effectRef>
+          <a:fontRef idx="minor">
+            <a:schemeClr val="tx1"/>
+          </a:fontRef>
+        </p:style>
+      </p:cxnSp>
+      <p:sp>
+        <p:nvSpPr>
+          <p:cNvPr id="31" name="TextBox 30">
+            <a:extLst>
+              <a:ext uri="{FF2B5EF4-FFF2-40B4-BE49-F238E27FC236}">
+                <a16:creationId xmlns:a16="http://schemas.microsoft.com/office/drawing/2014/main" id="{C6540D4A-AD0B-4D3F-9C07-19A1E25948FD}"/>
+              </a:ext>
+            </a:extLst>
+          </p:cNvPr>
+          <p:cNvSpPr txBox="1"/>
+          <p:nvPr/>
+        </p:nvSpPr>
+        <p:spPr>
+          <a:xfrm>
+            <a:off x="5453591" y="5985258"/>
+            <a:ext cx="258404" cy="261610"/>
+          </a:xfrm>
+          <a:prstGeom prst="rect">
+            <a:avLst/>
+          </a:prstGeom>
+          <a:noFill/>
+        </p:spPr>
+        <p:txBody>
+          <a:bodyPr wrap="none" rtlCol="0">
+            <a:spAutoFit/>
+          </a:bodyPr>
+          <a:lstStyle/>
+          <a:p>
+            <a:r>
+              <a:rPr lang="en-SG" sz="1100" dirty="0">
+                <a:solidFill>
+                  <a:srgbClr val="002060"/>
+                </a:solidFill>
+              </a:rPr>
+              <a:t>X</a:t>
+            </a:r>
+          </a:p>
+        </p:txBody>
+      </p:sp>
+      <p:sp>
+        <p:nvSpPr>
+          <p:cNvPr id="32" name="Rectangle 62">
+            <a:extLst>
+              <a:ext uri="{FF2B5EF4-FFF2-40B4-BE49-F238E27FC236}">
+                <a16:creationId xmlns:a16="http://schemas.microsoft.com/office/drawing/2014/main" id="{78B29113-9B9F-41A4-BAF1-2787E63BB853}"/>
+              </a:ext>
+            </a:extLst>
+          </p:cNvPr>
+          <p:cNvSpPr/>
+          <p:nvPr/>
+        </p:nvSpPr>
+        <p:spPr>
+          <a:xfrm>
+            <a:off x="5035976" y="1260268"/>
+            <a:ext cx="1093635" cy="461538"/>
+          </a:xfrm>
+          <a:prstGeom prst="rect">
+            <a:avLst/>
+          </a:prstGeom>
+          <a:solidFill>
+            <a:srgbClr val="0070C0"/>
+          </a:solidFill>
+          <a:ln w="19050">
+            <a:solidFill>
+              <a:srgbClr val="0070C0"/>
+            </a:solidFill>
+          </a:ln>
+          <a:effectLst/>
+        </p:spPr>
+        <p:style>
+          <a:lnRef idx="1">
+            <a:schemeClr val="accent2"/>
+          </a:lnRef>
+          <a:fillRef idx="2">
+            <a:schemeClr val="accent2"/>
+          </a:fillRef>
+          <a:effectRef idx="1">
+            <a:schemeClr val="accent2"/>
+          </a:effectRef>
+          <a:fontRef idx="minor">
+            <a:schemeClr val="dk1"/>
+          </a:fontRef>
+        </p:style>
+        <p:txBody>
+          <a:bodyPr rtlCol="0" anchor="ctr"/>
+          <a:lstStyle/>
+          <a:p>
+            <a:pPr algn="ctr"/>
+            <a:r>
+              <a:rPr lang="en-US" sz="1600" dirty="0" err="1">
+                <a:solidFill>
+                  <a:schemeClr val="bg1"/>
+                </a:solidFill>
+              </a:rPr>
+              <a:t>cd:Cd</a:t>
+            </a:r>
+            <a:br>
+              <a:rPr lang="en-US" sz="1600" dirty="0">
+                <a:solidFill>
+                  <a:schemeClr val="bg1"/>
+                </a:solidFill>
+              </a:rPr>
+            </a:br>
+            <a:r>
+              <a:rPr lang="en-US" sz="1600" dirty="0">
+                <a:solidFill>
+                  <a:schemeClr val="bg1"/>
+                </a:solidFill>
+              </a:rPr>
+              <a:t>Command</a:t>
+            </a:r>
+            <a:endParaRPr lang="en-SG" sz="1600" dirty="0">
+              <a:solidFill>
+                <a:schemeClr val="bg1"/>
+              </a:solidFill>
+            </a:endParaRPr>
+          </a:p>
+        </p:txBody>
+      </p:sp>
+      <p:cxnSp>
+        <p:nvCxnSpPr>
+          <p:cNvPr id="33" name="Straight Arrow Connector 32">
+            <a:extLst>
+              <a:ext uri="{FF2B5EF4-FFF2-40B4-BE49-F238E27FC236}">
+                <a16:creationId xmlns:a16="http://schemas.microsoft.com/office/drawing/2014/main" id="{666F1213-4FCB-481E-A179-9714CCDBD01E}"/>
+              </a:ext>
+            </a:extLst>
+          </p:cNvPr>
+          <p:cNvCxnSpPr>
+            <a:cxnSpLocks/>
+          </p:cNvCxnSpPr>
+          <p:nvPr/>
+        </p:nvCxnSpPr>
+        <p:spPr>
+          <a:xfrm>
+            <a:off x="1691351" y="2731314"/>
+            <a:ext cx="3832164" cy="1"/>
+          </a:xfrm>
+          <a:prstGeom prst="straightConnector1">
+            <a:avLst/>
+          </a:prstGeom>
+          <a:ln w="19050">
+            <a:solidFill>
+              <a:srgbClr val="0070C0"/>
+            </a:solidFill>
+            <a:tailEnd type="arrow"/>
+          </a:ln>
+        </p:spPr>
+        <p:style>
+          <a:lnRef idx="1">
+            <a:schemeClr val="accent1"/>
+          </a:lnRef>
+          <a:fillRef idx="0">
+            <a:schemeClr val="accent1"/>
+          </a:fillRef>
+          <a:effectRef idx="0">
+            <a:schemeClr val="accent1"/>
+          </a:effectRef>
+          <a:fontRef idx="minor">
+            <a:schemeClr val="tx1"/>
+          </a:fontRef>
+        </p:style>
+      </p:cxnSp>
+      <p:cxnSp>
+        <p:nvCxnSpPr>
+          <p:cNvPr id="34" name="Straight Arrow Connector 33">
+            <a:extLst>
+              <a:ext uri="{FF2B5EF4-FFF2-40B4-BE49-F238E27FC236}">
+                <a16:creationId xmlns:a16="http://schemas.microsoft.com/office/drawing/2014/main" id="{204E3F3B-A629-4828-82BC-31C6C46F9D33}"/>
+              </a:ext>
+            </a:extLst>
+          </p:cNvPr>
+          <p:cNvCxnSpPr>
+            <a:cxnSpLocks/>
+          </p:cNvCxnSpPr>
+          <p:nvPr/>
+        </p:nvCxnSpPr>
+        <p:spPr>
+          <a:xfrm>
+            <a:off x="1708245" y="1363918"/>
+            <a:ext cx="2256705" cy="1"/>
+          </a:xfrm>
+          <a:prstGeom prst="straightConnector1">
+            <a:avLst/>
+          </a:prstGeom>
+          <a:ln w="19050">
+            <a:solidFill>
+              <a:srgbClr val="0070C0"/>
+            </a:solidFill>
+            <a:tailEnd type="arrow"/>
+          </a:ln>
+        </p:spPr>
+        <p:style>
+          <a:lnRef idx="1">
+            <a:schemeClr val="accent1"/>
+          </a:lnRef>
+          <a:fillRef idx="0">
+            <a:schemeClr val="accent1"/>
+          </a:fillRef>
+          <a:effectRef idx="0">
+            <a:schemeClr val="accent1"/>
+          </a:effectRef>
+          <a:fontRef idx="minor">
+            <a:schemeClr val="tx1"/>
+          </a:fontRef>
+        </p:style>
+      </p:cxnSp>
+      <p:cxnSp>
+        <p:nvCxnSpPr>
+          <p:cNvPr id="35" name="Straight Arrow Connector 34">
+            <a:extLst>
+              <a:ext uri="{FF2B5EF4-FFF2-40B4-BE49-F238E27FC236}">
+                <a16:creationId xmlns:a16="http://schemas.microsoft.com/office/drawing/2014/main" id="{55632185-C94B-49E7-83E8-0FB7BEB8091E}"/>
+              </a:ext>
+            </a:extLst>
+          </p:cNvPr>
+          <p:cNvCxnSpPr>
+            <a:cxnSpLocks/>
+          </p:cNvCxnSpPr>
+          <p:nvPr/>
+        </p:nvCxnSpPr>
+        <p:spPr>
+          <a:xfrm>
+            <a:off x="1691998" y="5734846"/>
+            <a:ext cx="3831517" cy="0"/>
+          </a:xfrm>
+          <a:prstGeom prst="straightConnector1">
+            <a:avLst/>
+          </a:prstGeom>
+          <a:ln w="19050">
+            <a:solidFill>
+              <a:srgbClr val="0070C0"/>
+            </a:solidFill>
+            <a:prstDash val="sysDash"/>
+            <a:headEnd type="arrow" w="med" len="med"/>
+            <a:tailEnd type="none" w="med" len="med"/>
+          </a:ln>
+        </p:spPr>
+        <p:style>
+          <a:lnRef idx="1">
+            <a:schemeClr val="accent1"/>
+          </a:lnRef>
+          <a:fillRef idx="0">
+            <a:schemeClr val="accent1"/>
+          </a:fillRef>
+          <a:effectRef idx="0">
+            <a:schemeClr val="accent1"/>
+          </a:effectRef>
+          <a:fontRef idx="minor">
+            <a:schemeClr val="tx1"/>
+          </a:fontRef>
+        </p:style>
+      </p:cxnSp>
+      <p:cxnSp>
+        <p:nvCxnSpPr>
+          <p:cNvPr id="36" name="Straight Connector 35">
+            <a:extLst>
+              <a:ext uri="{FF2B5EF4-FFF2-40B4-BE49-F238E27FC236}">
+                <a16:creationId xmlns:a16="http://schemas.microsoft.com/office/drawing/2014/main" id="{E71EE704-FCEF-4033-BDEC-F766F37A8D81}"/>
+              </a:ext>
+            </a:extLst>
+          </p:cNvPr>
+          <p:cNvCxnSpPr>
+            <a:cxnSpLocks/>
+          </p:cNvCxnSpPr>
+          <p:nvPr/>
+        </p:nvCxnSpPr>
+        <p:spPr>
+          <a:xfrm flipH="1">
+            <a:off x="9183871" y="2642997"/>
+            <a:ext cx="5612" cy="3342261"/>
+          </a:xfrm>
+          <a:prstGeom prst="line">
+            <a:avLst/>
+          </a:prstGeom>
+          <a:ln w="19050">
+            <a:solidFill>
+              <a:srgbClr val="7030A0"/>
+            </a:solidFill>
+            <a:prstDash val="sysDash"/>
+          </a:ln>
+          <a:effectLst/>
+        </p:spPr>
+        <p:style>
+          <a:lnRef idx="1">
+            <a:schemeClr val="accent1"/>
+          </a:lnRef>
+          <a:fillRef idx="2">
+            <a:schemeClr val="accent1"/>
+          </a:fillRef>
+          <a:effectRef idx="1">
+            <a:schemeClr val="accent1"/>
+          </a:effectRef>
+          <a:fontRef idx="minor">
+            <a:schemeClr val="dk1"/>
+          </a:fontRef>
+        </p:style>
+      </p:cxnSp>
+      <p:sp>
+        <p:nvSpPr>
+          <p:cNvPr id="37" name="TextBox 36">
+            <a:extLst>
+              <a:ext uri="{FF2B5EF4-FFF2-40B4-BE49-F238E27FC236}">
+                <a16:creationId xmlns:a16="http://schemas.microsoft.com/office/drawing/2014/main" id="{CE1E6D4D-DC23-47FA-9200-2589EE5C6F5C}"/>
+              </a:ext>
+            </a:extLst>
+          </p:cNvPr>
+          <p:cNvSpPr txBox="1"/>
+          <p:nvPr/>
+        </p:nvSpPr>
+        <p:spPr>
+          <a:xfrm>
+            <a:off x="7852035" y="2819400"/>
+            <a:ext cx="1175072" cy="184666"/>
+          </a:xfrm>
+          <a:prstGeom prst="rect">
+            <a:avLst/>
+          </a:prstGeom>
+          <a:noFill/>
+          <a:ln>
+            <a:noFill/>
+          </a:ln>
+        </p:spPr>
+        <p:txBody>
+          <a:bodyPr wrap="square" lIns="0" tIns="0" rIns="0" bIns="0" rtlCol="0">
+            <a:spAutoFit/>
+          </a:bodyPr>
+          <a:lstStyle>
+            <a:defPPr>
+              <a:defRPr lang="en-US"/>
+            </a:defPPr>
+            <a:lvl1pPr algn="r">
+              <a:defRPr sz="1400">
+                <a:solidFill>
+                  <a:srgbClr val="0070C0"/>
+                </a:solidFill>
+              </a:defRPr>
+            </a:lvl1pPr>
+          </a:lstStyle>
+          <a:p>
+            <a:r>
+              <a:rPr lang="en-US" sz="1200" dirty="0" err="1">
+                <a:solidFill>
+                  <a:srgbClr val="7030A0"/>
+                </a:solidFill>
+              </a:rPr>
+              <a:t>getCurrDirectory</a:t>
+            </a:r>
+            <a:r>
+              <a:rPr lang="en-US" sz="1200" dirty="0">
+                <a:solidFill>
+                  <a:schemeClr val="accent4">
+                    <a:lumMod val="75000"/>
+                  </a:schemeClr>
+                </a:solidFill>
+              </a:rPr>
+              <a:t>()</a:t>
+            </a:r>
+          </a:p>
+        </p:txBody>
+      </p:sp>
+      <p:cxnSp>
+        <p:nvCxnSpPr>
+          <p:cNvPr id="38" name="Straight Arrow Connector 37">
+            <a:extLst>
+              <a:ext uri="{FF2B5EF4-FFF2-40B4-BE49-F238E27FC236}">
+                <a16:creationId xmlns:a16="http://schemas.microsoft.com/office/drawing/2014/main" id="{2C4F9B85-0E17-45AD-BAE6-C3C09ACE0723}"/>
+              </a:ext>
+            </a:extLst>
+          </p:cNvPr>
+          <p:cNvCxnSpPr>
+            <a:cxnSpLocks/>
+          </p:cNvCxnSpPr>
+          <p:nvPr/>
+        </p:nvCxnSpPr>
+        <p:spPr>
+          <a:xfrm>
+            <a:off x="7657026" y="3026895"/>
+            <a:ext cx="1470216" cy="0"/>
+          </a:xfrm>
+          <a:prstGeom prst="straightConnector1">
+            <a:avLst/>
+          </a:prstGeom>
+          <a:ln w="19050">
+            <a:solidFill>
+              <a:srgbClr val="7030A0"/>
+            </a:solidFill>
+            <a:tailEnd type="arrow"/>
+          </a:ln>
+        </p:spPr>
+        <p:style>
+          <a:lnRef idx="1">
+            <a:schemeClr val="accent1"/>
+          </a:lnRef>
+          <a:fillRef idx="0">
+            <a:schemeClr val="accent1"/>
+          </a:fillRef>
+          <a:effectRef idx="0">
+            <a:schemeClr val="accent1"/>
+          </a:effectRef>
+          <a:fontRef idx="minor">
+            <a:schemeClr val="tx1"/>
+          </a:fontRef>
+        </p:style>
+      </p:cxnSp>
+      <p:cxnSp>
+        <p:nvCxnSpPr>
+          <p:cNvPr id="39" name="Straight Arrow Connector 38">
+            <a:extLst>
+              <a:ext uri="{FF2B5EF4-FFF2-40B4-BE49-F238E27FC236}">
+                <a16:creationId xmlns:a16="http://schemas.microsoft.com/office/drawing/2014/main" id="{12BC0CC0-B39B-43D6-BF91-D5D6FD58D344}"/>
+              </a:ext>
+            </a:extLst>
+          </p:cNvPr>
+          <p:cNvCxnSpPr>
+            <a:cxnSpLocks/>
+          </p:cNvCxnSpPr>
+          <p:nvPr/>
+        </p:nvCxnSpPr>
+        <p:spPr>
+          <a:xfrm flipV="1">
+            <a:off x="7657026" y="3200400"/>
+            <a:ext cx="1470216" cy="6325"/>
+          </a:xfrm>
+          <a:prstGeom prst="straightConnector1">
+            <a:avLst/>
+          </a:prstGeom>
+          <a:ln w="19050">
+            <a:solidFill>
+              <a:srgbClr val="7030A0"/>
+            </a:solidFill>
+            <a:prstDash val="sysDash"/>
+            <a:headEnd type="arrow" w="med" len="med"/>
+            <a:tailEnd type="none" w="med" len="med"/>
+          </a:ln>
+        </p:spPr>
+        <p:style>
+          <a:lnRef idx="1">
+            <a:schemeClr val="accent1"/>
+          </a:lnRef>
+          <a:fillRef idx="0">
+            <a:schemeClr val="accent1"/>
+          </a:fillRef>
+          <a:effectRef idx="0">
+            <a:schemeClr val="accent1"/>
+          </a:effectRef>
+          <a:fontRef idx="minor">
+            <a:schemeClr val="tx1"/>
+          </a:fontRef>
+        </p:style>
+      </p:cxnSp>
+      <p:cxnSp>
+        <p:nvCxnSpPr>
+          <p:cNvPr id="40" name="Straight Arrow Connector 39">
+            <a:extLst>
+              <a:ext uri="{FF2B5EF4-FFF2-40B4-BE49-F238E27FC236}">
+                <a16:creationId xmlns:a16="http://schemas.microsoft.com/office/drawing/2014/main" id="{E3E2CB03-A1C5-4EA3-94E4-B02352E7CEAE}"/>
+              </a:ext>
+            </a:extLst>
+          </p:cNvPr>
+          <p:cNvCxnSpPr>
+            <a:cxnSpLocks/>
+            <a:endCxn id="29" idx="2"/>
+          </p:cNvCxnSpPr>
+          <p:nvPr/>
+        </p:nvCxnSpPr>
+        <p:spPr>
+          <a:xfrm>
+            <a:off x="5665509" y="3333825"/>
+            <a:ext cx="1911306" cy="0"/>
+          </a:xfrm>
+          <a:prstGeom prst="straightConnector1">
+            <a:avLst/>
+          </a:prstGeom>
+          <a:ln w="19050">
+            <a:solidFill>
+              <a:srgbClr val="7030A0"/>
+            </a:solidFill>
+            <a:prstDash val="sysDash"/>
+            <a:headEnd type="arrow" w="med" len="med"/>
+            <a:tailEnd type="none" w="med" len="med"/>
+          </a:ln>
+        </p:spPr>
+        <p:style>
+          <a:lnRef idx="1">
+            <a:schemeClr val="accent1"/>
+          </a:lnRef>
+          <a:fillRef idx="0">
+            <a:schemeClr val="accent1"/>
+          </a:fillRef>
+          <a:effectRef idx="0">
+            <a:schemeClr val="accent1"/>
+          </a:effectRef>
+          <a:fontRef idx="minor">
+            <a:schemeClr val="tx1"/>
+          </a:fontRef>
+        </p:style>
+      </p:cxnSp>
+      <p:sp>
+        <p:nvSpPr>
+          <p:cNvPr id="41" name="Rectangle 40">
+            <a:extLst>
+              <a:ext uri="{FF2B5EF4-FFF2-40B4-BE49-F238E27FC236}">
+                <a16:creationId xmlns:a16="http://schemas.microsoft.com/office/drawing/2014/main" id="{84B02A51-8BE6-4BCE-A2DF-EFC882274D22}"/>
+              </a:ext>
+            </a:extLst>
+          </p:cNvPr>
+          <p:cNvSpPr/>
+          <p:nvPr/>
+        </p:nvSpPr>
+        <p:spPr>
+          <a:xfrm>
+            <a:off x="7503240" y="3948293"/>
+            <a:ext cx="153786" cy="511193"/>
+          </a:xfrm>
+          <a:prstGeom prst="rect">
+            <a:avLst/>
+          </a:prstGeom>
+          <a:solidFill>
+            <a:srgbClr val="7030A0"/>
+          </a:solidFill>
+          <a:ln>
+            <a:solidFill>
+              <a:srgbClr val="7030A0"/>
+            </a:solidFill>
+          </a:ln>
+          <a:effectLst/>
+        </p:spPr>
+        <p:style>
+          <a:lnRef idx="1">
+            <a:schemeClr val="accent3"/>
+          </a:lnRef>
+          <a:fillRef idx="2">
+            <a:schemeClr val="accent3"/>
+          </a:fillRef>
+          <a:effectRef idx="1">
+            <a:schemeClr val="accent3"/>
+          </a:effectRef>
+          <a:fontRef idx="minor">
+            <a:schemeClr val="dk1"/>
+          </a:fontRef>
+        </p:style>
+        <p:txBody>
+          <a:bodyPr rtlCol="0" anchor="ctr"/>
+          <a:lstStyle/>
+          <a:p>
+            <a:pPr algn="ctr"/>
+            <a:endParaRPr lang="en-SG" sz="1400"/>
+          </a:p>
+        </p:txBody>
+      </p:sp>
+      <p:cxnSp>
+        <p:nvCxnSpPr>
+          <p:cNvPr id="42" name="Straight Arrow Connector 41">
+            <a:extLst>
+              <a:ext uri="{FF2B5EF4-FFF2-40B4-BE49-F238E27FC236}">
+                <a16:creationId xmlns:a16="http://schemas.microsoft.com/office/drawing/2014/main" id="{E6FF8E2D-9F78-41F5-B966-572D4C8B02AC}"/>
+              </a:ext>
+            </a:extLst>
+          </p:cNvPr>
+          <p:cNvCxnSpPr>
+            <a:cxnSpLocks/>
+          </p:cNvCxnSpPr>
+          <p:nvPr/>
+        </p:nvCxnSpPr>
+        <p:spPr>
+          <a:xfrm>
+            <a:off x="5636122" y="3948293"/>
+            <a:ext cx="1864440" cy="0"/>
+          </a:xfrm>
+          <a:prstGeom prst="straightConnector1">
+            <a:avLst/>
+          </a:prstGeom>
+          <a:ln w="19050">
+            <a:solidFill>
+              <a:srgbClr val="0070C0"/>
+            </a:solidFill>
+            <a:tailEnd type="arrow"/>
+          </a:ln>
+        </p:spPr>
+        <p:style>
+          <a:lnRef idx="1">
+            <a:schemeClr val="accent1"/>
+          </a:lnRef>
+          <a:fillRef idx="0">
+            <a:schemeClr val="accent1"/>
+          </a:fillRef>
+          <a:effectRef idx="0">
+            <a:schemeClr val="accent1"/>
+          </a:effectRef>
+          <a:fontRef idx="minor">
+            <a:schemeClr val="tx1"/>
+          </a:fontRef>
+        </p:style>
+      </p:cxnSp>
+      <p:sp>
+        <p:nvSpPr>
+          <p:cNvPr id="43" name="TextBox 42">
+            <a:extLst>
+              <a:ext uri="{FF2B5EF4-FFF2-40B4-BE49-F238E27FC236}">
+                <a16:creationId xmlns:a16="http://schemas.microsoft.com/office/drawing/2014/main" id="{06F96732-F446-4F81-A150-97A6588A11C3}"/>
+              </a:ext>
+            </a:extLst>
+          </p:cNvPr>
+          <p:cNvSpPr txBox="1"/>
+          <p:nvPr/>
+        </p:nvSpPr>
+        <p:spPr>
+          <a:xfrm>
+            <a:off x="5750166" y="3720006"/>
+            <a:ext cx="1678512" cy="184666"/>
+          </a:xfrm>
+          <a:prstGeom prst="rect">
+            <a:avLst/>
+          </a:prstGeom>
+          <a:noFill/>
+          <a:ln>
+            <a:noFill/>
+          </a:ln>
+        </p:spPr>
+        <p:txBody>
+          <a:bodyPr wrap="square" lIns="0" tIns="0" rIns="0" bIns="0" rtlCol="0">
+            <a:spAutoFit/>
+          </a:bodyPr>
+          <a:lstStyle>
+            <a:defPPr>
+              <a:defRPr lang="en-US"/>
+            </a:defPPr>
+            <a:lvl1pPr algn="r">
+              <a:defRPr sz="1400">
+                <a:solidFill>
+                  <a:srgbClr val="0070C0"/>
+                </a:solidFill>
+              </a:defRPr>
+            </a:lvl1pPr>
+          </a:lstStyle>
+          <a:p>
+            <a:r>
+              <a:rPr lang="en-US" sz="1200" dirty="0" err="1">
+                <a:solidFill>
+                  <a:srgbClr val="7030A0"/>
+                </a:solidFill>
+              </a:rPr>
+              <a:t>updateCurrDirectory</a:t>
+            </a:r>
+            <a:r>
+              <a:rPr lang="en-US" sz="1200" dirty="0">
+                <a:solidFill>
+                  <a:schemeClr val="accent4">
+                    <a:lumMod val="75000"/>
+                  </a:schemeClr>
+                </a:solidFill>
+              </a:rPr>
+              <a:t>(Path)</a:t>
+            </a:r>
+          </a:p>
+        </p:txBody>
+      </p:sp>
+      <p:cxnSp>
+        <p:nvCxnSpPr>
+          <p:cNvPr id="44" name="Straight Arrow Connector 43">
+            <a:extLst>
+              <a:ext uri="{FF2B5EF4-FFF2-40B4-BE49-F238E27FC236}">
+                <a16:creationId xmlns:a16="http://schemas.microsoft.com/office/drawing/2014/main" id="{F71DDB05-29B2-4183-BB4E-6C7075FC5D11}"/>
+              </a:ext>
+            </a:extLst>
+          </p:cNvPr>
+          <p:cNvCxnSpPr>
+            <a:cxnSpLocks/>
+          </p:cNvCxnSpPr>
+          <p:nvPr/>
+        </p:nvCxnSpPr>
+        <p:spPr>
+          <a:xfrm>
+            <a:off x="7659704" y="4017082"/>
+            <a:ext cx="1470216" cy="0"/>
+          </a:xfrm>
+          <a:prstGeom prst="straightConnector1">
+            <a:avLst/>
+          </a:prstGeom>
+          <a:ln w="19050">
+            <a:solidFill>
+              <a:srgbClr val="7030A0"/>
+            </a:solidFill>
+            <a:tailEnd type="arrow"/>
+          </a:ln>
+        </p:spPr>
+        <p:style>
+          <a:lnRef idx="1">
+            <a:schemeClr val="accent1"/>
+          </a:lnRef>
+          <a:fillRef idx="0">
+            <a:schemeClr val="accent1"/>
+          </a:fillRef>
+          <a:effectRef idx="0">
+            <a:schemeClr val="accent1"/>
+          </a:effectRef>
+          <a:fontRef idx="minor">
+            <a:schemeClr val="tx1"/>
+          </a:fontRef>
+        </p:style>
+      </p:cxnSp>
+      <p:cxnSp>
+        <p:nvCxnSpPr>
+          <p:cNvPr id="45" name="Straight Arrow Connector 44">
+            <a:extLst>
+              <a:ext uri="{FF2B5EF4-FFF2-40B4-BE49-F238E27FC236}">
+                <a16:creationId xmlns:a16="http://schemas.microsoft.com/office/drawing/2014/main" id="{DAFBBBED-E0D5-4392-9A43-745E5F0855D1}"/>
+              </a:ext>
+            </a:extLst>
+          </p:cNvPr>
+          <p:cNvCxnSpPr>
+            <a:cxnSpLocks/>
+          </p:cNvCxnSpPr>
+          <p:nvPr/>
+        </p:nvCxnSpPr>
+        <p:spPr>
+          <a:xfrm flipV="1">
+            <a:off x="7668213" y="4400625"/>
+            <a:ext cx="1470216" cy="6325"/>
+          </a:xfrm>
+          <a:prstGeom prst="straightConnector1">
+            <a:avLst/>
+          </a:prstGeom>
+          <a:ln w="19050">
+            <a:solidFill>
+              <a:srgbClr val="7030A0"/>
+            </a:solidFill>
+            <a:prstDash val="sysDash"/>
+            <a:headEnd type="arrow" w="med" len="med"/>
+            <a:tailEnd type="none" w="med" len="med"/>
+          </a:ln>
+        </p:spPr>
+        <p:style>
+          <a:lnRef idx="1">
+            <a:schemeClr val="accent1"/>
+          </a:lnRef>
+          <a:fillRef idx="0">
+            <a:schemeClr val="accent1"/>
+          </a:fillRef>
+          <a:effectRef idx="0">
+            <a:schemeClr val="accent1"/>
+          </a:effectRef>
+          <a:fontRef idx="minor">
+            <a:schemeClr val="tx1"/>
+          </a:fontRef>
+        </p:style>
+      </p:cxnSp>
+      <p:cxnSp>
+        <p:nvCxnSpPr>
+          <p:cNvPr id="46" name="Straight Arrow Connector 45">
+            <a:extLst>
+              <a:ext uri="{FF2B5EF4-FFF2-40B4-BE49-F238E27FC236}">
+                <a16:creationId xmlns:a16="http://schemas.microsoft.com/office/drawing/2014/main" id="{E1F2DAD7-F213-469D-A26C-C1D35C2AEDC0}"/>
+              </a:ext>
+            </a:extLst>
+          </p:cNvPr>
+          <p:cNvCxnSpPr>
+            <a:cxnSpLocks/>
+            <a:endCxn id="41" idx="2"/>
+          </p:cNvCxnSpPr>
+          <p:nvPr/>
+        </p:nvCxnSpPr>
+        <p:spPr>
+          <a:xfrm flipV="1">
+            <a:off x="5665509" y="4459486"/>
+            <a:ext cx="1914624" cy="13346"/>
+          </a:xfrm>
+          <a:prstGeom prst="straightConnector1">
+            <a:avLst/>
+          </a:prstGeom>
+          <a:ln w="19050">
+            <a:solidFill>
+              <a:srgbClr val="7030A0"/>
+            </a:solidFill>
+            <a:prstDash val="sysDash"/>
+            <a:headEnd type="arrow" w="med" len="med"/>
+            <a:tailEnd type="none" w="med" len="med"/>
+          </a:ln>
+        </p:spPr>
+        <p:style>
+          <a:lnRef idx="1">
+            <a:schemeClr val="accent1"/>
+          </a:lnRef>
+          <a:fillRef idx="0">
+            <a:schemeClr val="accent1"/>
+          </a:fillRef>
+          <a:effectRef idx="0">
+            <a:schemeClr val="accent1"/>
+          </a:effectRef>
+          <a:fontRef idx="minor">
+            <a:schemeClr val="tx1"/>
+          </a:fontRef>
+        </p:style>
+      </p:cxnSp>
+      <p:sp>
+        <p:nvSpPr>
+          <p:cNvPr id="47" name="Rectangle 46">
+            <a:extLst>
+              <a:ext uri="{FF2B5EF4-FFF2-40B4-BE49-F238E27FC236}">
+                <a16:creationId xmlns:a16="http://schemas.microsoft.com/office/drawing/2014/main" id="{9B30D548-4156-4E25-BEAC-30120297A346}"/>
+              </a:ext>
+            </a:extLst>
+          </p:cNvPr>
+          <p:cNvSpPr/>
+          <p:nvPr/>
+        </p:nvSpPr>
+        <p:spPr>
+          <a:xfrm>
+            <a:off x="9112903" y="4013835"/>
+            <a:ext cx="170354" cy="393115"/>
+          </a:xfrm>
+          <a:prstGeom prst="rect">
+            <a:avLst/>
+          </a:prstGeom>
+          <a:solidFill>
+            <a:srgbClr val="7030A0"/>
+          </a:solidFill>
+          <a:ln>
+            <a:solidFill>
+              <a:srgbClr val="7030A0"/>
+            </a:solidFill>
+          </a:ln>
+          <a:effectLst/>
+        </p:spPr>
+        <p:style>
+          <a:lnRef idx="1">
+            <a:schemeClr val="accent3"/>
+          </a:lnRef>
+          <a:fillRef idx="2">
+            <a:schemeClr val="accent3"/>
+          </a:fillRef>
+          <a:effectRef idx="1">
+            <a:schemeClr val="accent3"/>
+          </a:effectRef>
+          <a:fontRef idx="minor">
+            <a:schemeClr val="dk1"/>
+          </a:fontRef>
+        </p:style>
+        <p:txBody>
+          <a:bodyPr rtlCol="0" anchor="ctr"/>
+          <a:lstStyle/>
+          <a:p>
+            <a:pPr algn="ctr"/>
+            <a:endParaRPr lang="en-SG" sz="1400" dirty="0"/>
+          </a:p>
+        </p:txBody>
+      </p:sp>
+      <p:sp>
+        <p:nvSpPr>
+          <p:cNvPr id="48" name="Rectangle 47">
+            <a:extLst>
+              <a:ext uri="{FF2B5EF4-FFF2-40B4-BE49-F238E27FC236}">
+                <a16:creationId xmlns:a16="http://schemas.microsoft.com/office/drawing/2014/main" id="{CC6F6B60-7A6D-4580-BAEB-42FCA7139DE4}"/>
+              </a:ext>
+            </a:extLst>
+          </p:cNvPr>
+          <p:cNvSpPr/>
+          <p:nvPr/>
+        </p:nvSpPr>
+        <p:spPr>
+          <a:xfrm>
+            <a:off x="4267200" y="3462020"/>
+            <a:ext cx="5626948" cy="1183975"/>
+          </a:xfrm>
+          <a:prstGeom prst="rect">
+            <a:avLst/>
+          </a:prstGeom>
+          <a:noFill/>
+        </p:spPr>
+        <p:style>
+          <a:lnRef idx="2">
+            <a:schemeClr val="accent1">
+              <a:shade val="50000"/>
+            </a:schemeClr>
+          </a:lnRef>
+          <a:fillRef idx="1">
+            <a:schemeClr val="accent1"/>
+          </a:fillRef>
+          <a:effectRef idx="0">
+            <a:schemeClr val="accent1"/>
+          </a:effectRef>
+          <a:fontRef idx="minor">
+            <a:schemeClr val="lt1"/>
+          </a:fontRef>
+        </p:style>
+        <p:txBody>
+          <a:bodyPr rtlCol="0" anchor="ctr"/>
+          <a:lstStyle/>
+          <a:p>
+            <a:pPr algn="ctr"/>
+            <a:endParaRPr lang="en-SG"/>
+          </a:p>
+        </p:txBody>
+      </p:sp>
+      <p:sp>
+        <p:nvSpPr>
+          <p:cNvPr id="49" name="TextBox 48">
+            <a:extLst>
+              <a:ext uri="{FF2B5EF4-FFF2-40B4-BE49-F238E27FC236}">
+                <a16:creationId xmlns:a16="http://schemas.microsoft.com/office/drawing/2014/main" id="{87D889DA-326A-4C4F-8B7C-CDEBA395B927}"/>
+              </a:ext>
+            </a:extLst>
+          </p:cNvPr>
+          <p:cNvSpPr txBox="1"/>
+          <p:nvPr/>
+        </p:nvSpPr>
+        <p:spPr>
+          <a:xfrm>
+            <a:off x="4579997" y="3459622"/>
+            <a:ext cx="976549" cy="261610"/>
+          </a:xfrm>
+          <a:prstGeom prst="rect">
+            <a:avLst/>
+          </a:prstGeom>
+          <a:noFill/>
+        </p:spPr>
+        <p:txBody>
+          <a:bodyPr wrap="none" rtlCol="0">
+            <a:spAutoFit/>
+          </a:bodyPr>
+          <a:lstStyle/>
+          <a:p>
+            <a:r>
+              <a:rPr lang="en-SG" sz="1100" dirty="0"/>
+              <a:t>[</a:t>
+            </a:r>
+            <a:r>
+              <a:rPr lang="en-SG" sz="1100" dirty="0" err="1"/>
+              <a:t>isDirectory</a:t>
+            </a:r>
+            <a:r>
+              <a:rPr lang="en-SG" sz="1100" dirty="0"/>
+              <a:t>()]</a:t>
+            </a:r>
+          </a:p>
+        </p:txBody>
+      </p:sp>
+      <p:sp>
+        <p:nvSpPr>
+          <p:cNvPr id="50" name="TextBox 49">
+            <a:extLst>
+              <a:ext uri="{FF2B5EF4-FFF2-40B4-BE49-F238E27FC236}">
+                <a16:creationId xmlns:a16="http://schemas.microsoft.com/office/drawing/2014/main" id="{24353993-A7E2-44EB-BB8A-5C6208FE9A12}"/>
+              </a:ext>
+            </a:extLst>
+          </p:cNvPr>
+          <p:cNvSpPr txBox="1"/>
+          <p:nvPr/>
+        </p:nvSpPr>
+        <p:spPr>
+          <a:xfrm>
+            <a:off x="7721493" y="3766821"/>
+            <a:ext cx="1422507" cy="184666"/>
+          </a:xfrm>
+          <a:prstGeom prst="rect">
+            <a:avLst/>
+          </a:prstGeom>
+          <a:noFill/>
+        </p:spPr>
+        <p:txBody>
+          <a:bodyPr wrap="square" lIns="0" tIns="0" rIns="0" bIns="0" rtlCol="0">
+            <a:spAutoFit/>
+          </a:bodyPr>
+          <a:lstStyle>
+            <a:defPPr>
+              <a:defRPr lang="en-US"/>
+            </a:defPPr>
+            <a:lvl1pPr algn="r">
+              <a:defRPr sz="1400">
+                <a:solidFill>
+                  <a:srgbClr val="0070C0"/>
+                </a:solidFill>
+              </a:defRPr>
+            </a:lvl1pPr>
+          </a:lstStyle>
+          <a:p>
+            <a:r>
+              <a:rPr lang="en-US" sz="1200" dirty="0" err="1">
+                <a:solidFill>
+                  <a:schemeClr val="accent4">
+                    <a:lumMod val="75000"/>
+                  </a:schemeClr>
+                </a:solidFill>
+              </a:rPr>
+              <a:t>updateUserPrefs</a:t>
+            </a:r>
+            <a:r>
+              <a:rPr lang="en-US" sz="1200" dirty="0">
+                <a:solidFill>
+                  <a:srgbClr val="7030A0"/>
+                </a:solidFill>
+              </a:rPr>
+              <a:t>(Path)</a:t>
+            </a:r>
+            <a:endParaRPr lang="en-US" sz="1200" dirty="0"/>
+          </a:p>
+        </p:txBody>
+      </p:sp>
+      <p:sp>
+        <p:nvSpPr>
+          <p:cNvPr id="51" name="Rectangle: Single Corner Snipped 50">
+            <a:extLst>
+              <a:ext uri="{FF2B5EF4-FFF2-40B4-BE49-F238E27FC236}">
+                <a16:creationId xmlns:a16="http://schemas.microsoft.com/office/drawing/2014/main" id="{EB3DB576-3544-4ECD-A359-23FB3FC4948A}"/>
+              </a:ext>
+            </a:extLst>
+          </p:cNvPr>
+          <p:cNvSpPr/>
+          <p:nvPr/>
+        </p:nvSpPr>
+        <p:spPr>
+          <a:xfrm flipV="1">
+            <a:off x="4272419" y="3462020"/>
+            <a:ext cx="346080" cy="276997"/>
+          </a:xfrm>
+          <a:prstGeom prst="snip1Rect">
+            <a:avLst>
+              <a:gd name="adj" fmla="val 38996"/>
+            </a:avLst>
+          </a:prstGeom>
+          <a:noFill/>
+        </p:spPr>
+        <p:style>
+          <a:lnRef idx="2">
+            <a:schemeClr val="accent1">
+              <a:shade val="50000"/>
+            </a:schemeClr>
+          </a:lnRef>
+          <a:fillRef idx="1">
+            <a:schemeClr val="accent1"/>
+          </a:fillRef>
+          <a:effectRef idx="0">
+            <a:schemeClr val="accent1"/>
+          </a:effectRef>
+          <a:fontRef idx="minor">
+            <a:schemeClr val="lt1"/>
+          </a:fontRef>
+        </p:style>
+        <p:txBody>
+          <a:bodyPr rtlCol="0" anchor="ctr"/>
+          <a:lstStyle/>
+          <a:p>
+            <a:pPr algn="ctr"/>
+            <a:endParaRPr lang="en-SG" dirty="0"/>
+          </a:p>
+        </p:txBody>
+      </p:sp>
+      <p:sp>
+        <p:nvSpPr>
+          <p:cNvPr id="52" name="TextBox 51">
+            <a:extLst>
+              <a:ext uri="{FF2B5EF4-FFF2-40B4-BE49-F238E27FC236}">
+                <a16:creationId xmlns:a16="http://schemas.microsoft.com/office/drawing/2014/main" id="{AA077E44-7205-4693-8128-3C9656BDEA85}"/>
+              </a:ext>
+            </a:extLst>
+          </p:cNvPr>
+          <p:cNvSpPr txBox="1"/>
+          <p:nvPr/>
+        </p:nvSpPr>
+        <p:spPr>
+          <a:xfrm>
+            <a:off x="4244255" y="3429000"/>
+            <a:ext cx="397160" cy="276999"/>
+          </a:xfrm>
+          <a:prstGeom prst="rect">
+            <a:avLst/>
+          </a:prstGeom>
+          <a:noFill/>
+        </p:spPr>
+        <p:txBody>
+          <a:bodyPr wrap="none" rtlCol="0">
+            <a:spAutoFit/>
+          </a:bodyPr>
+          <a:lstStyle/>
+          <a:p>
+            <a:r>
+              <a:rPr lang="en-SG" sz="1200" dirty="0"/>
+              <a:t>opt</a:t>
+            </a:r>
+          </a:p>
+        </p:txBody>
+      </p:sp>
+      <p:sp>
+        <p:nvSpPr>
+          <p:cNvPr id="53" name="Rectangle 52">
+            <a:extLst>
+              <a:ext uri="{FF2B5EF4-FFF2-40B4-BE49-F238E27FC236}">
+                <a16:creationId xmlns:a16="http://schemas.microsoft.com/office/drawing/2014/main" id="{E17EF4A2-302C-40F6-826E-6C4AC4949157}"/>
+              </a:ext>
+            </a:extLst>
+          </p:cNvPr>
+          <p:cNvSpPr/>
+          <p:nvPr/>
+        </p:nvSpPr>
+        <p:spPr>
+          <a:xfrm>
+            <a:off x="9214562" y="4081918"/>
+            <a:ext cx="145274" cy="261481"/>
+          </a:xfrm>
+          <a:prstGeom prst="rect">
+            <a:avLst/>
+          </a:prstGeom>
+          <a:solidFill>
+            <a:srgbClr val="0070C0"/>
+          </a:solidFill>
+          <a:ln>
+            <a:solidFill>
+              <a:srgbClr val="0070C0"/>
+            </a:solidFill>
+          </a:ln>
+          <a:effectLst/>
+        </p:spPr>
+        <p:style>
+          <a:lnRef idx="1">
+            <a:schemeClr val="accent3"/>
+          </a:lnRef>
+          <a:fillRef idx="2">
+            <a:schemeClr val="accent3"/>
+          </a:fillRef>
+          <a:effectRef idx="1">
+            <a:schemeClr val="accent3"/>
+          </a:effectRef>
+          <a:fontRef idx="minor">
+            <a:schemeClr val="dk1"/>
+          </a:fontRef>
+        </p:style>
+        <p:txBody>
+          <a:bodyPr rtlCol="0" anchor="ctr"/>
+          <a:lstStyle/>
+          <a:p>
+            <a:pPr algn="ctr"/>
+            <a:endParaRPr lang="en-SG" sz="1400">
+              <a:solidFill>
+                <a:schemeClr val="dk1"/>
+              </a:solidFill>
+            </a:endParaRPr>
+          </a:p>
+        </p:txBody>
+      </p:sp>
+      <p:cxnSp>
+        <p:nvCxnSpPr>
+          <p:cNvPr id="54" name="Connector: Curved 53">
+            <a:extLst>
+              <a:ext uri="{FF2B5EF4-FFF2-40B4-BE49-F238E27FC236}">
+                <a16:creationId xmlns:a16="http://schemas.microsoft.com/office/drawing/2014/main" id="{F41E0A8E-E3A8-49A4-8F69-63D2B3AA2F2B}"/>
+              </a:ext>
+            </a:extLst>
+          </p:cNvPr>
+          <p:cNvCxnSpPr>
+            <a:cxnSpLocks/>
+          </p:cNvCxnSpPr>
+          <p:nvPr/>
+        </p:nvCxnSpPr>
+        <p:spPr>
+          <a:xfrm>
+            <a:off x="9266057" y="4024210"/>
+            <a:ext cx="97718" cy="53409"/>
+          </a:xfrm>
+          <a:prstGeom prst="curvedConnector3">
+            <a:avLst>
+              <a:gd name="adj1" fmla="val 268343"/>
+            </a:avLst>
+          </a:prstGeom>
+          <a:ln>
+            <a:tailEnd type="triangle"/>
+          </a:ln>
+        </p:spPr>
+        <p:style>
+          <a:lnRef idx="1">
+            <a:schemeClr val="accent1"/>
+          </a:lnRef>
+          <a:fillRef idx="0">
+            <a:schemeClr val="accent1"/>
+          </a:fillRef>
+          <a:effectRef idx="0">
+            <a:schemeClr val="accent1"/>
+          </a:effectRef>
+          <a:fontRef idx="minor">
+            <a:schemeClr val="tx1"/>
+          </a:fontRef>
+        </p:style>
+      </p:cxnSp>
+      <p:sp>
+        <p:nvSpPr>
+          <p:cNvPr id="55" name="TextBox 54">
+            <a:extLst>
+              <a:ext uri="{FF2B5EF4-FFF2-40B4-BE49-F238E27FC236}">
+                <a16:creationId xmlns:a16="http://schemas.microsoft.com/office/drawing/2014/main" id="{CF2C076D-45F5-4AEA-8DAF-86FD135C561E}"/>
+              </a:ext>
+            </a:extLst>
+          </p:cNvPr>
+          <p:cNvSpPr txBox="1"/>
+          <p:nvPr/>
+        </p:nvSpPr>
+        <p:spPr>
+          <a:xfrm>
+            <a:off x="8712093" y="3797050"/>
+            <a:ext cx="1422507" cy="184666"/>
+          </a:xfrm>
+          <a:prstGeom prst="rect">
+            <a:avLst/>
+          </a:prstGeom>
+          <a:noFill/>
+        </p:spPr>
+        <p:txBody>
+          <a:bodyPr wrap="square" lIns="0" tIns="0" rIns="0" bIns="0" rtlCol="0">
+            <a:spAutoFit/>
+          </a:bodyPr>
+          <a:lstStyle>
+            <a:defPPr>
+              <a:defRPr lang="en-US"/>
+            </a:defPPr>
+            <a:lvl1pPr algn="r">
+              <a:defRPr sz="1400">
+                <a:solidFill>
+                  <a:srgbClr val="0070C0"/>
+                </a:solidFill>
+              </a:defRPr>
+            </a:lvl1pPr>
+          </a:lstStyle>
+          <a:p>
+            <a:r>
+              <a:rPr lang="en-US" sz="1200" dirty="0" err="1">
+                <a:solidFill>
+                  <a:schemeClr val="accent4">
+                    <a:lumMod val="75000"/>
+                  </a:schemeClr>
+                </a:solidFill>
+              </a:rPr>
+              <a:t>initImageList</a:t>
+            </a:r>
+            <a:r>
+              <a:rPr lang="en-US" sz="1200" dirty="0">
+                <a:solidFill>
+                  <a:srgbClr val="7030A0"/>
+                </a:solidFill>
+              </a:rPr>
+              <a:t>()</a:t>
+            </a:r>
+            <a:endParaRPr lang="en-US" sz="1200" dirty="0"/>
+          </a:p>
+        </p:txBody>
+      </p:sp>
+      <p:sp>
+        <p:nvSpPr>
+          <p:cNvPr id="56" name="Rectangle 62">
+            <a:extLst>
+              <a:ext uri="{FF2B5EF4-FFF2-40B4-BE49-F238E27FC236}">
+                <a16:creationId xmlns:a16="http://schemas.microsoft.com/office/drawing/2014/main" id="{50DD9392-00CF-4EF4-8226-BC469BA6F4BB}"/>
+              </a:ext>
+            </a:extLst>
+          </p:cNvPr>
+          <p:cNvSpPr/>
+          <p:nvPr/>
+        </p:nvSpPr>
+        <p:spPr>
+          <a:xfrm>
+            <a:off x="5827120" y="4740309"/>
+            <a:ext cx="1579824" cy="580894"/>
+          </a:xfrm>
+          <a:prstGeom prst="rect">
+            <a:avLst/>
+          </a:prstGeom>
+          <a:solidFill>
+            <a:srgbClr val="0070C0"/>
+          </a:solidFill>
+          <a:ln w="19050">
+            <a:solidFill>
+              <a:srgbClr val="0070C0"/>
+            </a:solidFill>
+          </a:ln>
+          <a:effectLst/>
+        </p:spPr>
+        <p:style>
+          <a:lnRef idx="1">
+            <a:schemeClr val="accent2"/>
+          </a:lnRef>
+          <a:fillRef idx="2">
+            <a:schemeClr val="accent2"/>
+          </a:fillRef>
+          <a:effectRef idx="1">
+            <a:schemeClr val="accent2"/>
+          </a:effectRef>
+          <a:fontRef idx="minor">
+            <a:schemeClr val="dk1"/>
+          </a:fontRef>
+        </p:style>
+        <p:txBody>
+          <a:bodyPr rtlCol="0" anchor="ctr"/>
+          <a:lstStyle/>
+          <a:p>
+            <a:pPr algn="ctr"/>
+            <a:r>
+              <a:rPr lang="en-US" sz="1600" dirty="0" err="1">
+                <a:solidFill>
+                  <a:schemeClr val="bg1"/>
+                </a:solidFill>
+              </a:rPr>
+              <a:t>result:CommandResult</a:t>
+            </a:r>
+            <a:endParaRPr lang="en-SG" sz="1600" dirty="0">
+              <a:solidFill>
+                <a:schemeClr val="bg1"/>
+              </a:solidFill>
+            </a:endParaRPr>
+          </a:p>
+        </p:txBody>
+      </p:sp>
+      <p:sp>
+        <p:nvSpPr>
+          <p:cNvPr id="57" name="Rectangle 56">
+            <a:extLst>
+              <a:ext uri="{FF2B5EF4-FFF2-40B4-BE49-F238E27FC236}">
+                <a16:creationId xmlns:a16="http://schemas.microsoft.com/office/drawing/2014/main" id="{48F75063-1C4A-4607-9BD4-70403A4CBA45}"/>
+              </a:ext>
+            </a:extLst>
+          </p:cNvPr>
+          <p:cNvSpPr/>
+          <p:nvPr/>
+        </p:nvSpPr>
+        <p:spPr>
+          <a:xfrm>
+            <a:off x="6532588" y="5294701"/>
+            <a:ext cx="145274" cy="261481"/>
+          </a:xfrm>
+          <a:prstGeom prst="rect">
+            <a:avLst/>
+          </a:prstGeom>
+          <a:solidFill>
+            <a:srgbClr val="0070C0"/>
+          </a:solidFill>
+          <a:ln>
+            <a:solidFill>
+              <a:srgbClr val="0070C0"/>
+            </a:solidFill>
+          </a:ln>
+          <a:effectLst/>
+        </p:spPr>
+        <p:style>
+          <a:lnRef idx="1">
+            <a:schemeClr val="accent3"/>
+          </a:lnRef>
+          <a:fillRef idx="2">
+            <a:schemeClr val="accent3"/>
+          </a:fillRef>
+          <a:effectRef idx="1">
+            <a:schemeClr val="accent3"/>
+          </a:effectRef>
+          <a:fontRef idx="minor">
+            <a:schemeClr val="dk1"/>
+          </a:fontRef>
+        </p:style>
+        <p:txBody>
+          <a:bodyPr rtlCol="0" anchor="ctr"/>
+          <a:lstStyle/>
+          <a:p>
+            <a:pPr algn="ctr"/>
+            <a:endParaRPr lang="en-SG" sz="1400">
+              <a:solidFill>
+                <a:schemeClr val="dk1"/>
+              </a:solidFill>
+            </a:endParaRPr>
+          </a:p>
+        </p:txBody>
+      </p:sp>
+      <p:cxnSp>
+        <p:nvCxnSpPr>
+          <p:cNvPr id="58" name="Straight Arrow Connector 57">
+            <a:extLst>
+              <a:ext uri="{FF2B5EF4-FFF2-40B4-BE49-F238E27FC236}">
+                <a16:creationId xmlns:a16="http://schemas.microsoft.com/office/drawing/2014/main" id="{4F1A6507-3D9B-46E1-902A-C8760FC1BCE1}"/>
+              </a:ext>
+            </a:extLst>
+          </p:cNvPr>
+          <p:cNvCxnSpPr>
+            <a:cxnSpLocks/>
+            <a:endCxn id="56" idx="1"/>
+          </p:cNvCxnSpPr>
+          <p:nvPr/>
+        </p:nvCxnSpPr>
+        <p:spPr>
+          <a:xfrm>
+            <a:off x="5685617" y="5029186"/>
+            <a:ext cx="141503" cy="1570"/>
+          </a:xfrm>
+          <a:prstGeom prst="straightConnector1">
+            <a:avLst/>
+          </a:prstGeom>
+          <a:ln w="19050">
+            <a:solidFill>
+              <a:srgbClr val="0070C0"/>
+            </a:solidFill>
+            <a:tailEnd type="arrow"/>
+          </a:ln>
+        </p:spPr>
+        <p:style>
+          <a:lnRef idx="1">
+            <a:schemeClr val="accent1"/>
+          </a:lnRef>
+          <a:fillRef idx="0">
+            <a:schemeClr val="accent1"/>
+          </a:fillRef>
+          <a:effectRef idx="0">
+            <a:schemeClr val="accent1"/>
+          </a:effectRef>
+          <a:fontRef idx="minor">
+            <a:schemeClr val="tx1"/>
+          </a:fontRef>
+        </p:style>
+      </p:cxnSp>
+      <p:cxnSp>
+        <p:nvCxnSpPr>
+          <p:cNvPr id="59" name="Straight Arrow Connector 58">
+            <a:extLst>
+              <a:ext uri="{FF2B5EF4-FFF2-40B4-BE49-F238E27FC236}">
+                <a16:creationId xmlns:a16="http://schemas.microsoft.com/office/drawing/2014/main" id="{5609E1FA-37DB-42B3-A8F5-B61130CEC9F5}"/>
+              </a:ext>
+            </a:extLst>
+          </p:cNvPr>
+          <p:cNvCxnSpPr>
+            <a:cxnSpLocks/>
+            <a:endCxn id="57" idx="2"/>
+          </p:cNvCxnSpPr>
+          <p:nvPr/>
+        </p:nvCxnSpPr>
+        <p:spPr>
+          <a:xfrm>
+            <a:off x="5678460" y="5556182"/>
+            <a:ext cx="926765" cy="0"/>
+          </a:xfrm>
+          <a:prstGeom prst="straightConnector1">
+            <a:avLst/>
+          </a:prstGeom>
+          <a:ln w="19050">
+            <a:solidFill>
+              <a:srgbClr val="0070C0"/>
+            </a:solidFill>
+            <a:prstDash val="sysDash"/>
+            <a:headEnd type="arrow" w="med" len="med"/>
+            <a:tailEnd type="none" w="med" len="med"/>
+          </a:ln>
+        </p:spPr>
+        <p:style>
+          <a:lnRef idx="1">
+            <a:schemeClr val="accent1"/>
+          </a:lnRef>
+          <a:fillRef idx="0">
+            <a:schemeClr val="accent1"/>
+          </a:fillRef>
+          <a:effectRef idx="0">
+            <a:schemeClr val="accent1"/>
+          </a:effectRef>
+          <a:fontRef idx="minor">
+            <a:schemeClr val="tx1"/>
+          </a:fontRef>
+        </p:style>
+      </p:cxnSp>
+    </p:spTree>
+    <p:extLst>
+      <p:ext uri="{BB962C8B-B14F-4D97-AF65-F5344CB8AC3E}">
+        <p14:creationId xmlns:p14="http://schemas.microsoft.com/office/powerpoint/2010/main" val="3821997952"/>
       </p:ext>
     </p:extLst>
   </p:cSld>

</xml_diff>